<commit_message>
Slides - 11! issue
</commit_message>
<xml_diff>
--- a/doc/Programmier-Projekt-Praesi.pptx
+++ b/doc/Programmier-Projekt-Praesi.pptx
@@ -4020,12 +4020,9 @@
         <p:spPr/>
         <p:txBody>
           <a:bodyPr>
-            <a:normAutofit/>
+            <a:normAutofit fontScale="92500" lnSpcReduction="10000"/>
           </a:bodyPr>
           <a:lstStyle/>
-          <a:p>
-            <a:endParaRPr lang="de-DE" dirty="0"/>
-          </a:p>
           <a:p>
             <a:pPr lvl="1"/>
             <a:r>
@@ -4058,26 +4055,22 @@
             <a:pPr lvl="1"/>
             <a:r>
               <a:rPr lang="de-DE" dirty="0"/>
-              <a:t>Streams um Formel für gesamten Baum aufzubauen</a:t>
+              <a:t>Berechnung der Verteilung (</a:t>
+            </a:r>
+            <a:r>
+              <a:rPr lang="de-DE" dirty="0" err="1"/>
+              <a:t>Uniformization</a:t>
+            </a:r>
+            <a:r>
+              <a:rPr lang="de-DE" dirty="0"/>
+              <a:t>)</a:t>
             </a:r>
           </a:p>
           <a:p>
             <a:pPr lvl="2"/>
             <a:r>
-              <a:rPr lang="de-DE" b="1" u="sng" dirty="0"/>
-              <a:t>Aber:</a:t>
-            </a:r>
-            <a:r>
               <a:rPr lang="de-DE" dirty="0"/>
-              <a:t> Nicht für „</a:t>
-            </a:r>
-            <a:r>
-              <a:rPr lang="de-DE" dirty="0" err="1"/>
-              <a:t>Computed</a:t>
-            </a:r>
-            <a:r>
-              <a:rPr lang="de-DE" dirty="0"/>
-              <a:t>-Table“ geeignet</a:t>
+              <a:t>11! ergibt ein POSITIVE_INFINITY</a:t>
             </a:r>
           </a:p>
           <a:p>
@@ -4087,7 +4080,45 @@
             </a:pPr>
             <a:r>
               <a:rPr lang="de-DE" dirty="0"/>
-              <a:t> Pro Knoten Liste aus Stream</a:t>
+              <a:t> </a:t>
+            </a:r>
+            <a:r>
+              <a:rPr lang="de-DE" dirty="0" err="1"/>
+              <a:t>Stop</a:t>
+            </a:r>
+            <a:r>
+              <a:rPr lang="de-DE" dirty="0"/>
+              <a:t>-Kriterium entsprechend angepasst</a:t>
+            </a:r>
+          </a:p>
+          <a:p>
+            <a:pPr lvl="1"/>
+            <a:endParaRPr lang="de-DE" dirty="0"/>
+          </a:p>
+          <a:p>
+            <a:pPr lvl="1"/>
+            <a:r>
+              <a:rPr lang="de-DE" dirty="0"/>
+              <a:t>Streams um Formel für gesamten Baum aufzubauen</a:t>
+            </a:r>
+          </a:p>
+          <a:p>
+            <a:pPr lvl="2"/>
+            <a:r>
+              <a:rPr lang="de-DE" b="1" u="sng" dirty="0"/>
+              <a:t>Aber:</a:t>
+            </a:r>
+            <a:r>
+              <a:rPr lang="de-DE" dirty="0"/>
+              <a:t> Nicht für „</a:t>
+            </a:r>
+            <a:r>
+              <a:rPr lang="de-DE" dirty="0" err="1"/>
+              <a:t>Computed</a:t>
+            </a:r>
+            <a:r>
+              <a:rPr lang="de-DE" dirty="0"/>
+              <a:t>-Table“ geeignet</a:t>
             </a:r>
           </a:p>
           <a:p>
@@ -4097,6 +4128,16 @@
             </a:pPr>
             <a:r>
               <a:rPr lang="de-DE" dirty="0"/>
+              <a:t> Pro Knoten Liste aus Stream</a:t>
+            </a:r>
+          </a:p>
+          <a:p>
+            <a:pPr lvl="2">
+              <a:buFont typeface="Symbol" panose="05050102010706020507" pitchFamily="18" charset="2"/>
+              <a:buChar char="Þ"/>
+            </a:pPr>
+            <a:r>
+              <a:rPr lang="de-DE" dirty="0"/>
               <a:t> Eleganz des Ansatz verloren gegangen </a:t>
             </a:r>
             <a:r>
@@ -4105,13 +4146,6 @@
               </a:rPr>
               <a:t></a:t>
             </a:r>
-            <a:endParaRPr lang="de-DE" dirty="0"/>
-          </a:p>
-          <a:p>
-            <a:pPr lvl="2">
-              <a:buFont typeface="Symbol" panose="05050102010706020507" pitchFamily="18" charset="2"/>
-              <a:buChar char="Þ"/>
-            </a:pPr>
             <a:endParaRPr lang="de-DE" dirty="0"/>
           </a:p>
         </p:txBody>
@@ -4303,74 +4337,74 @@
             <a:pPr marL="201168" lvl="1" indent="0">
               <a:buNone/>
             </a:pPr>
-            <a:endParaRPr lang="de-DE" dirty="0"/>
+            <a:endParaRPr lang="de-DE" sz="2800" dirty="0"/>
           </a:p>
           <a:p>
             <a:pPr lvl="1"/>
             <a:r>
-              <a:rPr lang="de-DE" dirty="0"/>
+              <a:rPr lang="de-DE" sz="2800" dirty="0"/>
               <a:t>Sprachen: </a:t>
             </a:r>
           </a:p>
           <a:p>
             <a:pPr lvl="2"/>
             <a:r>
-              <a:rPr lang="de-DE" dirty="0"/>
+              <a:rPr lang="de-DE" sz="2000" dirty="0"/>
               <a:t>Java </a:t>
             </a:r>
           </a:p>
           <a:p>
             <a:pPr lvl="2"/>
             <a:r>
-              <a:rPr lang="de-DE" dirty="0" err="1"/>
+              <a:rPr lang="de-DE" sz="2000" dirty="0" err="1"/>
               <a:t>Kotlin</a:t>
             </a:r>
             <a:r>
-              <a:rPr lang="de-DE" dirty="0"/>
+              <a:rPr lang="de-DE" sz="2000" dirty="0"/>
               <a:t> (JVM-basierte Sprache)</a:t>
             </a:r>
           </a:p>
           <a:p>
             <a:pPr lvl="1"/>
             <a:r>
-              <a:rPr lang="de-DE" dirty="0"/>
+              <a:rPr lang="de-DE" sz="2800" dirty="0"/>
               <a:t>IDE: </a:t>
             </a:r>
             <a:r>
-              <a:rPr lang="de-DE" dirty="0" err="1"/>
+              <a:rPr lang="de-DE" sz="2800" dirty="0" err="1"/>
               <a:t>IntelliJ</a:t>
             </a:r>
             <a:r>
-              <a:rPr lang="de-DE" dirty="0"/>
+              <a:rPr lang="de-DE" sz="2800" dirty="0"/>
               <a:t> Community Edition</a:t>
             </a:r>
           </a:p>
           <a:p>
             <a:pPr lvl="1"/>
             <a:r>
-              <a:rPr lang="de-DE" dirty="0"/>
+              <a:rPr lang="de-DE" sz="2800" dirty="0"/>
               <a:t>Tools:</a:t>
             </a:r>
           </a:p>
           <a:p>
             <a:pPr lvl="2"/>
             <a:r>
-              <a:rPr lang="de-DE" dirty="0" err="1"/>
+              <a:rPr lang="de-DE" sz="2000" dirty="0" err="1"/>
               <a:t>Graphviz</a:t>
             </a:r>
             <a:r>
-              <a:rPr lang="de-DE" dirty="0"/>
+              <a:rPr lang="de-DE" sz="2000" dirty="0"/>
               <a:t> (BDD/HFT Visualisierung)</a:t>
             </a:r>
           </a:p>
           <a:p>
             <a:pPr lvl="2"/>
             <a:r>
-              <a:rPr lang="de-DE" dirty="0" err="1"/>
+              <a:rPr lang="de-DE" sz="2000" dirty="0" err="1"/>
               <a:t>GnuPlot</a:t>
             </a:r>
             <a:r>
-              <a:rPr lang="de-DE" dirty="0"/>
+              <a:rPr lang="de-DE" sz="2000" dirty="0"/>
               <a:t> (Plotten)</a:t>
             </a:r>
           </a:p>
@@ -5244,7 +5278,7 @@
                     <m:d>
                       <m:dPr>
                         <m:ctrlPr>
-                          <a:rPr lang="de-DE" b="0" i="0" smtClean="0">
+                          <a:rPr lang="de-DE" b="0" i="1" smtClean="0">
                             <a:latin typeface="Cambria Math" panose="02040503050406030204" pitchFamily="18" charset="0"/>
                           </a:rPr>
                         </m:ctrlPr>
@@ -5467,6 +5501,21 @@
               </a:p>
               <a:p>
                 <a:pPr lvl="1"/>
+                <a:endParaRPr lang="de-DE" dirty="0"/>
+              </a:p>
+              <a:p>
+                <a:pPr lvl="1"/>
+                <a:r>
+                  <a:rPr lang="de-DE" dirty="0" err="1"/>
+                  <a:t>Stop</a:t>
+                </a:r>
+                <a:r>
+                  <a:rPr lang="de-DE" dirty="0"/>
+                  <a:t>-Kriterium:</a:t>
+                </a:r>
+              </a:p>
+              <a:p>
+                <a:pPr lvl="2"/>
                 <a:r>
                   <a:rPr lang="de-DE" dirty="0"/>
                   <a:t>Grenzwert abhängig von Maschinen-</a:t>
@@ -5494,6 +5543,33 @@
                   <a:rPr lang="de-DE" dirty="0"/>
                   <a:t>)</a:t>
                 </a:r>
+              </a:p>
+              <a:p>
+                <a:pPr lvl="2"/>
+                <a:r>
+                  <a:rPr lang="de-DE" dirty="0"/>
+                  <a:t>Maximal jedoch </a:t>
+                </a:r>
+                <a14:m>
+                  <m:oMath xmlns:m="http://schemas.openxmlformats.org/officeDocument/2006/math">
+                    <m:r>
+                      <m:rPr>
+                        <m:sty m:val="p"/>
+                      </m:rPr>
+                      <a:rPr lang="de-DE" i="1">
+                        <a:latin typeface="Cambria Math" panose="02040503050406030204" pitchFamily="18" charset="0"/>
+                      </a:rPr>
+                      <m:t>n</m:t>
+                    </m:r>
+                    <m:r>
+                      <a:rPr lang="de-DE" i="1" smtClean="0">
+                        <a:latin typeface="Cambria Math" panose="02040503050406030204" pitchFamily="18" charset="0"/>
+                      </a:rPr>
+                      <m:t>=10</m:t>
+                    </m:r>
+                  </m:oMath>
+                </a14:m>
+                <a:endParaRPr lang="de-DE" dirty="0"/>
               </a:p>
             </p:txBody>
           </p:sp>

</xml_diff>

<commit_message>
Ported Evaluation and TimeSeries Interface to Kotlin
</commit_message>
<xml_diff>
--- a/doc/Programmier-Projekt-Praesi.pptx
+++ b/doc/Programmier-Projekt-Praesi.pptx
@@ -11,11 +11,12 @@
     <p:sldId id="267" r:id="rId5"/>
     <p:sldId id="260" r:id="rId6"/>
     <p:sldId id="262" r:id="rId7"/>
-    <p:sldId id="263" r:id="rId8"/>
-    <p:sldId id="261" r:id="rId9"/>
-    <p:sldId id="265" r:id="rId10"/>
-    <p:sldId id="264" r:id="rId11"/>
-    <p:sldId id="266" r:id="rId12"/>
+    <p:sldId id="268" r:id="rId8"/>
+    <p:sldId id="263" r:id="rId9"/>
+    <p:sldId id="261" r:id="rId10"/>
+    <p:sldId id="265" r:id="rId11"/>
+    <p:sldId id="264" r:id="rId12"/>
+    <p:sldId id="266" r:id="rId13"/>
   </p:sldIdLst>
   <p:sldSz cx="9144000" cy="6858000" type="screen4x3"/>
   <p:notesSz cx="6858000" cy="9144000"/>
@@ -3922,7 +3923,7 @@
           <a:p>
             <a:r>
               <a:rPr lang="de-DE" dirty="0"/>
-              <a:t>Visualisierungen</a:t>
+              <a:t>Testen</a:t>
             </a:r>
           </a:p>
         </p:txBody>
@@ -3943,22 +3944,60 @@
           <a:lstStyle/>
           <a:p>
             <a:pPr lvl="1"/>
+            <a:endParaRPr lang="de-DE" dirty="0"/>
+          </a:p>
+          <a:p>
+            <a:pPr lvl="1"/>
+            <a:endParaRPr lang="de-DE" dirty="0"/>
+          </a:p>
+          <a:p>
+            <a:pPr lvl="1"/>
+            <a:r>
+              <a:rPr lang="de-DE" sz="2800" dirty="0"/>
+              <a:t>Excel Datei → CSV → Test-Daten</a:t>
+            </a:r>
+            <a:endParaRPr lang="de-DE" dirty="0"/>
+          </a:p>
+          <a:p>
+            <a:pPr lvl="2">
+              <a:buFont typeface="Symbol" panose="05050102010706020507" pitchFamily="18" charset="2"/>
+              <a:buChar char="Þ"/>
+            </a:pPr>
             <a:r>
               <a:rPr lang="de-DE" dirty="0"/>
-              <a:t>TODO: Bild </a:t>
-            </a:r>
-            <a:r>
-              <a:rPr lang="de-DE"/>
-              <a:t>der Visualisierung</a:t>
-            </a:r>
-            <a:endParaRPr lang="de-DE" dirty="0"/>
+              <a:t> </a:t>
+            </a:r>
+            <a:r>
+              <a:rPr lang="de-DE" sz="2400" dirty="0"/>
+              <a:t>Entkoppelte Tests:</a:t>
+            </a:r>
+            <a:endParaRPr lang="de-DE" sz="2800" dirty="0"/>
+          </a:p>
+          <a:p>
+            <a:pPr lvl="3"/>
+            <a:r>
+              <a:rPr lang="de-DE" sz="2200" dirty="0" err="1"/>
+              <a:t>Uniformization</a:t>
+            </a:r>
+            <a:endParaRPr lang="de-DE" sz="2200" dirty="0"/>
+          </a:p>
+          <a:p>
+            <a:pPr lvl="3"/>
+            <a:r>
+              <a:rPr lang="de-DE" sz="2200" dirty="0"/>
+              <a:t>Evaluation</a:t>
+            </a:r>
+          </a:p>
+          <a:p>
+            <a:pPr lvl="1"/>
+            <a:endParaRPr lang="de-DE" sz="2800" dirty="0"/>
           </a:p>
         </p:txBody>
       </p:sp>
     </p:spTree>
     <p:extLst>
       <p:ext uri="{BB962C8B-B14F-4D97-AF65-F5344CB8AC3E}">
-        <p14:creationId xmlns:p14="http://schemas.microsoft.com/office/powerpoint/2010/main" val="750634630"/>
+        <p14:creationId xmlns:p14="http://schemas.microsoft.com/office/powerpoint/2010/main" val="2906383264"/>
       </p:ext>
     </p:extLst>
   </p:cSld>
@@ -4002,6 +4041,86 @@
           <a:p>
             <a:r>
               <a:rPr lang="de-DE" dirty="0"/>
+              <a:t>Visualisierungen</a:t>
+            </a:r>
+          </a:p>
+        </p:txBody>
+      </p:sp>
+      <p:sp>
+        <p:nvSpPr>
+          <p:cNvPr id="3" name="Inhaltsplatzhalter 2"/>
+          <p:cNvSpPr>
+            <a:spLocks noGrp="1"/>
+          </p:cNvSpPr>
+          <p:nvPr>
+            <p:ph idx="1"/>
+          </p:nvPr>
+        </p:nvSpPr>
+        <p:spPr/>
+        <p:txBody>
+          <a:bodyPr/>
+          <a:lstStyle/>
+          <a:p>
+            <a:pPr lvl="1"/>
+            <a:r>
+              <a:rPr lang="de-DE" dirty="0"/>
+              <a:t>TODO: Bild </a:t>
+            </a:r>
+            <a:r>
+              <a:rPr lang="de-DE"/>
+              <a:t>der Visualisierung</a:t>
+            </a:r>
+            <a:endParaRPr lang="de-DE" dirty="0"/>
+          </a:p>
+        </p:txBody>
+      </p:sp>
+    </p:spTree>
+    <p:extLst>
+      <p:ext uri="{BB962C8B-B14F-4D97-AF65-F5344CB8AC3E}">
+        <p14:creationId xmlns:p14="http://schemas.microsoft.com/office/powerpoint/2010/main" val="750634630"/>
+      </p:ext>
+    </p:extLst>
+  </p:cSld>
+  <p:clrMapOvr>
+    <a:masterClrMapping/>
+  </p:clrMapOvr>
+</p:sld>
+</file>
+
+<file path=ppt/slides/slide12.xml><?xml version="1.0" encoding="utf-8"?>
+<p:sld xmlns:a="http://schemas.openxmlformats.org/drawingml/2006/main" xmlns:r="http://schemas.openxmlformats.org/officeDocument/2006/relationships" xmlns:p="http://schemas.openxmlformats.org/presentationml/2006/main">
+  <p:cSld>
+    <p:spTree>
+      <p:nvGrpSpPr>
+        <p:cNvPr id="1" name=""/>
+        <p:cNvGrpSpPr/>
+        <p:nvPr/>
+      </p:nvGrpSpPr>
+      <p:grpSpPr>
+        <a:xfrm>
+          <a:off x="0" y="0"/>
+          <a:ext cx="0" cy="0"/>
+          <a:chOff x="0" y="0"/>
+          <a:chExt cx="0" cy="0"/>
+        </a:xfrm>
+      </p:grpSpPr>
+      <p:sp>
+        <p:nvSpPr>
+          <p:cNvPr id="2" name="Titel 1"/>
+          <p:cNvSpPr>
+            <a:spLocks noGrp="1"/>
+          </p:cNvSpPr>
+          <p:nvPr>
+            <p:ph type="title"/>
+          </p:nvPr>
+        </p:nvSpPr>
+        <p:spPr/>
+        <p:txBody>
+          <a:bodyPr/>
+          <a:lstStyle/>
+          <a:p>
+            <a:r>
+              <a:rPr lang="de-DE" dirty="0"/>
               <a:t>Begegnete Probleme</a:t>
             </a:r>
           </a:p>
@@ -4098,8 +4217,12 @@
           <a:p>
             <a:pPr lvl="1"/>
             <a:r>
+              <a:rPr lang="de-DE" dirty="0" err="1"/>
+              <a:t>Sequence</a:t>
+            </a:r>
+            <a:r>
               <a:rPr lang="de-DE" dirty="0"/>
-              <a:t>Streams um Formel für gesamten Baum aufzubauen</a:t>
+              <a:t> um Formel für gesamten Baum aufzubauen</a:t>
             </a:r>
           </a:p>
           <a:p>
@@ -4128,8 +4251,13 @@
             </a:pPr>
             <a:r>
               <a:rPr lang="de-DE" dirty="0"/>
-              <a:t> Pro Knoten Liste aus Stream</a:t>
-            </a:r>
+              <a:t> Pro Knoten Liste aus </a:t>
+            </a:r>
+            <a:r>
+              <a:rPr lang="de-DE" dirty="0" err="1"/>
+              <a:t>Sequence</a:t>
+            </a:r>
+            <a:endParaRPr lang="de-DE" dirty="0"/>
           </a:p>
           <a:p>
             <a:pPr lvl="2">
@@ -4481,16 +4609,18 @@
           <a:bodyPr/>
           <a:lstStyle/>
           <a:p>
-            <a:pPr lvl="1"/>
-            <a:endParaRPr lang="de-DE" dirty="0"/>
-          </a:p>
-          <a:p>
             <a:pPr marL="201168" lvl="1" indent="0">
               <a:buNone/>
             </a:pPr>
             <a:endParaRPr lang="de-DE" dirty="0"/>
           </a:p>
           <a:p>
+            <a:pPr marL="201168" lvl="1" indent="0">
+              <a:buNone/>
+            </a:pPr>
+            <a:endParaRPr lang="de-DE" dirty="0"/>
+          </a:p>
+          <a:p>
             <a:pPr lvl="1"/>
             <a:r>
               <a:rPr lang="de-DE" sz="2000" dirty="0"/>
@@ -4516,40 +4646,36 @@
               </a:rPr>
               <a:t>http://commons.apache.org/proper/commons-math/</a:t>
             </a:r>
-            <a:endParaRPr lang="de-DE" sz="2000" dirty="0"/>
+            <a:r>
+              <a:rPr lang="de-DE" sz="2000" dirty="0"/>
+              <a:t>	</a:t>
+            </a:r>
           </a:p>
           <a:p>
             <a:pPr lvl="1"/>
             <a:r>
-              <a:rPr lang="de-DE" sz="2000" dirty="0" err="1"/>
-              <a:t>StreamUtils</a:t>
-            </a:r>
-            <a:r>
               <a:rPr lang="de-DE" sz="2000" dirty="0"/>
-              <a:t>: </a:t>
+              <a:t>JSON-Parser: </a:t>
             </a:r>
             <a:r>
               <a:rPr lang="de-DE" sz="2000" dirty="0">
                 <a:hlinkClick r:id="rId4"/>
               </a:rPr>
-              <a:t>https://github.com/poetix/protonpack</a:t>
-            </a:r>
+              <a:t>https://sites.google.com/site/gson/</a:t>
+            </a:r>
+            <a:endParaRPr lang="de-DE" sz="2000" dirty="0"/>
+          </a:p>
+          <a:p>
+            <a:pPr lvl="1"/>
             <a:r>
               <a:rPr lang="de-DE" sz="2000" dirty="0"/>
-              <a:t>	</a:t>
-            </a:r>
-          </a:p>
-          <a:p>
-            <a:pPr lvl="1"/>
-            <a:r>
-              <a:rPr lang="de-DE" sz="2000" dirty="0"/>
-              <a:t>JSON-Parser: </a:t>
+              <a:t>CSV-Parser: </a:t>
             </a:r>
             <a:r>
               <a:rPr lang="de-DE" sz="2000" dirty="0">
                 <a:hlinkClick r:id="rId5"/>
               </a:rPr>
-              <a:t>https://sites.google.com/site/gson/</a:t>
+              <a:t>http://super-csv.github.io/super-csv/</a:t>
             </a:r>
             <a:endParaRPr lang="de-DE" sz="2000" dirty="0"/>
           </a:p>
@@ -4557,25 +4683,11 @@
             <a:pPr lvl="1"/>
             <a:r>
               <a:rPr lang="de-DE" sz="2000" dirty="0"/>
-              <a:t>CSV-Parser: </a:t>
+              <a:t>Graph: </a:t>
             </a:r>
             <a:r>
               <a:rPr lang="de-DE" sz="2000" dirty="0">
                 <a:hlinkClick r:id="rId6"/>
-              </a:rPr>
-              <a:t>http://super-csv.github.io/super-csv/</a:t>
-            </a:r>
-            <a:endParaRPr lang="de-DE" sz="2000" dirty="0"/>
-          </a:p>
-          <a:p>
-            <a:pPr lvl="1"/>
-            <a:r>
-              <a:rPr lang="de-DE" sz="2000" dirty="0"/>
-              <a:t>Graph: </a:t>
-            </a:r>
-            <a:r>
-              <a:rPr lang="de-DE" sz="2000" dirty="0">
-                <a:hlinkClick r:id="rId7"/>
               </a:rPr>
               <a:t>http://jgrapht.org/</a:t>
             </a:r>
@@ -5122,58 +5234,1203 @@
       </p:sp>
       <p:sp>
         <p:nvSpPr>
-          <p:cNvPr id="3" name="Inhaltsplatzhalter 2"/>
-          <p:cNvSpPr>
-            <a:spLocks noGrp="1"/>
+          <p:cNvPr id="5" name="Rectangle 2"/>
+          <p:cNvSpPr>
+            <a:spLocks noGrp="1" noChangeArrowheads="1"/>
           </p:cNvSpPr>
           <p:nvPr>
             <p:ph idx="1"/>
           </p:nvPr>
         </p:nvSpPr>
-        <p:spPr/>
+        <p:spPr bwMode="auto">
+          <a:xfrm>
+            <a:off x="55519" y="2545891"/>
+            <a:ext cx="9078681" cy="2546851"/>
+          </a:xfrm>
+          <a:prstGeom prst="rect">
+            <a:avLst/>
+          </a:prstGeom>
+          <a:solidFill>
+            <a:srgbClr val="FFFFFF"/>
+          </a:solidFill>
+          <a:ln>
+            <a:noFill/>
+          </a:ln>
+          <a:effectLst/>
+          <a:extLst>
+            <a:ext uri="{91240B29-F687-4F45-9708-019B960494DF}">
+              <a14:hiddenLine xmlns:a14="http://schemas.microsoft.com/office/drawing/2010/main" w="9525">
+                <a:solidFill>
+                  <a:schemeClr val="tx1"/>
+                </a:solidFill>
+                <a:miter lim="800000"/>
+                <a:headEnd/>
+                <a:tailEnd/>
+              </a14:hiddenLine>
+            </a:ext>
+            <a:ext uri="{AF507438-7753-43E0-B8FC-AC1667EBCBE1}">
+              <a14:hiddenEffects xmlns:a14="http://schemas.microsoft.com/office/drawing/2010/main">
+                <a:effectLst>
+                  <a:outerShdw dist="35921" dir="2700000" algn="ctr" rotWithShape="0">
+                    <a:schemeClr val="bg2"/>
+                  </a:outerShdw>
+                </a:effectLst>
+              </a14:hiddenEffects>
+            </a:ext>
+          </a:extLst>
+        </p:spPr>
         <p:txBody>
-          <a:bodyPr/>
+          <a:bodyPr vert="horz" wrap="square" lIns="91440" tIns="45720" rIns="91440" bIns="45720" numCol="1" anchor="ctr" anchorCtr="0" compatLnSpc="1">
+            <a:prstTxWarp prst="textNoShape">
+              <a:avLst/>
+            </a:prstTxWarp>
+            <a:spAutoFit/>
+          </a:bodyPr>
           <a:lstStyle/>
           <a:p>
-            <a:pPr marL="0" indent="0">
+            <a:pPr marL="0" marR="0" lvl="0" indent="0" algn="l" defTabSz="914400" rtl="0" eaLnBrk="0" fontAlgn="base" latinLnBrk="0" hangingPunct="0">
+              <a:lnSpc>
+                <a:spcPct val="100000"/>
+              </a:lnSpc>
+              <a:spcBef>
+                <a:spcPct val="0"/>
+              </a:spcBef>
+              <a:spcAft>
+                <a:spcPct val="0"/>
+              </a:spcAft>
+              <a:buClrTx/>
+              <a:buSzTx/>
+              <a:buFontTx/>
               <a:buNone/>
+              <a:tabLst/>
             </a:pPr>
-            <a:endParaRPr lang="de-DE" dirty="0"/>
-          </a:p>
-          <a:p>
-            <a:pPr marL="0" indent="0">
-              <a:buNone/>
-            </a:pPr>
-            <a:endParaRPr lang="de-DE" dirty="0"/>
-          </a:p>
-          <a:p>
-            <a:pPr marL="0" indent="0">
-              <a:buNone/>
-            </a:pPr>
-            <a:r>
-              <a:rPr lang="de-DE" dirty="0"/>
-              <a:t>TODO: </a:t>
-            </a:r>
-            <a:r>
-              <a:rPr lang="de-DE" dirty="0" err="1"/>
-              <a:t>Kotlin</a:t>
-            </a:r>
-            <a:r>
-              <a:rPr lang="de-DE" dirty="0"/>
-              <a:t> Code der Formel </a:t>
-            </a:r>
-            <a:r>
-              <a:rPr lang="de-DE" dirty="0" err="1"/>
-              <a:t>formulaFromChildes</a:t>
-            </a:r>
-            <a:endParaRPr lang="de-DE" dirty="0"/>
+            <a:r>
+              <a:rPr kumimoji="0" lang="de-DE" altLang="de-DE" sz="1450" b="1" i="0" u="none" strike="noStrike" cap="none" normalizeH="0" baseline="0" dirty="0" err="1">
+                <a:ln>
+                  <a:noFill/>
+                </a:ln>
+                <a:solidFill>
+                  <a:srgbClr val="000080"/>
+                </a:solidFill>
+                <a:effectLst/>
+                <a:latin typeface="Courier New" panose="02070309020205020404" pitchFamily="49" charset="0"/>
+                <a:cs typeface="Courier New" panose="02070309020205020404" pitchFamily="49" charset="0"/>
+              </a:rPr>
+              <a:t>val</a:t>
+            </a:r>
+            <a:r>
+              <a:rPr kumimoji="0" lang="de-DE" altLang="de-DE" sz="1450" b="1" i="0" u="none" strike="noStrike" cap="none" normalizeH="0" baseline="0" dirty="0">
+                <a:ln>
+                  <a:noFill/>
+                </a:ln>
+                <a:solidFill>
+                  <a:srgbClr val="000080"/>
+                </a:solidFill>
+                <a:effectLst/>
+                <a:latin typeface="Courier New" panose="02070309020205020404" pitchFamily="49" charset="0"/>
+                <a:cs typeface="Courier New" panose="02070309020205020404" pitchFamily="49" charset="0"/>
+              </a:rPr>
+              <a:t> </a:t>
+            </a:r>
+            <a:r>
+              <a:rPr kumimoji="0" lang="de-DE" altLang="de-DE" sz="1450" b="0" i="0" u="none" strike="noStrike" cap="none" normalizeH="0" baseline="0" dirty="0" err="1">
+                <a:ln>
+                  <a:noFill/>
+                </a:ln>
+                <a:solidFill>
+                  <a:srgbClr val="000000"/>
+                </a:solidFill>
+                <a:effectLst/>
+                <a:latin typeface="Courier New" panose="02070309020205020404" pitchFamily="49" charset="0"/>
+                <a:cs typeface="Courier New" panose="02070309020205020404" pitchFamily="49" charset="0"/>
+              </a:rPr>
+              <a:t>current</a:t>
+            </a:r>
+            <a:r>
+              <a:rPr kumimoji="0" lang="de-DE" altLang="de-DE" sz="1450" b="0" i="0" u="none" strike="noStrike" cap="none" normalizeH="0" baseline="0" dirty="0">
+                <a:ln>
+                  <a:noFill/>
+                </a:ln>
+                <a:solidFill>
+                  <a:srgbClr val="000000"/>
+                </a:solidFill>
+                <a:effectLst/>
+                <a:latin typeface="Courier New" panose="02070309020205020404" pitchFamily="49" charset="0"/>
+                <a:cs typeface="Courier New" panose="02070309020205020404" pitchFamily="49" charset="0"/>
+              </a:rPr>
+              <a:t> = </a:t>
+            </a:r>
+            <a:r>
+              <a:rPr kumimoji="0" lang="de-DE" altLang="de-DE" sz="1450" b="1" i="0" u="none" strike="noStrike" cap="none" normalizeH="0" baseline="0" dirty="0" err="1">
+                <a:ln>
+                  <a:noFill/>
+                </a:ln>
+                <a:solidFill>
+                  <a:srgbClr val="660E7A"/>
+                </a:solidFill>
+                <a:effectLst/>
+                <a:latin typeface="Courier New" panose="02070309020205020404" pitchFamily="49" charset="0"/>
+                <a:cs typeface="Courier New" panose="02070309020205020404" pitchFamily="49" charset="0"/>
+              </a:rPr>
+              <a:t>timeSeries</a:t>
+            </a:r>
+            <a:r>
+              <a:rPr kumimoji="0" lang="de-DE" altLang="de-DE" sz="1450" b="0" i="0" u="none" strike="noStrike" cap="none" normalizeH="0" baseline="0" dirty="0" err="1">
+                <a:ln>
+                  <a:noFill/>
+                </a:ln>
+                <a:solidFill>
+                  <a:srgbClr val="000000"/>
+                </a:solidFill>
+                <a:effectLst/>
+                <a:latin typeface="Courier New" panose="02070309020205020404" pitchFamily="49" charset="0"/>
+                <a:cs typeface="Courier New" panose="02070309020205020404" pitchFamily="49" charset="0"/>
+              </a:rPr>
+              <a:t>.getProbabilitySeries</a:t>
+            </a:r>
+            <a:r>
+              <a:rPr kumimoji="0" lang="de-DE" altLang="de-DE" sz="1450" b="0" i="0" u="none" strike="noStrike" cap="none" normalizeH="0" baseline="0" dirty="0">
+                <a:ln>
+                  <a:noFill/>
+                </a:ln>
+                <a:solidFill>
+                  <a:srgbClr val="000000"/>
+                </a:solidFill>
+                <a:effectLst/>
+                <a:latin typeface="Courier New" panose="02070309020205020404" pitchFamily="49" charset="0"/>
+                <a:cs typeface="Courier New" panose="02070309020205020404" pitchFamily="49" charset="0"/>
+              </a:rPr>
+              <a:t>(</a:t>
+            </a:r>
+            <a:r>
+              <a:rPr kumimoji="0" lang="de-DE" altLang="de-DE" sz="1450" b="0" i="0" u="none" strike="noStrike" cap="none" normalizeH="0" baseline="0" dirty="0" err="1">
+                <a:ln>
+                  <a:noFill/>
+                </a:ln>
+                <a:solidFill>
+                  <a:srgbClr val="000000"/>
+                </a:solidFill>
+                <a:effectLst/>
+                <a:latin typeface="Courier New" panose="02070309020205020404" pitchFamily="49" charset="0"/>
+                <a:cs typeface="Courier New" panose="02070309020205020404" pitchFamily="49" charset="0"/>
+              </a:rPr>
+              <a:t>node.</a:t>
+            </a:r>
+            <a:r>
+              <a:rPr kumimoji="0" lang="de-DE" altLang="de-DE" sz="1450" b="1" i="0" u="none" strike="noStrike" cap="none" normalizeH="0" baseline="0" dirty="0" err="1">
+                <a:ln>
+                  <a:noFill/>
+                </a:ln>
+                <a:solidFill>
+                  <a:srgbClr val="660E7A"/>
+                </a:solidFill>
+                <a:effectLst/>
+                <a:latin typeface="Courier New" panose="02070309020205020404" pitchFamily="49" charset="0"/>
+                <a:cs typeface="Courier New" panose="02070309020205020404" pitchFamily="49" charset="0"/>
+              </a:rPr>
+              <a:t>varID</a:t>
+            </a:r>
+            <a:r>
+              <a:rPr kumimoji="0" lang="de-DE" altLang="de-DE" sz="1450" b="0" i="0" u="none" strike="noStrike" cap="none" normalizeH="0" baseline="0" dirty="0">
+                <a:ln>
+                  <a:noFill/>
+                </a:ln>
+                <a:solidFill>
+                  <a:srgbClr val="000000"/>
+                </a:solidFill>
+                <a:effectLst/>
+                <a:latin typeface="Courier New" panose="02070309020205020404" pitchFamily="49" charset="0"/>
+                <a:cs typeface="Courier New" panose="02070309020205020404" pitchFamily="49" charset="0"/>
+              </a:rPr>
+              <a:t>).</a:t>
+            </a:r>
+            <a:r>
+              <a:rPr kumimoji="0" lang="de-DE" altLang="de-DE" sz="1450" b="0" i="1" u="none" strike="noStrike" cap="none" normalizeH="0" baseline="0" dirty="0" err="1">
+                <a:ln>
+                  <a:noFill/>
+                </a:ln>
+                <a:solidFill>
+                  <a:srgbClr val="000000"/>
+                </a:solidFill>
+                <a:effectLst/>
+                <a:latin typeface="Courier New" panose="02070309020205020404" pitchFamily="49" charset="0"/>
+                <a:cs typeface="Courier New" panose="02070309020205020404" pitchFamily="49" charset="0"/>
+              </a:rPr>
+              <a:t>asSequence</a:t>
+            </a:r>
+            <a:r>
+              <a:rPr kumimoji="0" lang="de-DE" altLang="de-DE" sz="1450" b="0" i="0" u="none" strike="noStrike" cap="none" normalizeH="0" baseline="0" dirty="0">
+                <a:ln>
+                  <a:noFill/>
+                </a:ln>
+                <a:solidFill>
+                  <a:srgbClr val="000000"/>
+                </a:solidFill>
+                <a:effectLst/>
+                <a:latin typeface="Courier New" panose="02070309020205020404" pitchFamily="49" charset="0"/>
+                <a:cs typeface="Courier New" panose="02070309020205020404" pitchFamily="49" charset="0"/>
+              </a:rPr>
+              <a:t>()</a:t>
+            </a:r>
+            <a:br>
+              <a:rPr kumimoji="0" lang="de-DE" altLang="de-DE" sz="1450" b="0" i="0" u="none" strike="noStrike" cap="none" normalizeH="0" baseline="0" dirty="0">
+                <a:ln>
+                  <a:noFill/>
+                </a:ln>
+                <a:solidFill>
+                  <a:srgbClr val="000000"/>
+                </a:solidFill>
+                <a:effectLst/>
+                <a:latin typeface="Courier New" panose="02070309020205020404" pitchFamily="49" charset="0"/>
+                <a:cs typeface="Courier New" panose="02070309020205020404" pitchFamily="49" charset="0"/>
+              </a:rPr>
+            </a:br>
+            <a:br>
+              <a:rPr kumimoji="0" lang="de-DE" altLang="de-DE" sz="1450" b="0" i="0" u="none" strike="noStrike" cap="none" normalizeH="0" baseline="0" dirty="0">
+                <a:ln>
+                  <a:noFill/>
+                </a:ln>
+                <a:solidFill>
+                  <a:srgbClr val="000000"/>
+                </a:solidFill>
+                <a:effectLst/>
+                <a:latin typeface="Courier New" panose="02070309020205020404" pitchFamily="49" charset="0"/>
+                <a:cs typeface="Courier New" panose="02070309020205020404" pitchFamily="49" charset="0"/>
+              </a:rPr>
+            </a:br>
+            <a:r>
+              <a:rPr kumimoji="0" lang="de-DE" altLang="de-DE" sz="1450" b="1" i="0" u="none" strike="noStrike" cap="none" normalizeH="0" baseline="0" dirty="0" err="1">
+                <a:ln>
+                  <a:noFill/>
+                </a:ln>
+                <a:solidFill>
+                  <a:srgbClr val="000080"/>
+                </a:solidFill>
+                <a:effectLst/>
+                <a:latin typeface="Courier New" panose="02070309020205020404" pitchFamily="49" charset="0"/>
+                <a:cs typeface="Courier New" panose="02070309020205020404" pitchFamily="49" charset="0"/>
+              </a:rPr>
+              <a:t>val</a:t>
+            </a:r>
+            <a:r>
+              <a:rPr kumimoji="0" lang="de-DE" altLang="de-DE" sz="1450" b="1" i="0" u="none" strike="noStrike" cap="none" normalizeH="0" baseline="0" dirty="0">
+                <a:ln>
+                  <a:noFill/>
+                </a:ln>
+                <a:solidFill>
+                  <a:srgbClr val="000080"/>
+                </a:solidFill>
+                <a:effectLst/>
+                <a:latin typeface="Courier New" panose="02070309020205020404" pitchFamily="49" charset="0"/>
+                <a:cs typeface="Courier New" panose="02070309020205020404" pitchFamily="49" charset="0"/>
+              </a:rPr>
+              <a:t> </a:t>
+            </a:r>
+            <a:r>
+              <a:rPr kumimoji="0" lang="de-DE" altLang="de-DE" sz="1450" b="0" i="0" u="none" strike="noStrike" cap="none" normalizeH="0" baseline="0" dirty="0">
+                <a:ln>
+                  <a:noFill/>
+                </a:ln>
+                <a:solidFill>
+                  <a:srgbClr val="000000"/>
+                </a:solidFill>
+                <a:effectLst/>
+                <a:latin typeface="Courier New" panose="02070309020205020404" pitchFamily="49" charset="0"/>
+                <a:cs typeface="Courier New" panose="02070309020205020404" pitchFamily="49" charset="0"/>
+              </a:rPr>
+              <a:t>g2 = </a:t>
+            </a:r>
+            <a:r>
+              <a:rPr kumimoji="0" lang="de-DE" altLang="de-DE" sz="1450" b="0" i="0" u="none" strike="noStrike" cap="none" normalizeH="0" baseline="0" dirty="0" err="1">
+                <a:ln>
+                  <a:noFill/>
+                </a:ln>
+                <a:solidFill>
+                  <a:srgbClr val="000000"/>
+                </a:solidFill>
+                <a:effectLst/>
+                <a:latin typeface="Courier New" panose="02070309020205020404" pitchFamily="49" charset="0"/>
+                <a:cs typeface="Courier New" panose="02070309020205020404" pitchFamily="49" charset="0"/>
+              </a:rPr>
+              <a:t>constructFormulaTopDown</a:t>
+            </a:r>
+            <a:r>
+              <a:rPr kumimoji="0" lang="de-DE" altLang="de-DE" sz="1450" b="0" i="0" u="none" strike="noStrike" cap="none" normalizeH="0" baseline="0" dirty="0">
+                <a:ln>
+                  <a:noFill/>
+                </a:ln>
+                <a:solidFill>
+                  <a:srgbClr val="000000"/>
+                </a:solidFill>
+                <a:effectLst/>
+                <a:latin typeface="Courier New" panose="02070309020205020404" pitchFamily="49" charset="0"/>
+                <a:cs typeface="Courier New" panose="02070309020205020404" pitchFamily="49" charset="0"/>
+              </a:rPr>
+              <a:t>(</a:t>
+            </a:r>
+            <a:r>
+              <a:rPr kumimoji="0" lang="de-DE" altLang="de-DE" sz="1450" b="0" i="0" u="none" strike="noStrike" cap="none" normalizeH="0" baseline="0" dirty="0" err="1">
+                <a:ln>
+                  <a:noFill/>
+                </a:ln>
+                <a:solidFill>
+                  <a:srgbClr val="000000"/>
+                </a:solidFill>
+                <a:effectLst/>
+                <a:latin typeface="Courier New" panose="02070309020205020404" pitchFamily="49" charset="0"/>
+                <a:cs typeface="Courier New" panose="02070309020205020404" pitchFamily="49" charset="0"/>
+              </a:rPr>
+              <a:t>node.</a:t>
+            </a:r>
+            <a:r>
+              <a:rPr kumimoji="0" lang="de-DE" altLang="de-DE" sz="1450" b="1" i="0" u="none" strike="noStrike" cap="none" normalizeH="0" baseline="0" dirty="0" err="1">
+                <a:ln>
+                  <a:noFill/>
+                </a:ln>
+                <a:solidFill>
+                  <a:srgbClr val="660E7A"/>
+                </a:solidFill>
+                <a:effectLst/>
+                <a:latin typeface="Courier New" panose="02070309020205020404" pitchFamily="49" charset="0"/>
+                <a:cs typeface="Courier New" panose="02070309020205020404" pitchFamily="49" charset="0"/>
+              </a:rPr>
+              <a:t>lowChild</a:t>
+            </a:r>
+            <a:r>
+              <a:rPr kumimoji="0" lang="de-DE" altLang="de-DE" sz="1450" b="0" i="0" u="none" strike="noStrike" cap="none" normalizeH="0" baseline="0" dirty="0">
+                <a:ln>
+                  <a:noFill/>
+                </a:ln>
+                <a:solidFill>
+                  <a:srgbClr val="000000"/>
+                </a:solidFill>
+                <a:effectLst/>
+                <a:latin typeface="Courier New" panose="02070309020205020404" pitchFamily="49" charset="0"/>
+                <a:cs typeface="Courier New" panose="02070309020205020404" pitchFamily="49" charset="0"/>
+              </a:rPr>
+              <a:t>)</a:t>
+            </a:r>
+            <a:br>
+              <a:rPr kumimoji="0" lang="de-DE" altLang="de-DE" sz="1450" b="0" i="0" u="none" strike="noStrike" cap="none" normalizeH="0" baseline="0" dirty="0">
+                <a:ln>
+                  <a:noFill/>
+                </a:ln>
+                <a:solidFill>
+                  <a:srgbClr val="000000"/>
+                </a:solidFill>
+                <a:effectLst/>
+                <a:latin typeface="Courier New" panose="02070309020205020404" pitchFamily="49" charset="0"/>
+                <a:cs typeface="Courier New" panose="02070309020205020404" pitchFamily="49" charset="0"/>
+              </a:rPr>
+            </a:br>
+            <a:r>
+              <a:rPr kumimoji="0" lang="de-DE" altLang="de-DE" sz="1450" b="1" i="0" u="none" strike="noStrike" cap="none" normalizeH="0" baseline="0" dirty="0" err="1">
+                <a:ln>
+                  <a:noFill/>
+                </a:ln>
+                <a:solidFill>
+                  <a:srgbClr val="000080"/>
+                </a:solidFill>
+                <a:effectLst/>
+                <a:latin typeface="Courier New" panose="02070309020205020404" pitchFamily="49" charset="0"/>
+                <a:cs typeface="Courier New" panose="02070309020205020404" pitchFamily="49" charset="0"/>
+              </a:rPr>
+              <a:t>val</a:t>
+            </a:r>
+            <a:r>
+              <a:rPr kumimoji="0" lang="de-DE" altLang="de-DE" sz="1450" b="1" i="0" u="none" strike="noStrike" cap="none" normalizeH="0" baseline="0" dirty="0">
+                <a:ln>
+                  <a:noFill/>
+                </a:ln>
+                <a:solidFill>
+                  <a:srgbClr val="000080"/>
+                </a:solidFill>
+                <a:effectLst/>
+                <a:latin typeface="Courier New" panose="02070309020205020404" pitchFamily="49" charset="0"/>
+                <a:cs typeface="Courier New" panose="02070309020205020404" pitchFamily="49" charset="0"/>
+              </a:rPr>
+              <a:t> </a:t>
+            </a:r>
+            <a:r>
+              <a:rPr kumimoji="0" lang="de-DE" altLang="de-DE" sz="1450" b="0" i="0" u="none" strike="noStrike" cap="none" normalizeH="0" baseline="0" dirty="0">
+                <a:ln>
+                  <a:noFill/>
+                </a:ln>
+                <a:solidFill>
+                  <a:srgbClr val="000000"/>
+                </a:solidFill>
+                <a:effectLst/>
+                <a:latin typeface="Courier New" panose="02070309020205020404" pitchFamily="49" charset="0"/>
+                <a:cs typeface="Courier New" panose="02070309020205020404" pitchFamily="49" charset="0"/>
+              </a:rPr>
+              <a:t>g1_x1 = </a:t>
+            </a:r>
+            <a:r>
+              <a:rPr kumimoji="0" lang="de-DE" altLang="de-DE" sz="1450" b="0" i="0" u="none" strike="noStrike" cap="none" normalizeH="0" baseline="0" dirty="0" err="1">
+                <a:ln>
+                  <a:noFill/>
+                </a:ln>
+                <a:solidFill>
+                  <a:srgbClr val="000000"/>
+                </a:solidFill>
+                <a:effectLst/>
+                <a:latin typeface="Courier New" panose="02070309020205020404" pitchFamily="49" charset="0"/>
+                <a:cs typeface="Courier New" panose="02070309020205020404" pitchFamily="49" charset="0"/>
+              </a:rPr>
+              <a:t>getHigh</a:t>
+            </a:r>
+            <a:r>
+              <a:rPr kumimoji="0" lang="de-DE" altLang="de-DE" sz="1450" b="0" i="0" u="none" strike="noStrike" cap="none" normalizeH="0" baseline="0" dirty="0">
+                <a:ln>
+                  <a:noFill/>
+                </a:ln>
+                <a:solidFill>
+                  <a:srgbClr val="000000"/>
+                </a:solidFill>
+                <a:effectLst/>
+                <a:latin typeface="Courier New" panose="02070309020205020404" pitchFamily="49" charset="0"/>
+                <a:cs typeface="Courier New" panose="02070309020205020404" pitchFamily="49" charset="0"/>
+              </a:rPr>
+              <a:t>(</a:t>
+            </a:r>
+            <a:r>
+              <a:rPr kumimoji="0" lang="de-DE" altLang="de-DE" sz="1450" b="0" i="0" u="none" strike="noStrike" cap="none" normalizeH="0" baseline="0" dirty="0" err="1">
+                <a:ln>
+                  <a:noFill/>
+                </a:ln>
+                <a:solidFill>
+                  <a:srgbClr val="000000"/>
+                </a:solidFill>
+                <a:effectLst/>
+                <a:latin typeface="Courier New" panose="02070309020205020404" pitchFamily="49" charset="0"/>
+                <a:cs typeface="Courier New" panose="02070309020205020404" pitchFamily="49" charset="0"/>
+              </a:rPr>
+              <a:t>node</a:t>
+            </a:r>
+            <a:r>
+              <a:rPr kumimoji="0" lang="de-DE" altLang="de-DE" sz="1450" b="0" i="0" u="none" strike="noStrike" cap="none" normalizeH="0" baseline="0" dirty="0">
+                <a:ln>
+                  <a:noFill/>
+                </a:ln>
+                <a:solidFill>
+                  <a:srgbClr val="000000"/>
+                </a:solidFill>
+                <a:effectLst/>
+                <a:latin typeface="Courier New" panose="02070309020205020404" pitchFamily="49" charset="0"/>
+                <a:cs typeface="Courier New" panose="02070309020205020404" pitchFamily="49" charset="0"/>
+              </a:rPr>
+              <a:t>)</a:t>
+            </a:r>
+            <a:br>
+              <a:rPr kumimoji="0" lang="de-DE" altLang="de-DE" sz="1450" b="0" i="0" u="none" strike="noStrike" cap="none" normalizeH="0" baseline="0" dirty="0">
+                <a:ln>
+                  <a:noFill/>
+                </a:ln>
+                <a:solidFill>
+                  <a:srgbClr val="000000"/>
+                </a:solidFill>
+                <a:effectLst/>
+                <a:latin typeface="Courier New" panose="02070309020205020404" pitchFamily="49" charset="0"/>
+                <a:cs typeface="Courier New" panose="02070309020205020404" pitchFamily="49" charset="0"/>
+              </a:rPr>
+            </a:br>
+            <a:br>
+              <a:rPr kumimoji="0" lang="de-DE" altLang="de-DE" sz="1450" b="0" i="0" u="none" strike="noStrike" cap="none" normalizeH="0" baseline="0" dirty="0">
+                <a:ln>
+                  <a:noFill/>
+                </a:ln>
+                <a:solidFill>
+                  <a:srgbClr val="000000"/>
+                </a:solidFill>
+                <a:effectLst/>
+                <a:latin typeface="Courier New" panose="02070309020205020404" pitchFamily="49" charset="0"/>
+                <a:cs typeface="Courier New" panose="02070309020205020404" pitchFamily="49" charset="0"/>
+              </a:rPr>
+            </a:br>
+            <a:r>
+              <a:rPr kumimoji="0" lang="de-DE" altLang="de-DE" sz="1450" b="1" i="0" u="none" strike="noStrike" cap="none" normalizeH="0" baseline="0" dirty="0" err="1">
+                <a:ln>
+                  <a:noFill/>
+                </a:ln>
+                <a:solidFill>
+                  <a:srgbClr val="000080"/>
+                </a:solidFill>
+                <a:effectLst/>
+                <a:latin typeface="Courier New" panose="02070309020205020404" pitchFamily="49" charset="0"/>
+                <a:cs typeface="Courier New" panose="02070309020205020404" pitchFamily="49" charset="0"/>
+              </a:rPr>
+              <a:t>if</a:t>
+            </a:r>
+            <a:r>
+              <a:rPr kumimoji="0" lang="de-DE" altLang="de-DE" sz="1450" b="1" i="0" u="none" strike="noStrike" cap="none" normalizeH="0" baseline="0" dirty="0">
+                <a:ln>
+                  <a:noFill/>
+                </a:ln>
+                <a:solidFill>
+                  <a:srgbClr val="000080"/>
+                </a:solidFill>
+                <a:effectLst/>
+                <a:latin typeface="Courier New" panose="02070309020205020404" pitchFamily="49" charset="0"/>
+                <a:cs typeface="Courier New" panose="02070309020205020404" pitchFamily="49" charset="0"/>
+              </a:rPr>
+              <a:t> </a:t>
+            </a:r>
+            <a:r>
+              <a:rPr kumimoji="0" lang="de-DE" altLang="de-DE" sz="1450" b="0" i="0" u="none" strike="noStrike" cap="none" normalizeH="0" baseline="0" dirty="0">
+                <a:ln>
+                  <a:noFill/>
+                </a:ln>
+                <a:solidFill>
+                  <a:srgbClr val="000000"/>
+                </a:solidFill>
+                <a:effectLst/>
+                <a:latin typeface="Courier New" panose="02070309020205020404" pitchFamily="49" charset="0"/>
+                <a:cs typeface="Courier New" panose="02070309020205020404" pitchFamily="49" charset="0"/>
+              </a:rPr>
+              <a:t>(</a:t>
+            </a:r>
+            <a:r>
+              <a:rPr kumimoji="0" lang="de-DE" altLang="de-DE" sz="1450" b="0" i="0" u="none" strike="noStrike" cap="none" normalizeH="0" baseline="0" dirty="0" err="1">
+                <a:ln>
+                  <a:noFill/>
+                </a:ln>
+                <a:solidFill>
+                  <a:srgbClr val="000000"/>
+                </a:solidFill>
+                <a:effectLst/>
+                <a:latin typeface="Courier New" panose="02070309020205020404" pitchFamily="49" charset="0"/>
+                <a:cs typeface="Courier New" panose="02070309020205020404" pitchFamily="49" charset="0"/>
+              </a:rPr>
+              <a:t>node.</a:t>
+            </a:r>
+            <a:r>
+              <a:rPr kumimoji="0" lang="de-DE" altLang="de-DE" sz="1450" b="1" i="0" u="none" strike="noStrike" cap="none" normalizeH="0" baseline="0" dirty="0" err="1">
+                <a:ln>
+                  <a:noFill/>
+                </a:ln>
+                <a:solidFill>
+                  <a:srgbClr val="660E7A"/>
+                </a:solidFill>
+                <a:effectLst/>
+                <a:latin typeface="Courier New" panose="02070309020205020404" pitchFamily="49" charset="0"/>
+                <a:cs typeface="Courier New" panose="02070309020205020404" pitchFamily="49" charset="0"/>
+              </a:rPr>
+              <a:t>isLowStateDependent</a:t>
+            </a:r>
+            <a:r>
+              <a:rPr kumimoji="0" lang="de-DE" altLang="de-DE" sz="1450" b="0" i="0" u="none" strike="noStrike" cap="none" normalizeH="0" baseline="0" dirty="0">
+                <a:ln>
+                  <a:noFill/>
+                </a:ln>
+                <a:solidFill>
+                  <a:srgbClr val="000000"/>
+                </a:solidFill>
+                <a:effectLst/>
+                <a:latin typeface="Courier New" panose="02070309020205020404" pitchFamily="49" charset="0"/>
+                <a:cs typeface="Courier New" panose="02070309020205020404" pitchFamily="49" charset="0"/>
+              </a:rPr>
+              <a:t>) {</a:t>
+            </a:r>
+            <a:br>
+              <a:rPr kumimoji="0" lang="de-DE" altLang="de-DE" sz="1450" b="0" i="0" u="none" strike="noStrike" cap="none" normalizeH="0" baseline="0" dirty="0">
+                <a:ln>
+                  <a:noFill/>
+                </a:ln>
+                <a:solidFill>
+                  <a:srgbClr val="000000"/>
+                </a:solidFill>
+                <a:effectLst/>
+                <a:latin typeface="Courier New" panose="02070309020205020404" pitchFamily="49" charset="0"/>
+                <a:cs typeface="Courier New" panose="02070309020205020404" pitchFamily="49" charset="0"/>
+              </a:rPr>
+            </a:br>
+            <a:r>
+              <a:rPr kumimoji="0" lang="de-DE" altLang="de-DE" sz="1450" b="0" i="0" u="none" strike="noStrike" cap="none" normalizeH="0" baseline="0" dirty="0">
+                <a:ln>
+                  <a:noFill/>
+                </a:ln>
+                <a:solidFill>
+                  <a:srgbClr val="000000"/>
+                </a:solidFill>
+                <a:effectLst/>
+                <a:latin typeface="Courier New" panose="02070309020205020404" pitchFamily="49" charset="0"/>
+                <a:cs typeface="Courier New" panose="02070309020205020404" pitchFamily="49" charset="0"/>
+              </a:rPr>
+              <a:t>    </a:t>
+            </a:r>
+            <a:r>
+              <a:rPr kumimoji="0" lang="de-DE" altLang="de-DE" sz="1450" b="1" i="0" u="none" strike="noStrike" cap="none" normalizeH="0" baseline="0" dirty="0" err="1">
+                <a:ln>
+                  <a:noFill/>
+                </a:ln>
+                <a:solidFill>
+                  <a:srgbClr val="000080"/>
+                </a:solidFill>
+                <a:effectLst/>
+                <a:latin typeface="Courier New" panose="02070309020205020404" pitchFamily="49" charset="0"/>
+                <a:cs typeface="Courier New" panose="02070309020205020404" pitchFamily="49" charset="0"/>
+              </a:rPr>
+              <a:t>val</a:t>
+            </a:r>
+            <a:r>
+              <a:rPr kumimoji="0" lang="de-DE" altLang="de-DE" sz="1450" b="1" i="0" u="none" strike="noStrike" cap="none" normalizeH="0" baseline="0" dirty="0">
+                <a:ln>
+                  <a:noFill/>
+                </a:ln>
+                <a:solidFill>
+                  <a:srgbClr val="000080"/>
+                </a:solidFill>
+                <a:effectLst/>
+                <a:latin typeface="Courier New" panose="02070309020205020404" pitchFamily="49" charset="0"/>
+                <a:cs typeface="Courier New" panose="02070309020205020404" pitchFamily="49" charset="0"/>
+              </a:rPr>
+              <a:t> </a:t>
+            </a:r>
+            <a:r>
+              <a:rPr kumimoji="0" lang="de-DE" altLang="de-DE" sz="1450" b="0" i="0" u="none" strike="noStrike" cap="none" normalizeH="0" baseline="0" dirty="0">
+                <a:ln>
+                  <a:noFill/>
+                </a:ln>
+                <a:solidFill>
+                  <a:srgbClr val="000000"/>
+                </a:solidFill>
+                <a:effectLst/>
+                <a:latin typeface="Courier New" panose="02070309020205020404" pitchFamily="49" charset="0"/>
+                <a:cs typeface="Courier New" panose="02070309020205020404" pitchFamily="49" charset="0"/>
+              </a:rPr>
+              <a:t>h2_x1 = </a:t>
+            </a:r>
+            <a:r>
+              <a:rPr kumimoji="0" lang="de-DE" altLang="de-DE" sz="1450" b="0" i="0" u="none" strike="noStrike" cap="none" normalizeH="0" baseline="0" dirty="0" err="1">
+                <a:ln>
+                  <a:noFill/>
+                </a:ln>
+                <a:solidFill>
+                  <a:srgbClr val="000000"/>
+                </a:solidFill>
+                <a:effectLst/>
+                <a:latin typeface="Courier New" panose="02070309020205020404" pitchFamily="49" charset="0"/>
+                <a:cs typeface="Courier New" panose="02070309020205020404" pitchFamily="49" charset="0"/>
+              </a:rPr>
+              <a:t>getDependentLow</a:t>
+            </a:r>
+            <a:r>
+              <a:rPr kumimoji="0" lang="de-DE" altLang="de-DE" sz="1450" b="0" i="0" u="none" strike="noStrike" cap="none" normalizeH="0" baseline="0" dirty="0">
+                <a:ln>
+                  <a:noFill/>
+                </a:ln>
+                <a:solidFill>
+                  <a:srgbClr val="000000"/>
+                </a:solidFill>
+                <a:effectLst/>
+                <a:latin typeface="Courier New" panose="02070309020205020404" pitchFamily="49" charset="0"/>
+                <a:cs typeface="Courier New" panose="02070309020205020404" pitchFamily="49" charset="0"/>
+              </a:rPr>
+              <a:t>(</a:t>
+            </a:r>
+            <a:r>
+              <a:rPr kumimoji="0" lang="de-DE" altLang="de-DE" sz="1450" b="0" i="0" u="none" strike="noStrike" cap="none" normalizeH="0" baseline="0" dirty="0" err="1">
+                <a:ln>
+                  <a:noFill/>
+                </a:ln>
+                <a:solidFill>
+                  <a:srgbClr val="000000"/>
+                </a:solidFill>
+                <a:effectLst/>
+                <a:latin typeface="Courier New" panose="02070309020205020404" pitchFamily="49" charset="0"/>
+                <a:cs typeface="Courier New" panose="02070309020205020404" pitchFamily="49" charset="0"/>
+              </a:rPr>
+              <a:t>node</a:t>
+            </a:r>
+            <a:r>
+              <a:rPr kumimoji="0" lang="de-DE" altLang="de-DE" sz="1450" b="0" i="0" u="none" strike="noStrike" cap="none" normalizeH="0" baseline="0" dirty="0">
+                <a:ln>
+                  <a:noFill/>
+                </a:ln>
+                <a:solidFill>
+                  <a:srgbClr val="000000"/>
+                </a:solidFill>
+                <a:effectLst/>
+                <a:latin typeface="Courier New" panose="02070309020205020404" pitchFamily="49" charset="0"/>
+                <a:cs typeface="Courier New" panose="02070309020205020404" pitchFamily="49" charset="0"/>
+              </a:rPr>
+              <a:t>)</a:t>
+            </a:r>
+            <a:br>
+              <a:rPr kumimoji="0" lang="de-DE" altLang="de-DE" sz="1450" b="0" i="0" u="none" strike="noStrike" cap="none" normalizeH="0" baseline="0" dirty="0">
+                <a:ln>
+                  <a:noFill/>
+                </a:ln>
+                <a:solidFill>
+                  <a:srgbClr val="000000"/>
+                </a:solidFill>
+                <a:effectLst/>
+                <a:latin typeface="Courier New" panose="02070309020205020404" pitchFamily="49" charset="0"/>
+                <a:cs typeface="Courier New" panose="02070309020205020404" pitchFamily="49" charset="0"/>
+              </a:rPr>
+            </a:br>
+            <a:r>
+              <a:rPr kumimoji="0" lang="de-DE" altLang="de-DE" sz="1450" b="0" i="0" u="none" strike="noStrike" cap="none" normalizeH="0" baseline="0" dirty="0">
+                <a:ln>
+                  <a:noFill/>
+                </a:ln>
+                <a:solidFill>
+                  <a:srgbClr val="000000"/>
+                </a:solidFill>
+                <a:effectLst/>
+                <a:latin typeface="Courier New" panose="02070309020205020404" pitchFamily="49" charset="0"/>
+                <a:cs typeface="Courier New" panose="02070309020205020404" pitchFamily="49" charset="0"/>
+              </a:rPr>
+              <a:t>    </a:t>
+            </a:r>
+            <a:r>
+              <a:rPr kumimoji="0" lang="de-DE" altLang="de-DE" sz="1450" b="1" i="0" u="none" strike="noStrike" cap="none" normalizeH="0" baseline="0" dirty="0" err="1">
+                <a:ln>
+                  <a:noFill/>
+                </a:ln>
+                <a:solidFill>
+                  <a:srgbClr val="000080"/>
+                </a:solidFill>
+                <a:effectLst/>
+                <a:latin typeface="Courier New" panose="02070309020205020404" pitchFamily="49" charset="0"/>
+                <a:cs typeface="Courier New" panose="02070309020205020404" pitchFamily="49" charset="0"/>
+              </a:rPr>
+              <a:t>return</a:t>
+            </a:r>
+            <a:r>
+              <a:rPr kumimoji="0" lang="de-DE" altLang="de-DE" sz="1450" b="1" i="0" u="none" strike="noStrike" cap="none" normalizeH="0" baseline="0" dirty="0">
+                <a:ln>
+                  <a:noFill/>
+                </a:ln>
+                <a:solidFill>
+                  <a:srgbClr val="000080"/>
+                </a:solidFill>
+                <a:effectLst/>
+                <a:latin typeface="Courier New" panose="02070309020205020404" pitchFamily="49" charset="0"/>
+                <a:cs typeface="Courier New" panose="02070309020205020404" pitchFamily="49" charset="0"/>
+              </a:rPr>
+              <a:t> </a:t>
+            </a:r>
+            <a:r>
+              <a:rPr kumimoji="0" lang="de-DE" altLang="de-DE" sz="1450" b="0" i="0" u="none" strike="noStrike" cap="none" normalizeH="0" baseline="0" dirty="0" err="1">
+                <a:ln>
+                  <a:noFill/>
+                </a:ln>
+                <a:solidFill>
+                  <a:srgbClr val="000000"/>
+                </a:solidFill>
+                <a:effectLst/>
+                <a:latin typeface="Courier New" panose="02070309020205020404" pitchFamily="49" charset="0"/>
+                <a:cs typeface="Courier New" panose="02070309020205020404" pitchFamily="49" charset="0"/>
+              </a:rPr>
+              <a:t>zip</a:t>
+            </a:r>
+            <a:r>
+              <a:rPr kumimoji="0" lang="de-DE" altLang="de-DE" sz="1450" b="0" i="0" u="none" strike="noStrike" cap="none" normalizeH="0" baseline="0" dirty="0">
+                <a:ln>
+                  <a:noFill/>
+                </a:ln>
+                <a:solidFill>
+                  <a:srgbClr val="000000"/>
+                </a:solidFill>
+                <a:effectLst/>
+                <a:latin typeface="Courier New" panose="02070309020205020404" pitchFamily="49" charset="0"/>
+                <a:cs typeface="Courier New" panose="02070309020205020404" pitchFamily="49" charset="0"/>
+              </a:rPr>
+              <a:t>(g1_x1, g2, h2_x1, </a:t>
+            </a:r>
+            <a:r>
+              <a:rPr kumimoji="0" lang="de-DE" altLang="de-DE" sz="1450" b="0" i="0" u="none" strike="noStrike" cap="none" normalizeH="0" baseline="0" dirty="0" err="1">
+                <a:ln>
+                  <a:noFill/>
+                </a:ln>
+                <a:solidFill>
+                  <a:srgbClr val="000000"/>
+                </a:solidFill>
+                <a:effectLst/>
+                <a:latin typeface="Courier New" panose="02070309020205020404" pitchFamily="49" charset="0"/>
+                <a:cs typeface="Courier New" panose="02070309020205020404" pitchFamily="49" charset="0"/>
+              </a:rPr>
+              <a:t>current</a:t>
+            </a:r>
+            <a:r>
+              <a:rPr kumimoji="0" lang="de-DE" altLang="de-DE" sz="1450" b="0" i="0" u="none" strike="noStrike" cap="none" normalizeH="0" baseline="0" dirty="0">
+                <a:ln>
+                  <a:noFill/>
+                </a:ln>
+                <a:solidFill>
+                  <a:srgbClr val="000000"/>
+                </a:solidFill>
+                <a:effectLst/>
+                <a:latin typeface="Courier New" panose="02070309020205020404" pitchFamily="49" charset="0"/>
+                <a:cs typeface="Courier New" panose="02070309020205020404" pitchFamily="49" charset="0"/>
+              </a:rPr>
+              <a:t>) </a:t>
+            </a:r>
+            <a:r>
+              <a:rPr kumimoji="0" lang="de-DE" altLang="de-DE" sz="1450" b="1" i="0" u="none" strike="noStrike" cap="none" normalizeH="0" baseline="0" dirty="0">
+                <a:ln>
+                  <a:noFill/>
+                </a:ln>
+                <a:solidFill>
+                  <a:srgbClr val="000000"/>
+                </a:solidFill>
+                <a:effectLst/>
+                <a:latin typeface="Courier New" panose="02070309020205020404" pitchFamily="49" charset="0"/>
+                <a:cs typeface="Courier New" panose="02070309020205020404" pitchFamily="49" charset="0"/>
+              </a:rPr>
+              <a:t>{</a:t>
+            </a:r>
+            <a:r>
+              <a:rPr kumimoji="0" lang="de-DE" altLang="de-DE" sz="1450" b="0" i="0" u="none" strike="noStrike" cap="none" normalizeH="0" baseline="0" dirty="0">
+                <a:ln>
+                  <a:noFill/>
+                </a:ln>
+                <a:solidFill>
+                  <a:srgbClr val="000000"/>
+                </a:solidFill>
+                <a:effectLst/>
+                <a:latin typeface="Courier New" panose="02070309020205020404" pitchFamily="49" charset="0"/>
+                <a:cs typeface="Courier New" panose="02070309020205020404" pitchFamily="49" charset="0"/>
+              </a:rPr>
+              <a:t>g1, g2, h2, x </a:t>
+            </a:r>
+            <a:r>
+              <a:rPr kumimoji="0" lang="de-DE" altLang="de-DE" sz="1450" b="1" i="0" u="none" strike="noStrike" cap="none" normalizeH="0" baseline="0" dirty="0">
+                <a:ln>
+                  <a:noFill/>
+                </a:ln>
+                <a:solidFill>
+                  <a:srgbClr val="000000"/>
+                </a:solidFill>
+                <a:effectLst/>
+                <a:latin typeface="Courier New" panose="02070309020205020404" pitchFamily="49" charset="0"/>
+                <a:cs typeface="Courier New" panose="02070309020205020404" pitchFamily="49" charset="0"/>
+              </a:rPr>
+              <a:t>-&gt; </a:t>
+            </a:r>
+            <a:r>
+              <a:rPr kumimoji="0" lang="de-DE" altLang="de-DE" sz="1450" b="0" i="0" u="none" strike="noStrike" cap="none" normalizeH="0" baseline="0" dirty="0">
+                <a:ln>
+                  <a:noFill/>
+                </a:ln>
+                <a:solidFill>
+                  <a:srgbClr val="000000"/>
+                </a:solidFill>
+                <a:effectLst/>
+                <a:latin typeface="Courier New" panose="02070309020205020404" pitchFamily="49" charset="0"/>
+                <a:cs typeface="Courier New" panose="02070309020205020404" pitchFamily="49" charset="0"/>
+              </a:rPr>
+              <a:t>g2 + x * (g1 - h2)</a:t>
+            </a:r>
+            <a:r>
+              <a:rPr kumimoji="0" lang="de-DE" altLang="de-DE" sz="1450" b="1" i="0" u="none" strike="noStrike" cap="none" normalizeH="0" baseline="0" dirty="0">
+                <a:ln>
+                  <a:noFill/>
+                </a:ln>
+                <a:solidFill>
+                  <a:srgbClr val="000000"/>
+                </a:solidFill>
+                <a:effectLst/>
+                <a:latin typeface="Courier New" panose="02070309020205020404" pitchFamily="49" charset="0"/>
+                <a:cs typeface="Courier New" panose="02070309020205020404" pitchFamily="49" charset="0"/>
+              </a:rPr>
+              <a:t>}</a:t>
+            </a:r>
+            <a:br>
+              <a:rPr kumimoji="0" lang="de-DE" altLang="de-DE" sz="1450" b="1" i="0" u="none" strike="noStrike" cap="none" normalizeH="0" baseline="0" dirty="0">
+                <a:ln>
+                  <a:noFill/>
+                </a:ln>
+                <a:solidFill>
+                  <a:srgbClr val="000000"/>
+                </a:solidFill>
+                <a:effectLst/>
+                <a:latin typeface="Courier New" panose="02070309020205020404" pitchFamily="49" charset="0"/>
+                <a:cs typeface="Courier New" panose="02070309020205020404" pitchFamily="49" charset="0"/>
+              </a:rPr>
+            </a:br>
+            <a:r>
+              <a:rPr kumimoji="0" lang="de-DE" altLang="de-DE" sz="1450" b="0" i="0" u="none" strike="noStrike" cap="none" normalizeH="0" baseline="0" dirty="0">
+                <a:ln>
+                  <a:noFill/>
+                </a:ln>
+                <a:solidFill>
+                  <a:srgbClr val="000000"/>
+                </a:solidFill>
+                <a:effectLst/>
+                <a:latin typeface="Courier New" panose="02070309020205020404" pitchFamily="49" charset="0"/>
+                <a:cs typeface="Courier New" panose="02070309020205020404" pitchFamily="49" charset="0"/>
+              </a:rPr>
+              <a:t>} </a:t>
+            </a:r>
+            <a:r>
+              <a:rPr kumimoji="0" lang="de-DE" altLang="de-DE" sz="1450" b="1" i="0" u="none" strike="noStrike" cap="none" normalizeH="0" baseline="0" dirty="0" err="1">
+                <a:ln>
+                  <a:noFill/>
+                </a:ln>
+                <a:solidFill>
+                  <a:srgbClr val="000080"/>
+                </a:solidFill>
+                <a:effectLst/>
+                <a:latin typeface="Courier New" panose="02070309020205020404" pitchFamily="49" charset="0"/>
+                <a:cs typeface="Courier New" panose="02070309020205020404" pitchFamily="49" charset="0"/>
+              </a:rPr>
+              <a:t>else</a:t>
+            </a:r>
+            <a:r>
+              <a:rPr kumimoji="0" lang="de-DE" altLang="de-DE" sz="1450" b="1" i="0" u="none" strike="noStrike" cap="none" normalizeH="0" baseline="0" dirty="0">
+                <a:ln>
+                  <a:noFill/>
+                </a:ln>
+                <a:solidFill>
+                  <a:srgbClr val="000080"/>
+                </a:solidFill>
+                <a:effectLst/>
+                <a:latin typeface="Courier New" panose="02070309020205020404" pitchFamily="49" charset="0"/>
+                <a:cs typeface="Courier New" panose="02070309020205020404" pitchFamily="49" charset="0"/>
+              </a:rPr>
+              <a:t> </a:t>
+            </a:r>
+            <a:r>
+              <a:rPr kumimoji="0" lang="de-DE" altLang="de-DE" sz="1450" b="0" i="0" u="none" strike="noStrike" cap="none" normalizeH="0" baseline="0" dirty="0">
+                <a:ln>
+                  <a:noFill/>
+                </a:ln>
+                <a:solidFill>
+                  <a:srgbClr val="000000"/>
+                </a:solidFill>
+                <a:effectLst/>
+                <a:latin typeface="Courier New" panose="02070309020205020404" pitchFamily="49" charset="0"/>
+                <a:cs typeface="Courier New" panose="02070309020205020404" pitchFamily="49" charset="0"/>
+              </a:rPr>
+              <a:t>{</a:t>
+            </a:r>
+            <a:br>
+              <a:rPr kumimoji="0" lang="de-DE" altLang="de-DE" sz="1450" b="0" i="0" u="none" strike="noStrike" cap="none" normalizeH="0" baseline="0" dirty="0">
+                <a:ln>
+                  <a:noFill/>
+                </a:ln>
+                <a:solidFill>
+                  <a:srgbClr val="000000"/>
+                </a:solidFill>
+                <a:effectLst/>
+                <a:latin typeface="Courier New" panose="02070309020205020404" pitchFamily="49" charset="0"/>
+                <a:cs typeface="Courier New" panose="02070309020205020404" pitchFamily="49" charset="0"/>
+              </a:rPr>
+            </a:br>
+            <a:r>
+              <a:rPr kumimoji="0" lang="de-DE" altLang="de-DE" sz="1450" b="0" i="0" u="none" strike="noStrike" cap="none" normalizeH="0" baseline="0" dirty="0">
+                <a:ln>
+                  <a:noFill/>
+                </a:ln>
+                <a:solidFill>
+                  <a:srgbClr val="000000"/>
+                </a:solidFill>
+                <a:effectLst/>
+                <a:latin typeface="Courier New" panose="02070309020205020404" pitchFamily="49" charset="0"/>
+                <a:cs typeface="Courier New" panose="02070309020205020404" pitchFamily="49" charset="0"/>
+              </a:rPr>
+              <a:t>    </a:t>
+            </a:r>
+            <a:r>
+              <a:rPr kumimoji="0" lang="de-DE" altLang="de-DE" sz="1450" b="1" i="0" u="none" strike="noStrike" cap="none" normalizeH="0" baseline="0" dirty="0" err="1">
+                <a:ln>
+                  <a:noFill/>
+                </a:ln>
+                <a:solidFill>
+                  <a:srgbClr val="000080"/>
+                </a:solidFill>
+                <a:effectLst/>
+                <a:latin typeface="Courier New" panose="02070309020205020404" pitchFamily="49" charset="0"/>
+                <a:cs typeface="Courier New" panose="02070309020205020404" pitchFamily="49" charset="0"/>
+              </a:rPr>
+              <a:t>return</a:t>
+            </a:r>
+            <a:r>
+              <a:rPr kumimoji="0" lang="de-DE" altLang="de-DE" sz="1450" b="1" i="0" u="none" strike="noStrike" cap="none" normalizeH="0" baseline="0" dirty="0">
+                <a:ln>
+                  <a:noFill/>
+                </a:ln>
+                <a:solidFill>
+                  <a:srgbClr val="000080"/>
+                </a:solidFill>
+                <a:effectLst/>
+                <a:latin typeface="Courier New" panose="02070309020205020404" pitchFamily="49" charset="0"/>
+                <a:cs typeface="Courier New" panose="02070309020205020404" pitchFamily="49" charset="0"/>
+              </a:rPr>
+              <a:t> </a:t>
+            </a:r>
+            <a:r>
+              <a:rPr kumimoji="0" lang="de-DE" altLang="de-DE" sz="1450" b="0" i="0" u="none" strike="noStrike" cap="none" normalizeH="0" baseline="0" dirty="0" err="1">
+                <a:ln>
+                  <a:noFill/>
+                </a:ln>
+                <a:solidFill>
+                  <a:srgbClr val="000000"/>
+                </a:solidFill>
+                <a:effectLst/>
+                <a:latin typeface="Courier New" panose="02070309020205020404" pitchFamily="49" charset="0"/>
+                <a:cs typeface="Courier New" panose="02070309020205020404" pitchFamily="49" charset="0"/>
+              </a:rPr>
+              <a:t>zip</a:t>
+            </a:r>
+            <a:r>
+              <a:rPr kumimoji="0" lang="de-DE" altLang="de-DE" sz="1450" b="0" i="0" u="none" strike="noStrike" cap="none" normalizeH="0" baseline="0" dirty="0">
+                <a:ln>
+                  <a:noFill/>
+                </a:ln>
+                <a:solidFill>
+                  <a:srgbClr val="000000"/>
+                </a:solidFill>
+                <a:effectLst/>
+                <a:latin typeface="Courier New" panose="02070309020205020404" pitchFamily="49" charset="0"/>
+                <a:cs typeface="Courier New" panose="02070309020205020404" pitchFamily="49" charset="0"/>
+              </a:rPr>
+              <a:t>(g1_x1, g2, </a:t>
+            </a:r>
+            <a:r>
+              <a:rPr kumimoji="0" lang="de-DE" altLang="de-DE" sz="1450" b="0" i="0" u="none" strike="noStrike" cap="none" normalizeH="0" baseline="0" dirty="0" err="1">
+                <a:ln>
+                  <a:noFill/>
+                </a:ln>
+                <a:solidFill>
+                  <a:srgbClr val="000000"/>
+                </a:solidFill>
+                <a:effectLst/>
+                <a:latin typeface="Courier New" panose="02070309020205020404" pitchFamily="49" charset="0"/>
+                <a:cs typeface="Courier New" panose="02070309020205020404" pitchFamily="49" charset="0"/>
+              </a:rPr>
+              <a:t>current</a:t>
+            </a:r>
+            <a:r>
+              <a:rPr kumimoji="0" lang="de-DE" altLang="de-DE" sz="1450" b="0" i="0" u="none" strike="noStrike" cap="none" normalizeH="0" baseline="0" dirty="0">
+                <a:ln>
+                  <a:noFill/>
+                </a:ln>
+                <a:solidFill>
+                  <a:srgbClr val="000000"/>
+                </a:solidFill>
+                <a:effectLst/>
+                <a:latin typeface="Courier New" panose="02070309020205020404" pitchFamily="49" charset="0"/>
+                <a:cs typeface="Courier New" panose="02070309020205020404" pitchFamily="49" charset="0"/>
+              </a:rPr>
+              <a:t>) </a:t>
+            </a:r>
+            <a:r>
+              <a:rPr kumimoji="0" lang="de-DE" altLang="de-DE" sz="1450" b="1" i="0" u="none" strike="noStrike" cap="none" normalizeH="0" baseline="0" dirty="0">
+                <a:ln>
+                  <a:noFill/>
+                </a:ln>
+                <a:solidFill>
+                  <a:srgbClr val="000000"/>
+                </a:solidFill>
+                <a:effectLst/>
+                <a:latin typeface="Courier New" panose="02070309020205020404" pitchFamily="49" charset="0"/>
+                <a:cs typeface="Courier New" panose="02070309020205020404" pitchFamily="49" charset="0"/>
+              </a:rPr>
+              <a:t>{</a:t>
+            </a:r>
+            <a:r>
+              <a:rPr kumimoji="0" lang="de-DE" altLang="de-DE" sz="1450" b="0" i="0" u="none" strike="noStrike" cap="none" normalizeH="0" baseline="0" dirty="0">
+                <a:ln>
+                  <a:noFill/>
+                </a:ln>
+                <a:solidFill>
+                  <a:srgbClr val="000000"/>
+                </a:solidFill>
+                <a:effectLst/>
+                <a:latin typeface="Courier New" panose="02070309020205020404" pitchFamily="49" charset="0"/>
+                <a:cs typeface="Courier New" panose="02070309020205020404" pitchFamily="49" charset="0"/>
+              </a:rPr>
+              <a:t>g1, g2, x </a:t>
+            </a:r>
+            <a:r>
+              <a:rPr kumimoji="0" lang="de-DE" altLang="de-DE" sz="1450" b="1" i="0" u="none" strike="noStrike" cap="none" normalizeH="0" baseline="0" dirty="0">
+                <a:ln>
+                  <a:noFill/>
+                </a:ln>
+                <a:solidFill>
+                  <a:srgbClr val="000000"/>
+                </a:solidFill>
+                <a:effectLst/>
+                <a:latin typeface="Courier New" panose="02070309020205020404" pitchFamily="49" charset="0"/>
+                <a:cs typeface="Courier New" panose="02070309020205020404" pitchFamily="49" charset="0"/>
+              </a:rPr>
+              <a:t>-&gt; </a:t>
+            </a:r>
+            <a:r>
+              <a:rPr kumimoji="0" lang="de-DE" altLang="de-DE" sz="1450" b="0" i="0" u="none" strike="noStrike" cap="none" normalizeH="0" baseline="0" dirty="0">
+                <a:ln>
+                  <a:noFill/>
+                </a:ln>
+                <a:solidFill>
+                  <a:srgbClr val="000000"/>
+                </a:solidFill>
+                <a:effectLst/>
+                <a:latin typeface="Courier New" panose="02070309020205020404" pitchFamily="49" charset="0"/>
+                <a:cs typeface="Courier New" panose="02070309020205020404" pitchFamily="49" charset="0"/>
+              </a:rPr>
+              <a:t>g2 + x * (g1 - g2)</a:t>
+            </a:r>
+            <a:r>
+              <a:rPr kumimoji="0" lang="de-DE" altLang="de-DE" sz="1450" b="1" i="0" u="none" strike="noStrike" cap="none" normalizeH="0" baseline="0" dirty="0">
+                <a:ln>
+                  <a:noFill/>
+                </a:ln>
+                <a:solidFill>
+                  <a:srgbClr val="000000"/>
+                </a:solidFill>
+                <a:effectLst/>
+                <a:latin typeface="Courier New" panose="02070309020205020404" pitchFamily="49" charset="0"/>
+                <a:cs typeface="Courier New" panose="02070309020205020404" pitchFamily="49" charset="0"/>
+              </a:rPr>
+              <a:t>}</a:t>
+            </a:r>
+            <a:br>
+              <a:rPr kumimoji="0" lang="de-DE" altLang="de-DE" sz="1450" b="1" i="0" u="none" strike="noStrike" cap="none" normalizeH="0" baseline="0" dirty="0">
+                <a:ln>
+                  <a:noFill/>
+                </a:ln>
+                <a:solidFill>
+                  <a:srgbClr val="000000"/>
+                </a:solidFill>
+                <a:effectLst/>
+                <a:latin typeface="Courier New" panose="02070309020205020404" pitchFamily="49" charset="0"/>
+                <a:cs typeface="Courier New" panose="02070309020205020404" pitchFamily="49" charset="0"/>
+              </a:rPr>
+            </a:br>
+            <a:r>
+              <a:rPr kumimoji="0" lang="de-DE" altLang="de-DE" sz="1450" b="0" i="0" u="none" strike="noStrike" cap="none" normalizeH="0" baseline="0" dirty="0">
+                <a:ln>
+                  <a:noFill/>
+                </a:ln>
+                <a:solidFill>
+                  <a:srgbClr val="000000"/>
+                </a:solidFill>
+                <a:effectLst/>
+                <a:latin typeface="Courier New" panose="02070309020205020404" pitchFamily="49" charset="0"/>
+                <a:cs typeface="Courier New" panose="02070309020205020404" pitchFamily="49" charset="0"/>
+              </a:rPr>
+              <a:t>}</a:t>
+            </a:r>
+            <a:endParaRPr kumimoji="0" lang="de-DE" altLang="de-DE" sz="1450" b="0" i="0" u="none" strike="noStrike" cap="none" normalizeH="0" baseline="0" dirty="0">
+              <a:ln>
+                <a:noFill/>
+              </a:ln>
+              <a:solidFill>
+                <a:schemeClr val="tx1"/>
+              </a:solidFill>
+              <a:effectLst/>
+              <a:latin typeface="Arial" panose="020B0604020202020204" pitchFamily="34" charset="0"/>
+            </a:endParaRPr>
           </a:p>
         </p:txBody>
       </p:sp>
     </p:spTree>
     <p:extLst>
       <p:ext uri="{BB962C8B-B14F-4D97-AF65-F5344CB8AC3E}">
-        <p14:creationId xmlns:p14="http://schemas.microsoft.com/office/powerpoint/2010/main" val="1061587473"/>
+        <p14:creationId xmlns:p14="http://schemas.microsoft.com/office/powerpoint/2010/main" val="3002456709"/>
       </p:ext>
     </p:extLst>
   </p:cSld>
@@ -5216,6 +6473,1641 @@
           <a:lstStyle/>
           <a:p>
             <a:r>
+              <a:rPr lang="de-DE" dirty="0"/>
+              <a:t>Top-event Evaluation</a:t>
+            </a:r>
+          </a:p>
+        </p:txBody>
+      </p:sp>
+      <p:sp>
+        <p:nvSpPr>
+          <p:cNvPr id="9" name="Rectangle 6"/>
+          <p:cNvSpPr>
+            <a:spLocks noChangeArrowheads="1"/>
+          </p:cNvSpPr>
+          <p:nvPr/>
+        </p:nvSpPr>
+        <p:spPr bwMode="auto">
+          <a:xfrm>
+            <a:off x="244149" y="2254837"/>
+            <a:ext cx="8701421" cy="3293209"/>
+          </a:xfrm>
+          <a:prstGeom prst="rect">
+            <a:avLst/>
+          </a:prstGeom>
+          <a:solidFill>
+            <a:srgbClr val="FFFFFF"/>
+          </a:solidFill>
+          <a:ln>
+            <a:noFill/>
+          </a:ln>
+          <a:effectLst/>
+          <a:extLst>
+            <a:ext uri="{91240B29-F687-4F45-9708-019B960494DF}">
+              <a14:hiddenLine xmlns:a14="http://schemas.microsoft.com/office/drawing/2010/main" w="9525">
+                <a:solidFill>
+                  <a:schemeClr val="tx1"/>
+                </a:solidFill>
+                <a:miter lim="800000"/>
+                <a:headEnd/>
+                <a:tailEnd/>
+              </a14:hiddenLine>
+            </a:ext>
+            <a:ext uri="{AF507438-7753-43E0-B8FC-AC1667EBCBE1}">
+              <a14:hiddenEffects xmlns:a14="http://schemas.microsoft.com/office/drawing/2010/main">
+                <a:effectLst>
+                  <a:outerShdw dist="35921" dir="2700000" algn="ctr" rotWithShape="0">
+                    <a:schemeClr val="bg2"/>
+                  </a:outerShdw>
+                </a:effectLst>
+              </a14:hiddenEffects>
+            </a:ext>
+          </a:extLst>
+        </p:spPr>
+        <p:txBody>
+          <a:bodyPr vert="horz" wrap="none" lIns="91440" tIns="45720" rIns="91440" bIns="45720" numCol="1" anchor="ctr" anchorCtr="0" compatLnSpc="1">
+            <a:prstTxWarp prst="textNoShape">
+              <a:avLst/>
+            </a:prstTxWarp>
+            <a:spAutoFit/>
+          </a:bodyPr>
+          <a:lstStyle/>
+          <a:p>
+            <a:pPr marL="0" marR="0" lvl="0" indent="0" algn="l" defTabSz="914400" rtl="0" eaLnBrk="0" fontAlgn="base" latinLnBrk="0" hangingPunct="0">
+              <a:lnSpc>
+                <a:spcPct val="100000"/>
+              </a:lnSpc>
+              <a:spcBef>
+                <a:spcPct val="0"/>
+              </a:spcBef>
+              <a:spcAft>
+                <a:spcPct val="0"/>
+              </a:spcAft>
+              <a:buClrTx/>
+              <a:buSzTx/>
+              <a:buFontTx/>
+              <a:buNone/>
+              <a:tabLst/>
+            </a:pPr>
+            <a:r>
+              <a:rPr kumimoji="0" lang="de-DE" altLang="de-DE" sz="1600" b="1" i="0" u="none" strike="noStrike" cap="none" normalizeH="0" baseline="0" dirty="0">
+                <a:ln>
+                  <a:noFill/>
+                </a:ln>
+                <a:solidFill>
+                  <a:srgbClr val="000080"/>
+                </a:solidFill>
+                <a:effectLst/>
+                <a:latin typeface="Courier New" panose="02070309020205020404" pitchFamily="49" charset="0"/>
+                <a:cs typeface="Courier New" panose="02070309020205020404" pitchFamily="49" charset="0"/>
+              </a:rPr>
+              <a:t>private </a:t>
+            </a:r>
+            <a:r>
+              <a:rPr kumimoji="0" lang="de-DE" altLang="de-DE" sz="1600" b="1" i="0" u="none" strike="noStrike" cap="none" normalizeH="0" baseline="0" dirty="0" err="1">
+                <a:ln>
+                  <a:noFill/>
+                </a:ln>
+                <a:solidFill>
+                  <a:srgbClr val="000080"/>
+                </a:solidFill>
+                <a:effectLst/>
+                <a:latin typeface="Courier New" panose="02070309020205020404" pitchFamily="49" charset="0"/>
+                <a:cs typeface="Courier New" panose="02070309020205020404" pitchFamily="49" charset="0"/>
+              </a:rPr>
+              <a:t>fun</a:t>
+            </a:r>
+            <a:r>
+              <a:rPr kumimoji="0" lang="de-DE" altLang="de-DE" sz="1600" b="1" i="0" u="none" strike="noStrike" cap="none" normalizeH="0" baseline="0" dirty="0">
+                <a:ln>
+                  <a:noFill/>
+                </a:ln>
+                <a:solidFill>
+                  <a:srgbClr val="000080"/>
+                </a:solidFill>
+                <a:effectLst/>
+                <a:latin typeface="Courier New" panose="02070309020205020404" pitchFamily="49" charset="0"/>
+                <a:cs typeface="Courier New" panose="02070309020205020404" pitchFamily="49" charset="0"/>
+              </a:rPr>
+              <a:t> </a:t>
+            </a:r>
+            <a:r>
+              <a:rPr kumimoji="0" lang="de-DE" altLang="de-DE" sz="1600" b="0" i="0" u="none" strike="noStrike" cap="none" normalizeH="0" baseline="0" dirty="0" err="1">
+                <a:ln>
+                  <a:noFill/>
+                </a:ln>
+                <a:solidFill>
+                  <a:srgbClr val="000000"/>
+                </a:solidFill>
+                <a:effectLst/>
+                <a:latin typeface="Courier New" panose="02070309020205020404" pitchFamily="49" charset="0"/>
+                <a:cs typeface="Courier New" panose="02070309020205020404" pitchFamily="49" charset="0"/>
+              </a:rPr>
+              <a:t>constructFormulaTopDown</a:t>
+            </a:r>
+            <a:r>
+              <a:rPr kumimoji="0" lang="de-DE" altLang="de-DE" sz="1600" b="0" i="0" u="none" strike="noStrike" cap="none" normalizeH="0" baseline="0" dirty="0">
+                <a:ln>
+                  <a:noFill/>
+                </a:ln>
+                <a:solidFill>
+                  <a:srgbClr val="000000"/>
+                </a:solidFill>
+                <a:effectLst/>
+                <a:latin typeface="Courier New" panose="02070309020205020404" pitchFamily="49" charset="0"/>
+                <a:cs typeface="Courier New" panose="02070309020205020404" pitchFamily="49" charset="0"/>
+              </a:rPr>
+              <a:t>(</a:t>
+            </a:r>
+            <a:r>
+              <a:rPr kumimoji="0" lang="de-DE" altLang="de-DE" sz="1600" b="0" i="0" u="none" strike="noStrike" cap="none" normalizeH="0" baseline="0" dirty="0" err="1">
+                <a:ln>
+                  <a:noFill/>
+                </a:ln>
+                <a:solidFill>
+                  <a:srgbClr val="000000"/>
+                </a:solidFill>
+                <a:effectLst/>
+                <a:latin typeface="Courier New" panose="02070309020205020404" pitchFamily="49" charset="0"/>
+                <a:cs typeface="Courier New" panose="02070309020205020404" pitchFamily="49" charset="0"/>
+              </a:rPr>
+              <a:t>node</a:t>
+            </a:r>
+            <a:r>
+              <a:rPr kumimoji="0" lang="de-DE" altLang="de-DE" sz="1600" b="0" i="0" u="none" strike="noStrike" cap="none" normalizeH="0" baseline="0" dirty="0">
+                <a:ln>
+                  <a:noFill/>
+                </a:ln>
+                <a:solidFill>
+                  <a:srgbClr val="000000"/>
+                </a:solidFill>
+                <a:effectLst/>
+                <a:latin typeface="Courier New" panose="02070309020205020404" pitchFamily="49" charset="0"/>
+                <a:cs typeface="Courier New" panose="02070309020205020404" pitchFamily="49" charset="0"/>
+              </a:rPr>
+              <a:t>: </a:t>
+            </a:r>
+            <a:r>
+              <a:rPr kumimoji="0" lang="de-DE" altLang="de-DE" sz="1600" b="0" i="0" u="none" strike="noStrike" cap="none" normalizeH="0" baseline="0" dirty="0" err="1">
+                <a:ln>
+                  <a:noFill/>
+                </a:ln>
+                <a:solidFill>
+                  <a:srgbClr val="000000"/>
+                </a:solidFill>
+                <a:effectLst/>
+                <a:latin typeface="Courier New" panose="02070309020205020404" pitchFamily="49" charset="0"/>
+                <a:cs typeface="Courier New" panose="02070309020205020404" pitchFamily="49" charset="0"/>
+              </a:rPr>
+              <a:t>BDDNode</a:t>
+            </a:r>
+            <a:r>
+              <a:rPr kumimoji="0" lang="de-DE" altLang="de-DE" sz="1600" b="0" i="0" u="none" strike="noStrike" cap="none" normalizeH="0" baseline="0" dirty="0">
+                <a:ln>
+                  <a:noFill/>
+                </a:ln>
+                <a:solidFill>
+                  <a:srgbClr val="000000"/>
+                </a:solidFill>
+                <a:effectLst/>
+                <a:latin typeface="Courier New" panose="02070309020205020404" pitchFamily="49" charset="0"/>
+                <a:cs typeface="Courier New" panose="02070309020205020404" pitchFamily="49" charset="0"/>
+              </a:rPr>
+              <a:t>): </a:t>
+            </a:r>
+            <a:r>
+              <a:rPr kumimoji="0" lang="de-DE" altLang="de-DE" sz="1600" b="0" i="0" u="none" strike="noStrike" cap="none" normalizeH="0" baseline="0" dirty="0" err="1">
+                <a:ln>
+                  <a:noFill/>
+                </a:ln>
+                <a:solidFill>
+                  <a:srgbClr val="000000"/>
+                </a:solidFill>
+                <a:effectLst/>
+                <a:latin typeface="Courier New" panose="02070309020205020404" pitchFamily="49" charset="0"/>
+                <a:cs typeface="Courier New" panose="02070309020205020404" pitchFamily="49" charset="0"/>
+              </a:rPr>
+              <a:t>Sequence</a:t>
+            </a:r>
+            <a:r>
+              <a:rPr kumimoji="0" lang="de-DE" altLang="de-DE" sz="1600" b="0" i="0" u="none" strike="noStrike" cap="none" normalizeH="0" baseline="0" dirty="0">
+                <a:ln>
+                  <a:noFill/>
+                </a:ln>
+                <a:solidFill>
+                  <a:srgbClr val="000000"/>
+                </a:solidFill>
+                <a:effectLst/>
+                <a:latin typeface="Courier New" panose="02070309020205020404" pitchFamily="49" charset="0"/>
+                <a:cs typeface="Courier New" panose="02070309020205020404" pitchFamily="49" charset="0"/>
+              </a:rPr>
+              <a:t>&lt;</a:t>
+            </a:r>
+            <a:r>
+              <a:rPr kumimoji="0" lang="de-DE" altLang="de-DE" sz="1600" b="0" i="0" u="none" strike="noStrike" cap="none" normalizeH="0" baseline="0" dirty="0" err="1">
+                <a:ln>
+                  <a:noFill/>
+                </a:ln>
+                <a:solidFill>
+                  <a:srgbClr val="000000"/>
+                </a:solidFill>
+                <a:effectLst/>
+                <a:latin typeface="Courier New" panose="02070309020205020404" pitchFamily="49" charset="0"/>
+                <a:cs typeface="Courier New" panose="02070309020205020404" pitchFamily="49" charset="0"/>
+              </a:rPr>
+              <a:t>Float</a:t>
+            </a:r>
+            <a:r>
+              <a:rPr kumimoji="0" lang="de-DE" altLang="de-DE" sz="1600" b="0" i="0" u="none" strike="noStrike" cap="none" normalizeH="0" baseline="0" dirty="0">
+                <a:ln>
+                  <a:noFill/>
+                </a:ln>
+                <a:solidFill>
+                  <a:srgbClr val="000000"/>
+                </a:solidFill>
+                <a:effectLst/>
+                <a:latin typeface="Courier New" panose="02070309020205020404" pitchFamily="49" charset="0"/>
+                <a:cs typeface="Courier New" panose="02070309020205020404" pitchFamily="49" charset="0"/>
+              </a:rPr>
+              <a:t>&gt; {</a:t>
+            </a:r>
+            <a:br>
+              <a:rPr kumimoji="0" lang="de-DE" altLang="de-DE" sz="1600" b="0" i="0" u="none" strike="noStrike" cap="none" normalizeH="0" baseline="0" dirty="0">
+                <a:ln>
+                  <a:noFill/>
+                </a:ln>
+                <a:solidFill>
+                  <a:srgbClr val="000000"/>
+                </a:solidFill>
+                <a:effectLst/>
+                <a:latin typeface="Courier New" panose="02070309020205020404" pitchFamily="49" charset="0"/>
+                <a:cs typeface="Courier New" panose="02070309020205020404" pitchFamily="49" charset="0"/>
+              </a:rPr>
+            </a:br>
+            <a:r>
+              <a:rPr kumimoji="0" lang="de-DE" altLang="de-DE" sz="1600" b="0" i="0" u="none" strike="noStrike" cap="none" normalizeH="0" baseline="0" dirty="0">
+                <a:ln>
+                  <a:noFill/>
+                </a:ln>
+                <a:solidFill>
+                  <a:srgbClr val="000000"/>
+                </a:solidFill>
+                <a:effectLst/>
+                <a:latin typeface="Courier New" panose="02070309020205020404" pitchFamily="49" charset="0"/>
+                <a:cs typeface="Courier New" panose="02070309020205020404" pitchFamily="49" charset="0"/>
+              </a:rPr>
+              <a:t>    </a:t>
+            </a:r>
+            <a:r>
+              <a:rPr kumimoji="0" lang="de-DE" altLang="de-DE" sz="1600" b="1" i="0" u="none" strike="noStrike" cap="none" normalizeH="0" baseline="0" dirty="0" err="1">
+                <a:ln>
+                  <a:noFill/>
+                </a:ln>
+                <a:solidFill>
+                  <a:srgbClr val="000080"/>
+                </a:solidFill>
+                <a:effectLst/>
+                <a:latin typeface="Courier New" panose="02070309020205020404" pitchFamily="49" charset="0"/>
+                <a:cs typeface="Courier New" panose="02070309020205020404" pitchFamily="49" charset="0"/>
+              </a:rPr>
+              <a:t>if</a:t>
+            </a:r>
+            <a:r>
+              <a:rPr kumimoji="0" lang="de-DE" altLang="de-DE" sz="1600" b="1" i="0" u="none" strike="noStrike" cap="none" normalizeH="0" baseline="0" dirty="0">
+                <a:ln>
+                  <a:noFill/>
+                </a:ln>
+                <a:solidFill>
+                  <a:srgbClr val="000080"/>
+                </a:solidFill>
+                <a:effectLst/>
+                <a:latin typeface="Courier New" panose="02070309020205020404" pitchFamily="49" charset="0"/>
+                <a:cs typeface="Courier New" panose="02070309020205020404" pitchFamily="49" charset="0"/>
+              </a:rPr>
+              <a:t> </a:t>
+            </a:r>
+            <a:r>
+              <a:rPr kumimoji="0" lang="de-DE" altLang="de-DE" sz="1600" b="0" i="0" u="none" strike="noStrike" cap="none" normalizeH="0" baseline="0" dirty="0">
+                <a:ln>
+                  <a:noFill/>
+                </a:ln>
+                <a:solidFill>
+                  <a:srgbClr val="000000"/>
+                </a:solidFill>
+                <a:effectLst/>
+                <a:latin typeface="Courier New" panose="02070309020205020404" pitchFamily="49" charset="0"/>
+                <a:cs typeface="Courier New" panose="02070309020205020404" pitchFamily="49" charset="0"/>
+              </a:rPr>
+              <a:t>(</a:t>
+            </a:r>
+            <a:r>
+              <a:rPr kumimoji="0" lang="de-DE" altLang="de-DE" sz="1600" b="0" i="0" u="none" strike="noStrike" cap="none" normalizeH="0" baseline="0" dirty="0" err="1">
+                <a:ln>
+                  <a:noFill/>
+                </a:ln>
+                <a:solidFill>
+                  <a:srgbClr val="000000"/>
+                </a:solidFill>
+                <a:effectLst/>
+                <a:latin typeface="Courier New" panose="02070309020205020404" pitchFamily="49" charset="0"/>
+                <a:cs typeface="Courier New" panose="02070309020205020404" pitchFamily="49" charset="0"/>
+              </a:rPr>
+              <a:t>node.</a:t>
+            </a:r>
+            <a:r>
+              <a:rPr kumimoji="0" lang="de-DE" altLang="de-DE" sz="1600" b="1" i="0" u="none" strike="noStrike" cap="none" normalizeH="0" baseline="0" dirty="0" err="1">
+                <a:ln>
+                  <a:noFill/>
+                </a:ln>
+                <a:solidFill>
+                  <a:srgbClr val="660E7A"/>
+                </a:solidFill>
+                <a:effectLst/>
+                <a:latin typeface="Courier New" panose="02070309020205020404" pitchFamily="49" charset="0"/>
+                <a:cs typeface="Courier New" panose="02070309020205020404" pitchFamily="49" charset="0"/>
+              </a:rPr>
+              <a:t>isZero</a:t>
+            </a:r>
+            <a:r>
+              <a:rPr kumimoji="0" lang="de-DE" altLang="de-DE" sz="1600" b="0" i="0" u="none" strike="noStrike" cap="none" normalizeH="0" baseline="0" dirty="0">
+                <a:ln>
+                  <a:noFill/>
+                </a:ln>
+                <a:solidFill>
+                  <a:srgbClr val="000000"/>
+                </a:solidFill>
+                <a:effectLst/>
+                <a:latin typeface="Courier New" panose="02070309020205020404" pitchFamily="49" charset="0"/>
+                <a:cs typeface="Courier New" panose="02070309020205020404" pitchFamily="49" charset="0"/>
+              </a:rPr>
+              <a:t>) {</a:t>
+            </a:r>
+            <a:br>
+              <a:rPr kumimoji="0" lang="de-DE" altLang="de-DE" sz="1600" b="0" i="0" u="none" strike="noStrike" cap="none" normalizeH="0" baseline="0" dirty="0">
+                <a:ln>
+                  <a:noFill/>
+                </a:ln>
+                <a:solidFill>
+                  <a:srgbClr val="000000"/>
+                </a:solidFill>
+                <a:effectLst/>
+                <a:latin typeface="Courier New" panose="02070309020205020404" pitchFamily="49" charset="0"/>
+                <a:cs typeface="Courier New" panose="02070309020205020404" pitchFamily="49" charset="0"/>
+              </a:rPr>
+            </a:br>
+            <a:r>
+              <a:rPr kumimoji="0" lang="de-DE" altLang="de-DE" sz="1600" b="0" i="0" u="none" strike="noStrike" cap="none" normalizeH="0" baseline="0" dirty="0">
+                <a:ln>
+                  <a:noFill/>
+                </a:ln>
+                <a:solidFill>
+                  <a:srgbClr val="000000"/>
+                </a:solidFill>
+                <a:effectLst/>
+                <a:latin typeface="Courier New" panose="02070309020205020404" pitchFamily="49" charset="0"/>
+                <a:cs typeface="Courier New" panose="02070309020205020404" pitchFamily="49" charset="0"/>
+              </a:rPr>
+              <a:t>        </a:t>
+            </a:r>
+            <a:r>
+              <a:rPr kumimoji="0" lang="de-DE" altLang="de-DE" sz="1600" b="1" i="0" u="none" strike="noStrike" cap="none" normalizeH="0" baseline="0" dirty="0" err="1">
+                <a:ln>
+                  <a:noFill/>
+                </a:ln>
+                <a:solidFill>
+                  <a:srgbClr val="000080"/>
+                </a:solidFill>
+                <a:effectLst/>
+                <a:latin typeface="Courier New" panose="02070309020205020404" pitchFamily="49" charset="0"/>
+                <a:cs typeface="Courier New" panose="02070309020205020404" pitchFamily="49" charset="0"/>
+              </a:rPr>
+              <a:t>return</a:t>
+            </a:r>
+            <a:r>
+              <a:rPr kumimoji="0" lang="de-DE" altLang="de-DE" sz="1600" b="1" i="0" u="none" strike="noStrike" cap="none" normalizeH="0" baseline="0" dirty="0">
+                <a:ln>
+                  <a:noFill/>
+                </a:ln>
+                <a:solidFill>
+                  <a:srgbClr val="000080"/>
+                </a:solidFill>
+                <a:effectLst/>
+                <a:latin typeface="Courier New" panose="02070309020205020404" pitchFamily="49" charset="0"/>
+                <a:cs typeface="Courier New" panose="02070309020205020404" pitchFamily="49" charset="0"/>
+              </a:rPr>
+              <a:t> </a:t>
+            </a:r>
+            <a:r>
+              <a:rPr kumimoji="0" lang="de-DE" altLang="de-DE" sz="1600" b="0" i="1" u="none" strike="noStrike" cap="none" normalizeH="0" baseline="0" dirty="0" err="1">
+                <a:ln>
+                  <a:noFill/>
+                </a:ln>
+                <a:solidFill>
+                  <a:srgbClr val="000000"/>
+                </a:solidFill>
+                <a:effectLst/>
+                <a:latin typeface="Courier New" panose="02070309020205020404" pitchFamily="49" charset="0"/>
+                <a:cs typeface="Courier New" panose="02070309020205020404" pitchFamily="49" charset="0"/>
+              </a:rPr>
+              <a:t>generateSequence</a:t>
+            </a:r>
+            <a:r>
+              <a:rPr kumimoji="0" lang="de-DE" altLang="de-DE" sz="1600" b="0" i="0" u="none" strike="noStrike" cap="none" normalizeH="0" baseline="0" dirty="0">
+                <a:ln>
+                  <a:noFill/>
+                </a:ln>
+                <a:solidFill>
+                  <a:srgbClr val="000000"/>
+                </a:solidFill>
+                <a:effectLst/>
+                <a:latin typeface="Courier New" panose="02070309020205020404" pitchFamily="49" charset="0"/>
+                <a:cs typeface="Courier New" panose="02070309020205020404" pitchFamily="49" charset="0"/>
+              </a:rPr>
+              <a:t>(</a:t>
+            </a:r>
+            <a:r>
+              <a:rPr kumimoji="0" lang="de-DE" altLang="de-DE" sz="1600" b="1" i="0" u="none" strike="noStrike" cap="none" normalizeH="0" baseline="0" dirty="0" err="1">
+                <a:ln>
+                  <a:noFill/>
+                </a:ln>
+                <a:solidFill>
+                  <a:srgbClr val="660E7A"/>
+                </a:solidFill>
+                <a:effectLst/>
+                <a:latin typeface="Courier New" panose="02070309020205020404" pitchFamily="49" charset="0"/>
+                <a:cs typeface="Courier New" panose="02070309020205020404" pitchFamily="49" charset="0"/>
+              </a:rPr>
+              <a:t>zeros</a:t>
+            </a:r>
+            <a:r>
+              <a:rPr kumimoji="0" lang="de-DE" altLang="de-DE" sz="1600" b="0" i="0" u="none" strike="noStrike" cap="none" normalizeH="0" baseline="0" dirty="0">
+                <a:ln>
+                  <a:noFill/>
+                </a:ln>
+                <a:solidFill>
+                  <a:srgbClr val="000000"/>
+                </a:solidFill>
+                <a:effectLst/>
+                <a:latin typeface="Courier New" panose="02070309020205020404" pitchFamily="49" charset="0"/>
+                <a:cs typeface="Courier New" panose="02070309020205020404" pitchFamily="49" charset="0"/>
+              </a:rPr>
+              <a:t>)</a:t>
+            </a:r>
+            <a:br>
+              <a:rPr kumimoji="0" lang="de-DE" altLang="de-DE" sz="1600" b="0" i="0" u="none" strike="noStrike" cap="none" normalizeH="0" baseline="0" dirty="0">
+                <a:ln>
+                  <a:noFill/>
+                </a:ln>
+                <a:solidFill>
+                  <a:srgbClr val="000000"/>
+                </a:solidFill>
+                <a:effectLst/>
+                <a:latin typeface="Courier New" panose="02070309020205020404" pitchFamily="49" charset="0"/>
+                <a:cs typeface="Courier New" panose="02070309020205020404" pitchFamily="49" charset="0"/>
+              </a:rPr>
+            </a:br>
+            <a:r>
+              <a:rPr kumimoji="0" lang="de-DE" altLang="de-DE" sz="1600" b="0" i="0" u="none" strike="noStrike" cap="none" normalizeH="0" baseline="0" dirty="0">
+                <a:ln>
+                  <a:noFill/>
+                </a:ln>
+                <a:solidFill>
+                  <a:srgbClr val="000000"/>
+                </a:solidFill>
+                <a:effectLst/>
+                <a:latin typeface="Courier New" panose="02070309020205020404" pitchFamily="49" charset="0"/>
+                <a:cs typeface="Courier New" panose="02070309020205020404" pitchFamily="49" charset="0"/>
+              </a:rPr>
+              <a:t>    } </a:t>
+            </a:r>
+            <a:r>
+              <a:rPr kumimoji="0" lang="de-DE" altLang="de-DE" sz="1600" b="1" i="0" u="none" strike="noStrike" cap="none" normalizeH="0" baseline="0" dirty="0" err="1">
+                <a:ln>
+                  <a:noFill/>
+                </a:ln>
+                <a:solidFill>
+                  <a:srgbClr val="000080"/>
+                </a:solidFill>
+                <a:effectLst/>
+                <a:latin typeface="Courier New" panose="02070309020205020404" pitchFamily="49" charset="0"/>
+                <a:cs typeface="Courier New" panose="02070309020205020404" pitchFamily="49" charset="0"/>
+              </a:rPr>
+              <a:t>else</a:t>
+            </a:r>
+            <a:r>
+              <a:rPr kumimoji="0" lang="de-DE" altLang="de-DE" sz="1600" b="1" i="0" u="none" strike="noStrike" cap="none" normalizeH="0" baseline="0" dirty="0">
+                <a:ln>
+                  <a:noFill/>
+                </a:ln>
+                <a:solidFill>
+                  <a:srgbClr val="000080"/>
+                </a:solidFill>
+                <a:effectLst/>
+                <a:latin typeface="Courier New" panose="02070309020205020404" pitchFamily="49" charset="0"/>
+                <a:cs typeface="Courier New" panose="02070309020205020404" pitchFamily="49" charset="0"/>
+              </a:rPr>
+              <a:t> </a:t>
+            </a:r>
+            <a:r>
+              <a:rPr kumimoji="0" lang="de-DE" altLang="de-DE" sz="1600" b="1" i="0" u="none" strike="noStrike" cap="none" normalizeH="0" baseline="0" dirty="0" err="1">
+                <a:ln>
+                  <a:noFill/>
+                </a:ln>
+                <a:solidFill>
+                  <a:srgbClr val="000080"/>
+                </a:solidFill>
+                <a:effectLst/>
+                <a:latin typeface="Courier New" panose="02070309020205020404" pitchFamily="49" charset="0"/>
+                <a:cs typeface="Courier New" panose="02070309020205020404" pitchFamily="49" charset="0"/>
+              </a:rPr>
+              <a:t>if</a:t>
+            </a:r>
+            <a:r>
+              <a:rPr kumimoji="0" lang="de-DE" altLang="de-DE" sz="1600" b="1" i="0" u="none" strike="noStrike" cap="none" normalizeH="0" baseline="0" dirty="0">
+                <a:ln>
+                  <a:noFill/>
+                </a:ln>
+                <a:solidFill>
+                  <a:srgbClr val="000080"/>
+                </a:solidFill>
+                <a:effectLst/>
+                <a:latin typeface="Courier New" panose="02070309020205020404" pitchFamily="49" charset="0"/>
+                <a:cs typeface="Courier New" panose="02070309020205020404" pitchFamily="49" charset="0"/>
+              </a:rPr>
+              <a:t> </a:t>
+            </a:r>
+            <a:r>
+              <a:rPr kumimoji="0" lang="de-DE" altLang="de-DE" sz="1600" b="0" i="0" u="none" strike="noStrike" cap="none" normalizeH="0" baseline="0" dirty="0">
+                <a:ln>
+                  <a:noFill/>
+                </a:ln>
+                <a:solidFill>
+                  <a:srgbClr val="000000"/>
+                </a:solidFill>
+                <a:effectLst/>
+                <a:latin typeface="Courier New" panose="02070309020205020404" pitchFamily="49" charset="0"/>
+                <a:cs typeface="Courier New" panose="02070309020205020404" pitchFamily="49" charset="0"/>
+              </a:rPr>
+              <a:t>(</a:t>
+            </a:r>
+            <a:r>
+              <a:rPr kumimoji="0" lang="de-DE" altLang="de-DE" sz="1600" b="0" i="0" u="none" strike="noStrike" cap="none" normalizeH="0" baseline="0" dirty="0" err="1">
+                <a:ln>
+                  <a:noFill/>
+                </a:ln>
+                <a:solidFill>
+                  <a:srgbClr val="000000"/>
+                </a:solidFill>
+                <a:effectLst/>
+                <a:latin typeface="Courier New" panose="02070309020205020404" pitchFamily="49" charset="0"/>
+                <a:cs typeface="Courier New" panose="02070309020205020404" pitchFamily="49" charset="0"/>
+              </a:rPr>
+              <a:t>node.</a:t>
+            </a:r>
+            <a:r>
+              <a:rPr kumimoji="0" lang="de-DE" altLang="de-DE" sz="1600" b="1" i="0" u="none" strike="noStrike" cap="none" normalizeH="0" baseline="0" dirty="0" err="1">
+                <a:ln>
+                  <a:noFill/>
+                </a:ln>
+                <a:solidFill>
+                  <a:srgbClr val="660E7A"/>
+                </a:solidFill>
+                <a:effectLst/>
+                <a:latin typeface="Courier New" panose="02070309020205020404" pitchFamily="49" charset="0"/>
+                <a:cs typeface="Courier New" panose="02070309020205020404" pitchFamily="49" charset="0"/>
+              </a:rPr>
+              <a:t>isOne</a:t>
+            </a:r>
+            <a:r>
+              <a:rPr kumimoji="0" lang="de-DE" altLang="de-DE" sz="1600" b="0" i="0" u="none" strike="noStrike" cap="none" normalizeH="0" baseline="0" dirty="0">
+                <a:ln>
+                  <a:noFill/>
+                </a:ln>
+                <a:solidFill>
+                  <a:srgbClr val="000000"/>
+                </a:solidFill>
+                <a:effectLst/>
+                <a:latin typeface="Courier New" panose="02070309020205020404" pitchFamily="49" charset="0"/>
+                <a:cs typeface="Courier New" panose="02070309020205020404" pitchFamily="49" charset="0"/>
+              </a:rPr>
+              <a:t>) {</a:t>
+            </a:r>
+            <a:br>
+              <a:rPr kumimoji="0" lang="de-DE" altLang="de-DE" sz="1600" b="0" i="0" u="none" strike="noStrike" cap="none" normalizeH="0" baseline="0" dirty="0">
+                <a:ln>
+                  <a:noFill/>
+                </a:ln>
+                <a:solidFill>
+                  <a:srgbClr val="000000"/>
+                </a:solidFill>
+                <a:effectLst/>
+                <a:latin typeface="Courier New" panose="02070309020205020404" pitchFamily="49" charset="0"/>
+                <a:cs typeface="Courier New" panose="02070309020205020404" pitchFamily="49" charset="0"/>
+              </a:rPr>
+            </a:br>
+            <a:r>
+              <a:rPr kumimoji="0" lang="de-DE" altLang="de-DE" sz="1600" b="0" i="0" u="none" strike="noStrike" cap="none" normalizeH="0" baseline="0" dirty="0">
+                <a:ln>
+                  <a:noFill/>
+                </a:ln>
+                <a:solidFill>
+                  <a:srgbClr val="000000"/>
+                </a:solidFill>
+                <a:effectLst/>
+                <a:latin typeface="Courier New" panose="02070309020205020404" pitchFamily="49" charset="0"/>
+                <a:cs typeface="Courier New" panose="02070309020205020404" pitchFamily="49" charset="0"/>
+              </a:rPr>
+              <a:t>        </a:t>
+            </a:r>
+            <a:r>
+              <a:rPr kumimoji="0" lang="de-DE" altLang="de-DE" sz="1600" b="1" i="0" u="none" strike="noStrike" cap="none" normalizeH="0" baseline="0" dirty="0" err="1">
+                <a:ln>
+                  <a:noFill/>
+                </a:ln>
+                <a:solidFill>
+                  <a:srgbClr val="000080"/>
+                </a:solidFill>
+                <a:effectLst/>
+                <a:latin typeface="Courier New" panose="02070309020205020404" pitchFamily="49" charset="0"/>
+                <a:cs typeface="Courier New" panose="02070309020205020404" pitchFamily="49" charset="0"/>
+              </a:rPr>
+              <a:t>return</a:t>
+            </a:r>
+            <a:r>
+              <a:rPr kumimoji="0" lang="de-DE" altLang="de-DE" sz="1600" b="1" i="0" u="none" strike="noStrike" cap="none" normalizeH="0" baseline="0" dirty="0">
+                <a:ln>
+                  <a:noFill/>
+                </a:ln>
+                <a:solidFill>
+                  <a:srgbClr val="000080"/>
+                </a:solidFill>
+                <a:effectLst/>
+                <a:latin typeface="Courier New" panose="02070309020205020404" pitchFamily="49" charset="0"/>
+                <a:cs typeface="Courier New" panose="02070309020205020404" pitchFamily="49" charset="0"/>
+              </a:rPr>
+              <a:t> </a:t>
+            </a:r>
+            <a:r>
+              <a:rPr kumimoji="0" lang="de-DE" altLang="de-DE" sz="1600" b="0" i="1" u="none" strike="noStrike" cap="none" normalizeH="0" baseline="0" dirty="0" err="1">
+                <a:ln>
+                  <a:noFill/>
+                </a:ln>
+                <a:solidFill>
+                  <a:srgbClr val="000000"/>
+                </a:solidFill>
+                <a:effectLst/>
+                <a:latin typeface="Courier New" panose="02070309020205020404" pitchFamily="49" charset="0"/>
+                <a:cs typeface="Courier New" panose="02070309020205020404" pitchFamily="49" charset="0"/>
+              </a:rPr>
+              <a:t>generateSequence</a:t>
+            </a:r>
+            <a:r>
+              <a:rPr kumimoji="0" lang="de-DE" altLang="de-DE" sz="1600" b="0" i="0" u="none" strike="noStrike" cap="none" normalizeH="0" baseline="0" dirty="0">
+                <a:ln>
+                  <a:noFill/>
+                </a:ln>
+                <a:solidFill>
+                  <a:srgbClr val="000000"/>
+                </a:solidFill>
+                <a:effectLst/>
+                <a:latin typeface="Courier New" panose="02070309020205020404" pitchFamily="49" charset="0"/>
+                <a:cs typeface="Courier New" panose="02070309020205020404" pitchFamily="49" charset="0"/>
+              </a:rPr>
+              <a:t>(</a:t>
+            </a:r>
+            <a:r>
+              <a:rPr kumimoji="0" lang="de-DE" altLang="de-DE" sz="1600" b="1" i="0" u="none" strike="noStrike" cap="none" normalizeH="0" baseline="0" dirty="0" err="1">
+                <a:ln>
+                  <a:noFill/>
+                </a:ln>
+                <a:solidFill>
+                  <a:srgbClr val="660E7A"/>
+                </a:solidFill>
+                <a:effectLst/>
+                <a:latin typeface="Courier New" panose="02070309020205020404" pitchFamily="49" charset="0"/>
+                <a:cs typeface="Courier New" panose="02070309020205020404" pitchFamily="49" charset="0"/>
+              </a:rPr>
+              <a:t>ones</a:t>
+            </a:r>
+            <a:r>
+              <a:rPr kumimoji="0" lang="de-DE" altLang="de-DE" sz="1600" b="0" i="0" u="none" strike="noStrike" cap="none" normalizeH="0" baseline="0" dirty="0">
+                <a:ln>
+                  <a:noFill/>
+                </a:ln>
+                <a:solidFill>
+                  <a:srgbClr val="000000"/>
+                </a:solidFill>
+                <a:effectLst/>
+                <a:latin typeface="Courier New" panose="02070309020205020404" pitchFamily="49" charset="0"/>
+                <a:cs typeface="Courier New" panose="02070309020205020404" pitchFamily="49" charset="0"/>
+              </a:rPr>
+              <a:t>)</a:t>
+            </a:r>
+            <a:br>
+              <a:rPr kumimoji="0" lang="de-DE" altLang="de-DE" sz="1600" b="0" i="0" u="none" strike="noStrike" cap="none" normalizeH="0" baseline="0" dirty="0">
+                <a:ln>
+                  <a:noFill/>
+                </a:ln>
+                <a:solidFill>
+                  <a:srgbClr val="000000"/>
+                </a:solidFill>
+                <a:effectLst/>
+                <a:latin typeface="Courier New" panose="02070309020205020404" pitchFamily="49" charset="0"/>
+                <a:cs typeface="Courier New" panose="02070309020205020404" pitchFamily="49" charset="0"/>
+              </a:rPr>
+            </a:br>
+            <a:r>
+              <a:rPr kumimoji="0" lang="de-DE" altLang="de-DE" sz="1600" b="0" i="0" u="none" strike="noStrike" cap="none" normalizeH="0" baseline="0" dirty="0">
+                <a:ln>
+                  <a:noFill/>
+                </a:ln>
+                <a:solidFill>
+                  <a:srgbClr val="000000"/>
+                </a:solidFill>
+                <a:effectLst/>
+                <a:latin typeface="Courier New" panose="02070309020205020404" pitchFamily="49" charset="0"/>
+                <a:cs typeface="Courier New" panose="02070309020205020404" pitchFamily="49" charset="0"/>
+              </a:rPr>
+              <a:t>    } </a:t>
+            </a:r>
+            <a:r>
+              <a:rPr kumimoji="0" lang="de-DE" altLang="de-DE" sz="1600" b="1" i="0" u="none" strike="noStrike" cap="none" normalizeH="0" baseline="0" dirty="0" err="1">
+                <a:ln>
+                  <a:noFill/>
+                </a:ln>
+                <a:solidFill>
+                  <a:srgbClr val="000080"/>
+                </a:solidFill>
+                <a:effectLst/>
+                <a:latin typeface="Courier New" panose="02070309020205020404" pitchFamily="49" charset="0"/>
+                <a:cs typeface="Courier New" panose="02070309020205020404" pitchFamily="49" charset="0"/>
+              </a:rPr>
+              <a:t>else</a:t>
+            </a:r>
+            <a:r>
+              <a:rPr kumimoji="0" lang="de-DE" altLang="de-DE" sz="1600" b="1" i="0" u="none" strike="noStrike" cap="none" normalizeH="0" baseline="0" dirty="0">
+                <a:ln>
+                  <a:noFill/>
+                </a:ln>
+                <a:solidFill>
+                  <a:srgbClr val="000080"/>
+                </a:solidFill>
+                <a:effectLst/>
+                <a:latin typeface="Courier New" panose="02070309020205020404" pitchFamily="49" charset="0"/>
+                <a:cs typeface="Courier New" panose="02070309020205020404" pitchFamily="49" charset="0"/>
+              </a:rPr>
+              <a:t> </a:t>
+            </a:r>
+            <a:r>
+              <a:rPr kumimoji="0" lang="de-DE" altLang="de-DE" sz="1600" b="1" i="0" u="none" strike="noStrike" cap="none" normalizeH="0" baseline="0" dirty="0" err="1">
+                <a:ln>
+                  <a:noFill/>
+                </a:ln>
+                <a:solidFill>
+                  <a:srgbClr val="000080"/>
+                </a:solidFill>
+                <a:effectLst/>
+                <a:latin typeface="Courier New" panose="02070309020205020404" pitchFamily="49" charset="0"/>
+                <a:cs typeface="Courier New" panose="02070309020205020404" pitchFamily="49" charset="0"/>
+              </a:rPr>
+              <a:t>if</a:t>
+            </a:r>
+            <a:r>
+              <a:rPr kumimoji="0" lang="de-DE" altLang="de-DE" sz="1600" b="1" i="0" u="none" strike="noStrike" cap="none" normalizeH="0" baseline="0" dirty="0">
+                <a:ln>
+                  <a:noFill/>
+                </a:ln>
+                <a:solidFill>
+                  <a:srgbClr val="000080"/>
+                </a:solidFill>
+                <a:effectLst/>
+                <a:latin typeface="Courier New" panose="02070309020205020404" pitchFamily="49" charset="0"/>
+                <a:cs typeface="Courier New" panose="02070309020205020404" pitchFamily="49" charset="0"/>
+              </a:rPr>
+              <a:t> </a:t>
+            </a:r>
+            <a:r>
+              <a:rPr kumimoji="0" lang="de-DE" altLang="de-DE" sz="1600" b="0" i="0" u="none" strike="noStrike" cap="none" normalizeH="0" baseline="0" dirty="0">
+                <a:ln>
+                  <a:noFill/>
+                </a:ln>
+                <a:solidFill>
+                  <a:srgbClr val="000000"/>
+                </a:solidFill>
+                <a:effectLst/>
+                <a:latin typeface="Courier New" panose="02070309020205020404" pitchFamily="49" charset="0"/>
+                <a:cs typeface="Courier New" panose="02070309020205020404" pitchFamily="49" charset="0"/>
+              </a:rPr>
+              <a:t>(</a:t>
+            </a:r>
+            <a:r>
+              <a:rPr kumimoji="0" lang="de-DE" altLang="de-DE" sz="1600" b="1" i="0" u="none" strike="noStrike" cap="none" normalizeH="0" baseline="0" dirty="0" err="1">
+                <a:ln>
+                  <a:noFill/>
+                </a:ln>
+                <a:solidFill>
+                  <a:srgbClr val="660E7A"/>
+                </a:solidFill>
+                <a:effectLst/>
+                <a:latin typeface="Courier New" panose="02070309020205020404" pitchFamily="49" charset="0"/>
+                <a:cs typeface="Courier New" panose="02070309020205020404" pitchFamily="49" charset="0"/>
+              </a:rPr>
+              <a:t>computedTable</a:t>
+            </a:r>
+            <a:r>
+              <a:rPr kumimoji="0" lang="de-DE" altLang="de-DE" sz="1600" b="0" i="0" u="none" strike="noStrike" cap="none" normalizeH="0" baseline="0" dirty="0" err="1">
+                <a:ln>
+                  <a:noFill/>
+                </a:ln>
+                <a:solidFill>
+                  <a:srgbClr val="000000"/>
+                </a:solidFill>
+                <a:effectLst/>
+                <a:latin typeface="Courier New" panose="02070309020205020404" pitchFamily="49" charset="0"/>
+                <a:cs typeface="Courier New" panose="02070309020205020404" pitchFamily="49" charset="0"/>
+              </a:rPr>
+              <a:t>.containsKey</a:t>
+            </a:r>
+            <a:r>
+              <a:rPr kumimoji="0" lang="de-DE" altLang="de-DE" sz="1600" b="0" i="0" u="none" strike="noStrike" cap="none" normalizeH="0" baseline="0" dirty="0">
+                <a:ln>
+                  <a:noFill/>
+                </a:ln>
+                <a:solidFill>
+                  <a:srgbClr val="000000"/>
+                </a:solidFill>
+                <a:effectLst/>
+                <a:latin typeface="Courier New" panose="02070309020205020404" pitchFamily="49" charset="0"/>
+                <a:cs typeface="Courier New" panose="02070309020205020404" pitchFamily="49" charset="0"/>
+              </a:rPr>
+              <a:t>(</a:t>
+            </a:r>
+            <a:r>
+              <a:rPr kumimoji="0" lang="de-DE" altLang="de-DE" sz="1600" b="0" i="0" u="none" strike="noStrike" cap="none" normalizeH="0" baseline="0" dirty="0" err="1">
+                <a:ln>
+                  <a:noFill/>
+                </a:ln>
+                <a:solidFill>
+                  <a:srgbClr val="000000"/>
+                </a:solidFill>
+                <a:effectLst/>
+                <a:latin typeface="Courier New" panose="02070309020205020404" pitchFamily="49" charset="0"/>
+                <a:cs typeface="Courier New" panose="02070309020205020404" pitchFamily="49" charset="0"/>
+              </a:rPr>
+              <a:t>node</a:t>
+            </a:r>
+            <a:r>
+              <a:rPr kumimoji="0" lang="de-DE" altLang="de-DE" sz="1600" b="0" i="0" u="none" strike="noStrike" cap="none" normalizeH="0" baseline="0" dirty="0">
+                <a:ln>
+                  <a:noFill/>
+                </a:ln>
+                <a:solidFill>
+                  <a:srgbClr val="000000"/>
+                </a:solidFill>
+                <a:effectLst/>
+                <a:latin typeface="Courier New" panose="02070309020205020404" pitchFamily="49" charset="0"/>
+                <a:cs typeface="Courier New" panose="02070309020205020404" pitchFamily="49" charset="0"/>
+              </a:rPr>
+              <a:t>)) {</a:t>
+            </a:r>
+            <a:br>
+              <a:rPr kumimoji="0" lang="de-DE" altLang="de-DE" sz="1600" b="0" i="0" u="none" strike="noStrike" cap="none" normalizeH="0" baseline="0" dirty="0">
+                <a:ln>
+                  <a:noFill/>
+                </a:ln>
+                <a:solidFill>
+                  <a:srgbClr val="000000"/>
+                </a:solidFill>
+                <a:effectLst/>
+                <a:latin typeface="Courier New" panose="02070309020205020404" pitchFamily="49" charset="0"/>
+                <a:cs typeface="Courier New" panose="02070309020205020404" pitchFamily="49" charset="0"/>
+              </a:rPr>
+            </a:br>
+            <a:r>
+              <a:rPr kumimoji="0" lang="de-DE" altLang="de-DE" sz="1600" b="0" i="0" u="none" strike="noStrike" cap="none" normalizeH="0" baseline="0" dirty="0">
+                <a:ln>
+                  <a:noFill/>
+                </a:ln>
+                <a:solidFill>
+                  <a:srgbClr val="000000"/>
+                </a:solidFill>
+                <a:effectLst/>
+                <a:latin typeface="Courier New" panose="02070309020205020404" pitchFamily="49" charset="0"/>
+                <a:cs typeface="Courier New" panose="02070309020205020404" pitchFamily="49" charset="0"/>
+              </a:rPr>
+              <a:t>        </a:t>
+            </a:r>
+            <a:r>
+              <a:rPr kumimoji="0" lang="de-DE" altLang="de-DE" sz="1600" b="1" i="0" u="none" strike="noStrike" cap="none" normalizeH="0" baseline="0" dirty="0" err="1">
+                <a:ln>
+                  <a:noFill/>
+                </a:ln>
+                <a:solidFill>
+                  <a:srgbClr val="000080"/>
+                </a:solidFill>
+                <a:effectLst/>
+                <a:latin typeface="Courier New" panose="02070309020205020404" pitchFamily="49" charset="0"/>
+                <a:cs typeface="Courier New" panose="02070309020205020404" pitchFamily="49" charset="0"/>
+              </a:rPr>
+              <a:t>return</a:t>
+            </a:r>
+            <a:r>
+              <a:rPr kumimoji="0" lang="de-DE" altLang="de-DE" sz="1600" b="1" i="0" u="none" strike="noStrike" cap="none" normalizeH="0" baseline="0" dirty="0">
+                <a:ln>
+                  <a:noFill/>
+                </a:ln>
+                <a:solidFill>
+                  <a:srgbClr val="000080"/>
+                </a:solidFill>
+                <a:effectLst/>
+                <a:latin typeface="Courier New" panose="02070309020205020404" pitchFamily="49" charset="0"/>
+                <a:cs typeface="Courier New" panose="02070309020205020404" pitchFamily="49" charset="0"/>
+              </a:rPr>
+              <a:t> </a:t>
+            </a:r>
+            <a:r>
+              <a:rPr kumimoji="0" lang="de-DE" altLang="de-DE" sz="1600" b="1" i="0" u="none" strike="noStrike" cap="none" normalizeH="0" baseline="0" dirty="0" err="1">
+                <a:ln>
+                  <a:noFill/>
+                </a:ln>
+                <a:solidFill>
+                  <a:srgbClr val="660E7A"/>
+                </a:solidFill>
+                <a:effectLst/>
+                <a:latin typeface="Courier New" panose="02070309020205020404" pitchFamily="49" charset="0"/>
+                <a:cs typeface="Courier New" panose="02070309020205020404" pitchFamily="49" charset="0"/>
+              </a:rPr>
+              <a:t>computedTable</a:t>
+            </a:r>
+            <a:r>
+              <a:rPr kumimoji="0" lang="de-DE" altLang="de-DE" sz="1600" b="0" i="0" u="none" strike="noStrike" cap="none" normalizeH="0" baseline="0" dirty="0">
+                <a:ln>
+                  <a:noFill/>
+                </a:ln>
+                <a:solidFill>
+                  <a:srgbClr val="000000"/>
+                </a:solidFill>
+                <a:effectLst/>
+                <a:latin typeface="Courier New" panose="02070309020205020404" pitchFamily="49" charset="0"/>
+                <a:cs typeface="Courier New" panose="02070309020205020404" pitchFamily="49" charset="0"/>
+              </a:rPr>
+              <a:t>[</a:t>
+            </a:r>
+            <a:r>
+              <a:rPr kumimoji="0" lang="de-DE" altLang="de-DE" sz="1600" b="0" i="0" u="none" strike="noStrike" cap="none" normalizeH="0" baseline="0" dirty="0" err="1">
+                <a:ln>
+                  <a:noFill/>
+                </a:ln>
+                <a:solidFill>
+                  <a:srgbClr val="000000"/>
+                </a:solidFill>
+                <a:effectLst/>
+                <a:latin typeface="Courier New" panose="02070309020205020404" pitchFamily="49" charset="0"/>
+                <a:cs typeface="Courier New" panose="02070309020205020404" pitchFamily="49" charset="0"/>
+              </a:rPr>
+              <a:t>node</a:t>
+            </a:r>
+            <a:r>
+              <a:rPr kumimoji="0" lang="de-DE" altLang="de-DE" sz="1600" b="0" i="0" u="none" strike="noStrike" cap="none" normalizeH="0" baseline="0" dirty="0">
+                <a:ln>
+                  <a:noFill/>
+                </a:ln>
+                <a:solidFill>
+                  <a:srgbClr val="000000"/>
+                </a:solidFill>
+                <a:effectLst/>
+                <a:latin typeface="Courier New" panose="02070309020205020404" pitchFamily="49" charset="0"/>
+                <a:cs typeface="Courier New" panose="02070309020205020404" pitchFamily="49" charset="0"/>
+              </a:rPr>
+              <a:t>]!!.</a:t>
+            </a:r>
+            <a:r>
+              <a:rPr kumimoji="0" lang="de-DE" altLang="de-DE" sz="1600" b="0" i="1" u="none" strike="noStrike" cap="none" normalizeH="0" baseline="0" dirty="0" err="1">
+                <a:ln>
+                  <a:noFill/>
+                </a:ln>
+                <a:solidFill>
+                  <a:srgbClr val="000000"/>
+                </a:solidFill>
+                <a:effectLst/>
+                <a:latin typeface="Courier New" panose="02070309020205020404" pitchFamily="49" charset="0"/>
+                <a:cs typeface="Courier New" panose="02070309020205020404" pitchFamily="49" charset="0"/>
+              </a:rPr>
+              <a:t>asSequence</a:t>
+            </a:r>
+            <a:r>
+              <a:rPr kumimoji="0" lang="de-DE" altLang="de-DE" sz="1600" b="0" i="0" u="none" strike="noStrike" cap="none" normalizeH="0" baseline="0" dirty="0">
+                <a:ln>
+                  <a:noFill/>
+                </a:ln>
+                <a:solidFill>
+                  <a:srgbClr val="000000"/>
+                </a:solidFill>
+                <a:effectLst/>
+                <a:latin typeface="Courier New" panose="02070309020205020404" pitchFamily="49" charset="0"/>
+                <a:cs typeface="Courier New" panose="02070309020205020404" pitchFamily="49" charset="0"/>
+              </a:rPr>
+              <a:t>()</a:t>
+            </a:r>
+            <a:br>
+              <a:rPr kumimoji="0" lang="de-DE" altLang="de-DE" sz="1600" b="0" i="0" u="none" strike="noStrike" cap="none" normalizeH="0" baseline="0" dirty="0">
+                <a:ln>
+                  <a:noFill/>
+                </a:ln>
+                <a:solidFill>
+                  <a:srgbClr val="000000"/>
+                </a:solidFill>
+                <a:effectLst/>
+                <a:latin typeface="Courier New" panose="02070309020205020404" pitchFamily="49" charset="0"/>
+                <a:cs typeface="Courier New" panose="02070309020205020404" pitchFamily="49" charset="0"/>
+              </a:rPr>
+            </a:br>
+            <a:r>
+              <a:rPr kumimoji="0" lang="de-DE" altLang="de-DE" sz="1600" b="0" i="0" u="none" strike="noStrike" cap="none" normalizeH="0" baseline="0" dirty="0">
+                <a:ln>
+                  <a:noFill/>
+                </a:ln>
+                <a:solidFill>
+                  <a:srgbClr val="000000"/>
+                </a:solidFill>
+                <a:effectLst/>
+                <a:latin typeface="Courier New" panose="02070309020205020404" pitchFamily="49" charset="0"/>
+                <a:cs typeface="Courier New" panose="02070309020205020404" pitchFamily="49" charset="0"/>
+              </a:rPr>
+              <a:t>    } </a:t>
+            </a:r>
+            <a:r>
+              <a:rPr kumimoji="0" lang="de-DE" altLang="de-DE" sz="1600" b="1" i="0" u="none" strike="noStrike" cap="none" normalizeH="0" baseline="0" dirty="0" err="1">
+                <a:ln>
+                  <a:noFill/>
+                </a:ln>
+                <a:solidFill>
+                  <a:srgbClr val="000080"/>
+                </a:solidFill>
+                <a:effectLst/>
+                <a:latin typeface="Courier New" panose="02070309020205020404" pitchFamily="49" charset="0"/>
+                <a:cs typeface="Courier New" panose="02070309020205020404" pitchFamily="49" charset="0"/>
+              </a:rPr>
+              <a:t>else</a:t>
+            </a:r>
+            <a:r>
+              <a:rPr kumimoji="0" lang="de-DE" altLang="de-DE" sz="1600" b="1" i="0" u="none" strike="noStrike" cap="none" normalizeH="0" baseline="0" dirty="0">
+                <a:ln>
+                  <a:noFill/>
+                </a:ln>
+                <a:solidFill>
+                  <a:srgbClr val="000080"/>
+                </a:solidFill>
+                <a:effectLst/>
+                <a:latin typeface="Courier New" panose="02070309020205020404" pitchFamily="49" charset="0"/>
+                <a:cs typeface="Courier New" panose="02070309020205020404" pitchFamily="49" charset="0"/>
+              </a:rPr>
+              <a:t> </a:t>
+            </a:r>
+            <a:r>
+              <a:rPr kumimoji="0" lang="de-DE" altLang="de-DE" sz="1600" b="0" i="0" u="none" strike="noStrike" cap="none" normalizeH="0" baseline="0" dirty="0">
+                <a:ln>
+                  <a:noFill/>
+                </a:ln>
+                <a:solidFill>
+                  <a:srgbClr val="000000"/>
+                </a:solidFill>
+                <a:effectLst/>
+                <a:latin typeface="Courier New" panose="02070309020205020404" pitchFamily="49" charset="0"/>
+                <a:cs typeface="Courier New" panose="02070309020205020404" pitchFamily="49" charset="0"/>
+              </a:rPr>
+              <a:t>{</a:t>
+            </a:r>
+            <a:br>
+              <a:rPr kumimoji="0" lang="de-DE" altLang="de-DE" sz="1600" b="0" i="0" u="none" strike="noStrike" cap="none" normalizeH="0" baseline="0" dirty="0">
+                <a:ln>
+                  <a:noFill/>
+                </a:ln>
+                <a:solidFill>
+                  <a:srgbClr val="000000"/>
+                </a:solidFill>
+                <a:effectLst/>
+                <a:latin typeface="Courier New" panose="02070309020205020404" pitchFamily="49" charset="0"/>
+                <a:cs typeface="Courier New" panose="02070309020205020404" pitchFamily="49" charset="0"/>
+              </a:rPr>
+            </a:br>
+            <a:r>
+              <a:rPr kumimoji="0" lang="de-DE" altLang="de-DE" sz="1600" b="0" i="0" u="none" strike="noStrike" cap="none" normalizeH="0" baseline="0" dirty="0">
+                <a:ln>
+                  <a:noFill/>
+                </a:ln>
+                <a:solidFill>
+                  <a:srgbClr val="000000"/>
+                </a:solidFill>
+                <a:effectLst/>
+                <a:latin typeface="Courier New" panose="02070309020205020404" pitchFamily="49" charset="0"/>
+                <a:cs typeface="Courier New" panose="02070309020205020404" pitchFamily="49" charset="0"/>
+              </a:rPr>
+              <a:t>        </a:t>
+            </a:r>
+            <a:r>
+              <a:rPr kumimoji="0" lang="de-DE" altLang="de-DE" sz="1600" b="1" i="0" u="none" strike="noStrike" cap="none" normalizeH="0" baseline="0" dirty="0" err="1">
+                <a:ln>
+                  <a:noFill/>
+                </a:ln>
+                <a:solidFill>
+                  <a:srgbClr val="000080"/>
+                </a:solidFill>
+                <a:effectLst/>
+                <a:latin typeface="Courier New" panose="02070309020205020404" pitchFamily="49" charset="0"/>
+                <a:cs typeface="Courier New" panose="02070309020205020404" pitchFamily="49" charset="0"/>
+              </a:rPr>
+              <a:t>val</a:t>
+            </a:r>
+            <a:r>
+              <a:rPr kumimoji="0" lang="de-DE" altLang="de-DE" sz="1600" b="1" i="0" u="none" strike="noStrike" cap="none" normalizeH="0" baseline="0" dirty="0">
+                <a:ln>
+                  <a:noFill/>
+                </a:ln>
+                <a:solidFill>
+                  <a:srgbClr val="000080"/>
+                </a:solidFill>
+                <a:effectLst/>
+                <a:latin typeface="Courier New" panose="02070309020205020404" pitchFamily="49" charset="0"/>
+                <a:cs typeface="Courier New" panose="02070309020205020404" pitchFamily="49" charset="0"/>
+              </a:rPr>
+              <a:t> </a:t>
+            </a:r>
+            <a:r>
+              <a:rPr kumimoji="0" lang="de-DE" altLang="de-DE" sz="1600" b="0" i="0" u="none" strike="noStrike" cap="none" normalizeH="0" baseline="0" dirty="0" err="1">
+                <a:ln>
+                  <a:noFill/>
+                </a:ln>
+                <a:solidFill>
+                  <a:srgbClr val="000000"/>
+                </a:solidFill>
+                <a:effectLst/>
+                <a:latin typeface="Courier New" panose="02070309020205020404" pitchFamily="49" charset="0"/>
+                <a:cs typeface="Courier New" panose="02070309020205020404" pitchFamily="49" charset="0"/>
+              </a:rPr>
+              <a:t>result</a:t>
+            </a:r>
+            <a:r>
+              <a:rPr kumimoji="0" lang="de-DE" altLang="de-DE" sz="1600" b="0" i="0" u="none" strike="noStrike" cap="none" normalizeH="0" baseline="0" dirty="0">
+                <a:ln>
+                  <a:noFill/>
+                </a:ln>
+                <a:solidFill>
+                  <a:srgbClr val="000000"/>
+                </a:solidFill>
+                <a:effectLst/>
+                <a:latin typeface="Courier New" panose="02070309020205020404" pitchFamily="49" charset="0"/>
+                <a:cs typeface="Courier New" panose="02070309020205020404" pitchFamily="49" charset="0"/>
+              </a:rPr>
+              <a:t> = </a:t>
+            </a:r>
+            <a:r>
+              <a:rPr kumimoji="0" lang="de-DE" altLang="de-DE" sz="1600" b="0" i="0" u="none" strike="noStrike" cap="none" normalizeH="0" baseline="0" dirty="0" err="1">
+                <a:ln>
+                  <a:noFill/>
+                </a:ln>
+                <a:solidFill>
+                  <a:srgbClr val="000000"/>
+                </a:solidFill>
+                <a:effectLst/>
+                <a:latin typeface="Courier New" panose="02070309020205020404" pitchFamily="49" charset="0"/>
+                <a:cs typeface="Courier New" panose="02070309020205020404" pitchFamily="49" charset="0"/>
+              </a:rPr>
+              <a:t>formulaFromChildes</a:t>
+            </a:r>
+            <a:r>
+              <a:rPr kumimoji="0" lang="de-DE" altLang="de-DE" sz="1600" b="0" i="0" u="none" strike="noStrike" cap="none" normalizeH="0" baseline="0" dirty="0">
+                <a:ln>
+                  <a:noFill/>
+                </a:ln>
+                <a:solidFill>
+                  <a:srgbClr val="000000"/>
+                </a:solidFill>
+                <a:effectLst/>
+                <a:latin typeface="Courier New" panose="02070309020205020404" pitchFamily="49" charset="0"/>
+                <a:cs typeface="Courier New" panose="02070309020205020404" pitchFamily="49" charset="0"/>
+              </a:rPr>
+              <a:t>(</a:t>
+            </a:r>
+            <a:r>
+              <a:rPr kumimoji="0" lang="de-DE" altLang="de-DE" sz="1600" b="0" i="0" u="none" strike="noStrike" cap="none" normalizeH="0" baseline="0" dirty="0" err="1">
+                <a:ln>
+                  <a:noFill/>
+                </a:ln>
+                <a:solidFill>
+                  <a:srgbClr val="000000"/>
+                </a:solidFill>
+                <a:effectLst/>
+                <a:latin typeface="Courier New" panose="02070309020205020404" pitchFamily="49" charset="0"/>
+                <a:cs typeface="Courier New" panose="02070309020205020404" pitchFamily="49" charset="0"/>
+              </a:rPr>
+              <a:t>node</a:t>
+            </a:r>
+            <a:r>
+              <a:rPr kumimoji="0" lang="de-DE" altLang="de-DE" sz="1600" b="0" i="0" u="none" strike="noStrike" cap="none" normalizeH="0" baseline="0" dirty="0">
+                <a:ln>
+                  <a:noFill/>
+                </a:ln>
+                <a:solidFill>
+                  <a:srgbClr val="000000"/>
+                </a:solidFill>
+                <a:effectLst/>
+                <a:latin typeface="Courier New" panose="02070309020205020404" pitchFamily="49" charset="0"/>
+                <a:cs typeface="Courier New" panose="02070309020205020404" pitchFamily="49" charset="0"/>
+              </a:rPr>
+              <a:t>).</a:t>
+            </a:r>
+            <a:r>
+              <a:rPr kumimoji="0" lang="de-DE" altLang="de-DE" sz="1600" b="0" i="1" u="none" strike="noStrike" cap="none" normalizeH="0" baseline="0" dirty="0" err="1">
+                <a:ln>
+                  <a:noFill/>
+                </a:ln>
+                <a:solidFill>
+                  <a:srgbClr val="000000"/>
+                </a:solidFill>
+                <a:effectLst/>
+                <a:latin typeface="Courier New" panose="02070309020205020404" pitchFamily="49" charset="0"/>
+                <a:cs typeface="Courier New" panose="02070309020205020404" pitchFamily="49" charset="0"/>
+              </a:rPr>
+              <a:t>toList</a:t>
+            </a:r>
+            <a:r>
+              <a:rPr kumimoji="0" lang="de-DE" altLang="de-DE" sz="1600" b="0" i="0" u="none" strike="noStrike" cap="none" normalizeH="0" baseline="0" dirty="0">
+                <a:ln>
+                  <a:noFill/>
+                </a:ln>
+                <a:solidFill>
+                  <a:srgbClr val="000000"/>
+                </a:solidFill>
+                <a:effectLst/>
+                <a:latin typeface="Courier New" panose="02070309020205020404" pitchFamily="49" charset="0"/>
+                <a:cs typeface="Courier New" panose="02070309020205020404" pitchFamily="49" charset="0"/>
+              </a:rPr>
+              <a:t>()</a:t>
+            </a:r>
+            <a:br>
+              <a:rPr kumimoji="0" lang="de-DE" altLang="de-DE" sz="1600" b="0" i="0" u="none" strike="noStrike" cap="none" normalizeH="0" baseline="0" dirty="0">
+                <a:ln>
+                  <a:noFill/>
+                </a:ln>
+                <a:solidFill>
+                  <a:srgbClr val="000000"/>
+                </a:solidFill>
+                <a:effectLst/>
+                <a:latin typeface="Courier New" panose="02070309020205020404" pitchFamily="49" charset="0"/>
+                <a:cs typeface="Courier New" panose="02070309020205020404" pitchFamily="49" charset="0"/>
+              </a:rPr>
+            </a:br>
+            <a:r>
+              <a:rPr kumimoji="0" lang="de-DE" altLang="de-DE" sz="1600" b="0" i="0" u="none" strike="noStrike" cap="none" normalizeH="0" baseline="0" dirty="0">
+                <a:ln>
+                  <a:noFill/>
+                </a:ln>
+                <a:solidFill>
+                  <a:srgbClr val="000000"/>
+                </a:solidFill>
+                <a:effectLst/>
+                <a:latin typeface="Courier New" panose="02070309020205020404" pitchFamily="49" charset="0"/>
+                <a:cs typeface="Courier New" panose="02070309020205020404" pitchFamily="49" charset="0"/>
+              </a:rPr>
+              <a:t>        </a:t>
+            </a:r>
+            <a:r>
+              <a:rPr kumimoji="0" lang="de-DE" altLang="de-DE" sz="1600" b="1" i="0" u="none" strike="noStrike" cap="none" normalizeH="0" baseline="0" dirty="0" err="1">
+                <a:ln>
+                  <a:noFill/>
+                </a:ln>
+                <a:solidFill>
+                  <a:srgbClr val="660E7A"/>
+                </a:solidFill>
+                <a:effectLst/>
+                <a:latin typeface="Courier New" panose="02070309020205020404" pitchFamily="49" charset="0"/>
+                <a:cs typeface="Courier New" panose="02070309020205020404" pitchFamily="49" charset="0"/>
+              </a:rPr>
+              <a:t>computedTable</a:t>
+            </a:r>
+            <a:r>
+              <a:rPr kumimoji="0" lang="de-DE" altLang="de-DE" sz="1600" b="0" i="0" u="none" strike="noStrike" cap="none" normalizeH="0" baseline="0" dirty="0" err="1">
+                <a:ln>
+                  <a:noFill/>
+                </a:ln>
+                <a:solidFill>
+                  <a:srgbClr val="000000"/>
+                </a:solidFill>
+                <a:effectLst/>
+                <a:latin typeface="Courier New" panose="02070309020205020404" pitchFamily="49" charset="0"/>
+                <a:cs typeface="Courier New" panose="02070309020205020404" pitchFamily="49" charset="0"/>
+              </a:rPr>
+              <a:t>.put</a:t>
+            </a:r>
+            <a:r>
+              <a:rPr kumimoji="0" lang="de-DE" altLang="de-DE" sz="1600" b="0" i="0" u="none" strike="noStrike" cap="none" normalizeH="0" baseline="0" dirty="0">
+                <a:ln>
+                  <a:noFill/>
+                </a:ln>
+                <a:solidFill>
+                  <a:srgbClr val="000000"/>
+                </a:solidFill>
+                <a:effectLst/>
+                <a:latin typeface="Courier New" panose="02070309020205020404" pitchFamily="49" charset="0"/>
+                <a:cs typeface="Courier New" panose="02070309020205020404" pitchFamily="49" charset="0"/>
+              </a:rPr>
+              <a:t>(</a:t>
+            </a:r>
+            <a:r>
+              <a:rPr kumimoji="0" lang="de-DE" altLang="de-DE" sz="1600" b="0" i="0" u="none" strike="noStrike" cap="none" normalizeH="0" baseline="0" dirty="0" err="1">
+                <a:ln>
+                  <a:noFill/>
+                </a:ln>
+                <a:solidFill>
+                  <a:srgbClr val="000000"/>
+                </a:solidFill>
+                <a:effectLst/>
+                <a:latin typeface="Courier New" panose="02070309020205020404" pitchFamily="49" charset="0"/>
+                <a:cs typeface="Courier New" panose="02070309020205020404" pitchFamily="49" charset="0"/>
+              </a:rPr>
+              <a:t>node</a:t>
+            </a:r>
+            <a:r>
+              <a:rPr kumimoji="0" lang="de-DE" altLang="de-DE" sz="1600" b="0" i="0" u="none" strike="noStrike" cap="none" normalizeH="0" baseline="0" dirty="0">
+                <a:ln>
+                  <a:noFill/>
+                </a:ln>
+                <a:solidFill>
+                  <a:srgbClr val="000000"/>
+                </a:solidFill>
+                <a:effectLst/>
+                <a:latin typeface="Courier New" panose="02070309020205020404" pitchFamily="49" charset="0"/>
+                <a:cs typeface="Courier New" panose="02070309020205020404" pitchFamily="49" charset="0"/>
+              </a:rPr>
+              <a:t>, </a:t>
+            </a:r>
+            <a:r>
+              <a:rPr kumimoji="0" lang="de-DE" altLang="de-DE" sz="1600" b="0" i="0" u="none" strike="noStrike" cap="none" normalizeH="0" baseline="0" dirty="0" err="1">
+                <a:ln>
+                  <a:noFill/>
+                </a:ln>
+                <a:solidFill>
+                  <a:srgbClr val="000000"/>
+                </a:solidFill>
+                <a:effectLst/>
+                <a:latin typeface="Courier New" panose="02070309020205020404" pitchFamily="49" charset="0"/>
+                <a:cs typeface="Courier New" panose="02070309020205020404" pitchFamily="49" charset="0"/>
+              </a:rPr>
+              <a:t>result</a:t>
+            </a:r>
+            <a:r>
+              <a:rPr kumimoji="0" lang="de-DE" altLang="de-DE" sz="1600" b="0" i="0" u="none" strike="noStrike" cap="none" normalizeH="0" baseline="0" dirty="0">
+                <a:ln>
+                  <a:noFill/>
+                </a:ln>
+                <a:solidFill>
+                  <a:srgbClr val="000000"/>
+                </a:solidFill>
+                <a:effectLst/>
+                <a:latin typeface="Courier New" panose="02070309020205020404" pitchFamily="49" charset="0"/>
+                <a:cs typeface="Courier New" panose="02070309020205020404" pitchFamily="49" charset="0"/>
+              </a:rPr>
+              <a:t>)</a:t>
+            </a:r>
+            <a:br>
+              <a:rPr kumimoji="0" lang="de-DE" altLang="de-DE" sz="1600" b="0" i="0" u="none" strike="noStrike" cap="none" normalizeH="0" baseline="0" dirty="0">
+                <a:ln>
+                  <a:noFill/>
+                </a:ln>
+                <a:solidFill>
+                  <a:srgbClr val="000000"/>
+                </a:solidFill>
+                <a:effectLst/>
+                <a:latin typeface="Courier New" panose="02070309020205020404" pitchFamily="49" charset="0"/>
+                <a:cs typeface="Courier New" panose="02070309020205020404" pitchFamily="49" charset="0"/>
+              </a:rPr>
+            </a:br>
+            <a:r>
+              <a:rPr kumimoji="0" lang="de-DE" altLang="de-DE" sz="1600" b="0" i="0" u="none" strike="noStrike" cap="none" normalizeH="0" baseline="0" dirty="0">
+                <a:ln>
+                  <a:noFill/>
+                </a:ln>
+                <a:solidFill>
+                  <a:srgbClr val="000000"/>
+                </a:solidFill>
+                <a:effectLst/>
+                <a:latin typeface="Courier New" panose="02070309020205020404" pitchFamily="49" charset="0"/>
+                <a:cs typeface="Courier New" panose="02070309020205020404" pitchFamily="49" charset="0"/>
+              </a:rPr>
+              <a:t>        </a:t>
+            </a:r>
+            <a:r>
+              <a:rPr kumimoji="0" lang="de-DE" altLang="de-DE" sz="1600" b="1" i="0" u="none" strike="noStrike" cap="none" normalizeH="0" baseline="0" dirty="0" err="1">
+                <a:ln>
+                  <a:noFill/>
+                </a:ln>
+                <a:solidFill>
+                  <a:srgbClr val="000080"/>
+                </a:solidFill>
+                <a:effectLst/>
+                <a:latin typeface="Courier New" panose="02070309020205020404" pitchFamily="49" charset="0"/>
+                <a:cs typeface="Courier New" panose="02070309020205020404" pitchFamily="49" charset="0"/>
+              </a:rPr>
+              <a:t>return</a:t>
+            </a:r>
+            <a:r>
+              <a:rPr kumimoji="0" lang="de-DE" altLang="de-DE" sz="1600" b="1" i="0" u="none" strike="noStrike" cap="none" normalizeH="0" baseline="0" dirty="0">
+                <a:ln>
+                  <a:noFill/>
+                </a:ln>
+                <a:solidFill>
+                  <a:srgbClr val="000080"/>
+                </a:solidFill>
+                <a:effectLst/>
+                <a:latin typeface="Courier New" panose="02070309020205020404" pitchFamily="49" charset="0"/>
+                <a:cs typeface="Courier New" panose="02070309020205020404" pitchFamily="49" charset="0"/>
+              </a:rPr>
+              <a:t> </a:t>
+            </a:r>
+            <a:r>
+              <a:rPr kumimoji="0" lang="de-DE" altLang="de-DE" sz="1600" b="0" i="0" u="none" strike="noStrike" cap="none" normalizeH="0" baseline="0" dirty="0" err="1">
+                <a:ln>
+                  <a:noFill/>
+                </a:ln>
+                <a:solidFill>
+                  <a:srgbClr val="000000"/>
+                </a:solidFill>
+                <a:effectLst/>
+                <a:latin typeface="Courier New" panose="02070309020205020404" pitchFamily="49" charset="0"/>
+                <a:cs typeface="Courier New" panose="02070309020205020404" pitchFamily="49" charset="0"/>
+              </a:rPr>
+              <a:t>result.</a:t>
+            </a:r>
+            <a:r>
+              <a:rPr kumimoji="0" lang="de-DE" altLang="de-DE" sz="1600" b="0" i="1" u="none" strike="noStrike" cap="none" normalizeH="0" baseline="0" dirty="0" err="1">
+                <a:ln>
+                  <a:noFill/>
+                </a:ln>
+                <a:solidFill>
+                  <a:srgbClr val="000000"/>
+                </a:solidFill>
+                <a:effectLst/>
+                <a:latin typeface="Courier New" panose="02070309020205020404" pitchFamily="49" charset="0"/>
+                <a:cs typeface="Courier New" panose="02070309020205020404" pitchFamily="49" charset="0"/>
+              </a:rPr>
+              <a:t>asSequence</a:t>
+            </a:r>
+            <a:r>
+              <a:rPr kumimoji="0" lang="de-DE" altLang="de-DE" sz="1600" b="0" i="0" u="none" strike="noStrike" cap="none" normalizeH="0" baseline="0" dirty="0">
+                <a:ln>
+                  <a:noFill/>
+                </a:ln>
+                <a:solidFill>
+                  <a:srgbClr val="000000"/>
+                </a:solidFill>
+                <a:effectLst/>
+                <a:latin typeface="Courier New" panose="02070309020205020404" pitchFamily="49" charset="0"/>
+                <a:cs typeface="Courier New" panose="02070309020205020404" pitchFamily="49" charset="0"/>
+              </a:rPr>
+              <a:t>() </a:t>
+            </a:r>
+            <a:r>
+              <a:rPr kumimoji="0" lang="de-DE" altLang="de-DE" sz="1600" b="0" i="1" u="none" strike="noStrike" cap="none" normalizeH="0" baseline="0" dirty="0">
+                <a:ln>
+                  <a:noFill/>
+                </a:ln>
+                <a:solidFill>
+                  <a:srgbClr val="808080"/>
+                </a:solidFill>
+                <a:effectLst/>
+                <a:latin typeface="Courier New" panose="02070309020205020404" pitchFamily="49" charset="0"/>
+                <a:cs typeface="Courier New" panose="02070309020205020404" pitchFamily="49" charset="0"/>
+              </a:rPr>
+              <a:t>// Eleganz vom Ansatz weg...</a:t>
+            </a:r>
+            <a:br>
+              <a:rPr kumimoji="0" lang="de-DE" altLang="de-DE" sz="1600" b="0" i="1" u="none" strike="noStrike" cap="none" normalizeH="0" baseline="0" dirty="0">
+                <a:ln>
+                  <a:noFill/>
+                </a:ln>
+                <a:solidFill>
+                  <a:srgbClr val="808080"/>
+                </a:solidFill>
+                <a:effectLst/>
+                <a:latin typeface="Courier New" panose="02070309020205020404" pitchFamily="49" charset="0"/>
+                <a:cs typeface="Courier New" panose="02070309020205020404" pitchFamily="49" charset="0"/>
+              </a:rPr>
+            </a:br>
+            <a:r>
+              <a:rPr kumimoji="0" lang="de-DE" altLang="de-DE" sz="1600" b="0" i="1" u="none" strike="noStrike" cap="none" normalizeH="0" baseline="0" dirty="0">
+                <a:ln>
+                  <a:noFill/>
+                </a:ln>
+                <a:solidFill>
+                  <a:srgbClr val="808080"/>
+                </a:solidFill>
+                <a:effectLst/>
+                <a:latin typeface="Courier New" panose="02070309020205020404" pitchFamily="49" charset="0"/>
+                <a:cs typeface="Courier New" panose="02070309020205020404" pitchFamily="49" charset="0"/>
+              </a:rPr>
+              <a:t>    </a:t>
+            </a:r>
+            <a:r>
+              <a:rPr kumimoji="0" lang="de-DE" altLang="de-DE" sz="1600" b="0" i="0" u="none" strike="noStrike" cap="none" normalizeH="0" baseline="0" dirty="0">
+                <a:ln>
+                  <a:noFill/>
+                </a:ln>
+                <a:solidFill>
+                  <a:srgbClr val="000000"/>
+                </a:solidFill>
+                <a:effectLst/>
+                <a:latin typeface="Courier New" panose="02070309020205020404" pitchFamily="49" charset="0"/>
+                <a:cs typeface="Courier New" panose="02070309020205020404" pitchFamily="49" charset="0"/>
+              </a:rPr>
+              <a:t>}</a:t>
+            </a:r>
+            <a:br>
+              <a:rPr kumimoji="0" lang="de-DE" altLang="de-DE" sz="1600" b="0" i="0" u="none" strike="noStrike" cap="none" normalizeH="0" baseline="0" dirty="0">
+                <a:ln>
+                  <a:noFill/>
+                </a:ln>
+                <a:solidFill>
+                  <a:srgbClr val="000000"/>
+                </a:solidFill>
+                <a:effectLst/>
+                <a:latin typeface="Courier New" panose="02070309020205020404" pitchFamily="49" charset="0"/>
+                <a:cs typeface="Courier New" panose="02070309020205020404" pitchFamily="49" charset="0"/>
+              </a:rPr>
+            </a:br>
+            <a:r>
+              <a:rPr kumimoji="0" lang="de-DE" altLang="de-DE" sz="1600" b="0" i="0" u="none" strike="noStrike" cap="none" normalizeH="0" baseline="0" dirty="0">
+                <a:ln>
+                  <a:noFill/>
+                </a:ln>
+                <a:solidFill>
+                  <a:srgbClr val="000000"/>
+                </a:solidFill>
+                <a:effectLst/>
+                <a:latin typeface="Courier New" panose="02070309020205020404" pitchFamily="49" charset="0"/>
+                <a:cs typeface="Courier New" panose="02070309020205020404" pitchFamily="49" charset="0"/>
+              </a:rPr>
+              <a:t>}</a:t>
+            </a:r>
+            <a:endParaRPr kumimoji="0" lang="de-DE" altLang="de-DE" sz="3600" b="0" i="0" u="none" strike="noStrike" cap="none" normalizeH="0" baseline="0" dirty="0">
+              <a:ln>
+                <a:noFill/>
+              </a:ln>
+              <a:solidFill>
+                <a:schemeClr val="tx1"/>
+              </a:solidFill>
+              <a:effectLst/>
+              <a:latin typeface="Arial" panose="020B0604020202020204" pitchFamily="34" charset="0"/>
+            </a:endParaRPr>
+          </a:p>
+        </p:txBody>
+      </p:sp>
+    </p:spTree>
+    <p:extLst>
+      <p:ext uri="{BB962C8B-B14F-4D97-AF65-F5344CB8AC3E}">
+        <p14:creationId xmlns:p14="http://schemas.microsoft.com/office/powerpoint/2010/main" val="1061587473"/>
+      </p:ext>
+    </p:extLst>
+  </p:cSld>
+  <p:clrMapOvr>
+    <a:masterClrMapping/>
+  </p:clrMapOvr>
+</p:sld>
+</file>
+
+<file path=ppt/slides/slide9.xml><?xml version="1.0" encoding="utf-8"?>
+<p:sld xmlns:a="http://schemas.openxmlformats.org/drawingml/2006/main" xmlns:r="http://schemas.openxmlformats.org/officeDocument/2006/relationships" xmlns:p="http://schemas.openxmlformats.org/presentationml/2006/main">
+  <p:cSld>
+    <p:spTree>
+      <p:nvGrpSpPr>
+        <p:cNvPr id="1" name=""/>
+        <p:cNvGrpSpPr/>
+        <p:nvPr/>
+      </p:nvGrpSpPr>
+      <p:grpSpPr>
+        <a:xfrm>
+          <a:off x="0" y="0"/>
+          <a:ext cx="0" cy="0"/>
+          <a:chOff x="0" y="0"/>
+          <a:chExt cx="0" cy="0"/>
+        </a:xfrm>
+      </p:grpSpPr>
+      <p:sp>
+        <p:nvSpPr>
+          <p:cNvPr id="2" name="Titel 1"/>
+          <p:cNvSpPr>
+            <a:spLocks noGrp="1"/>
+          </p:cNvSpPr>
+          <p:nvPr>
+            <p:ph type="title"/>
+          </p:nvPr>
+        </p:nvSpPr>
+        <p:spPr/>
+        <p:txBody>
+          <a:bodyPr/>
+          <a:lstStyle/>
+          <a:p>
+            <a:r>
               <a:rPr lang="de-DE" dirty="0" err="1"/>
               <a:t>Markov</a:t>
             </a:r>
@@ -5226,8 +8118,8 @@
           </a:p>
         </p:txBody>
       </p:sp>
-      <mc:AlternateContent xmlns:mc="http://schemas.openxmlformats.org/markup-compatibility/2006">
-        <mc:Choice xmlns:a14="http://schemas.microsoft.com/office/drawing/2010/main" Requires="a14">
+      <mc:AlternateContent xmlns:mc="http://schemas.openxmlformats.org/markup-compatibility/2006" xmlns:a14="http://schemas.microsoft.com/office/drawing/2010/main">
+        <mc:Choice Requires="a14">
           <p:sp>
             <p:nvSpPr>
               <p:cNvPr id="3" name="Inhaltsplatzhalter 2"/>
@@ -5574,7 +8466,7 @@
             </p:txBody>
           </p:sp>
         </mc:Choice>
-        <mc:Fallback>
+        <mc:Fallback xmlns="">
           <p:sp>
             <p:nvSpPr>
               <p:cNvPr id="3" name="Inhaltsplatzhalter 2"/>
@@ -5612,124 +8504,6 @@
     <p:extLst>
       <p:ext uri="{BB962C8B-B14F-4D97-AF65-F5344CB8AC3E}">
         <p14:creationId xmlns:p14="http://schemas.microsoft.com/office/powerpoint/2010/main" val="2442440190"/>
-      </p:ext>
-    </p:extLst>
-  </p:cSld>
-  <p:clrMapOvr>
-    <a:masterClrMapping/>
-  </p:clrMapOvr>
-</p:sld>
-</file>
-
-<file path=ppt/slides/slide9.xml><?xml version="1.0" encoding="utf-8"?>
-<p:sld xmlns:a="http://schemas.openxmlformats.org/drawingml/2006/main" xmlns:r="http://schemas.openxmlformats.org/officeDocument/2006/relationships" xmlns:p="http://schemas.openxmlformats.org/presentationml/2006/main">
-  <p:cSld>
-    <p:spTree>
-      <p:nvGrpSpPr>
-        <p:cNvPr id="1" name=""/>
-        <p:cNvGrpSpPr/>
-        <p:nvPr/>
-      </p:nvGrpSpPr>
-      <p:grpSpPr>
-        <a:xfrm>
-          <a:off x="0" y="0"/>
-          <a:ext cx="0" cy="0"/>
-          <a:chOff x="0" y="0"/>
-          <a:chExt cx="0" cy="0"/>
-        </a:xfrm>
-      </p:grpSpPr>
-      <p:sp>
-        <p:nvSpPr>
-          <p:cNvPr id="2" name="Titel 1"/>
-          <p:cNvSpPr>
-            <a:spLocks noGrp="1"/>
-          </p:cNvSpPr>
-          <p:nvPr>
-            <p:ph type="title"/>
-          </p:nvPr>
-        </p:nvSpPr>
-        <p:spPr/>
-        <p:txBody>
-          <a:bodyPr/>
-          <a:lstStyle/>
-          <a:p>
-            <a:r>
-              <a:rPr lang="de-DE" dirty="0"/>
-              <a:t>Testen</a:t>
-            </a:r>
-          </a:p>
-        </p:txBody>
-      </p:sp>
-      <p:sp>
-        <p:nvSpPr>
-          <p:cNvPr id="3" name="Inhaltsplatzhalter 2"/>
-          <p:cNvSpPr>
-            <a:spLocks noGrp="1"/>
-          </p:cNvSpPr>
-          <p:nvPr>
-            <p:ph idx="1"/>
-          </p:nvPr>
-        </p:nvSpPr>
-        <p:spPr/>
-        <p:txBody>
-          <a:bodyPr/>
-          <a:lstStyle/>
-          <a:p>
-            <a:pPr lvl="1"/>
-            <a:endParaRPr lang="de-DE" dirty="0"/>
-          </a:p>
-          <a:p>
-            <a:pPr lvl="1"/>
-            <a:endParaRPr lang="de-DE" dirty="0"/>
-          </a:p>
-          <a:p>
-            <a:pPr lvl="1"/>
-            <a:r>
-              <a:rPr lang="de-DE" sz="2800" dirty="0"/>
-              <a:t>Excel Datei → CSV → Test-Daten</a:t>
-            </a:r>
-            <a:endParaRPr lang="de-DE" dirty="0"/>
-          </a:p>
-          <a:p>
-            <a:pPr lvl="2">
-              <a:buFont typeface="Symbol" panose="05050102010706020507" pitchFamily="18" charset="2"/>
-              <a:buChar char="Þ"/>
-            </a:pPr>
-            <a:r>
-              <a:rPr lang="de-DE" dirty="0"/>
-              <a:t> </a:t>
-            </a:r>
-            <a:r>
-              <a:rPr lang="de-DE" sz="2400" dirty="0"/>
-              <a:t>Entkoppelte Tests:</a:t>
-            </a:r>
-            <a:endParaRPr lang="de-DE" sz="2800" dirty="0"/>
-          </a:p>
-          <a:p>
-            <a:pPr lvl="3"/>
-            <a:r>
-              <a:rPr lang="de-DE" sz="2200" dirty="0" err="1"/>
-              <a:t>Uniformization</a:t>
-            </a:r>
-            <a:endParaRPr lang="de-DE" sz="2200" dirty="0"/>
-          </a:p>
-          <a:p>
-            <a:pPr lvl="3"/>
-            <a:r>
-              <a:rPr lang="de-DE" sz="2200" dirty="0"/>
-              <a:t>Evaluation</a:t>
-            </a:r>
-          </a:p>
-          <a:p>
-            <a:pPr lvl="1"/>
-            <a:endParaRPr lang="de-DE" sz="2800" dirty="0"/>
-          </a:p>
-        </p:txBody>
-      </p:sp>
-    </p:spTree>
-    <p:extLst>
-      <p:ext uri="{BB962C8B-B14F-4D97-AF65-F5344CB8AC3E}">
-        <p14:creationId xmlns:p14="http://schemas.microsoft.com/office/powerpoint/2010/main" val="2906383264"/>
       </p:ext>
     </p:extLst>
   </p:cSld>

</xml_diff>

<commit_message>
A bit of refactoring, essentially of BDDNode and BDDBuildResult
</commit_message>
<xml_diff>
--- a/doc/Programmier-Projekt-Praesi.pptx
+++ b/doc/Programmier-Projekt-Praesi.pptx
@@ -349,7 +349,7 @@
           <a:p>
             <a:fld id="{96DFF08F-DC6B-4601-B491-B0F83F6DD2DA}" type="datetimeFigureOut">
               <a:rPr lang="en-US" smtClean="0"/>
-              <a:t>6/30/2016</a:t>
+              <a:t>7/1/2016</a:t>
             </a:fld>
             <a:endParaRPr lang="en-US" dirty="0"/>
           </a:p>
@@ -557,7 +557,7 @@
           <a:p>
             <a:fld id="{96DFF08F-DC6B-4601-B491-B0F83F6DD2DA}" type="datetimeFigureOut">
               <a:rPr lang="en-US" smtClean="0"/>
-              <a:t>6/30/2016</a:t>
+              <a:t>7/1/2016</a:t>
             </a:fld>
             <a:endParaRPr lang="en-US" dirty="0"/>
           </a:p>
@@ -813,7 +813,7 @@
           <a:p>
             <a:fld id="{96DFF08F-DC6B-4601-B491-B0F83F6DD2DA}" type="datetimeFigureOut">
               <a:rPr lang="en-US" smtClean="0"/>
-              <a:t>6/30/2016</a:t>
+              <a:t>7/1/2016</a:t>
             </a:fld>
             <a:endParaRPr lang="en-US" dirty="0"/>
           </a:p>
@@ -983,7 +983,7 @@
           <a:p>
             <a:fld id="{D62CEF3B-A037-46D0-B02C-1428F07E9383}" type="datetimeFigureOut">
               <a:rPr lang="en-US" smtClean="0"/>
-              <a:t>6/30/2016</a:t>
+              <a:t>7/1/2016</a:t>
             </a:fld>
             <a:endParaRPr lang="en-US" dirty="0"/>
           </a:p>
@@ -1326,7 +1326,7 @@
           <a:p>
             <a:fld id="{96DFF08F-DC6B-4601-B491-B0F83F6DD2DA}" type="datetimeFigureOut">
               <a:rPr lang="en-US" smtClean="0"/>
-              <a:t>6/30/2016</a:t>
+              <a:t>7/1/2016</a:t>
             </a:fld>
             <a:endParaRPr lang="en-US" dirty="0"/>
           </a:p>
@@ -1601,7 +1601,7 @@
           <a:p>
             <a:fld id="{96DFF08F-DC6B-4601-B491-B0F83F6DD2DA}" type="datetimeFigureOut">
               <a:rPr lang="en-US" smtClean="0"/>
-              <a:t>6/30/2016</a:t>
+              <a:t>7/1/2016</a:t>
             </a:fld>
             <a:endParaRPr lang="en-US" dirty="0"/>
           </a:p>
@@ -1980,7 +1980,7 @@
           <a:p>
             <a:fld id="{96DFF08F-DC6B-4601-B491-B0F83F6DD2DA}" type="datetimeFigureOut">
               <a:rPr lang="en-US" smtClean="0"/>
-              <a:t>6/30/2016</a:t>
+              <a:t>7/1/2016</a:t>
             </a:fld>
             <a:endParaRPr lang="en-US" dirty="0"/>
           </a:p>
@@ -2098,7 +2098,7 @@
           <a:p>
             <a:fld id="{96DFF08F-DC6B-4601-B491-B0F83F6DD2DA}" type="datetimeFigureOut">
               <a:rPr lang="en-US" smtClean="0"/>
-              <a:t>6/30/2016</a:t>
+              <a:t>7/1/2016</a:t>
             </a:fld>
             <a:endParaRPr lang="en-US" dirty="0"/>
           </a:p>
@@ -2270,7 +2270,7 @@
             <a:fld id="{96DFF08F-DC6B-4601-B491-B0F83F6DD2DA}" type="datetimeFigureOut">
               <a:rPr lang="en-US" smtClean="0"/>
               <a:pPr/>
-              <a:t>6/30/2016</a:t>
+              <a:t>7/1/2016</a:t>
             </a:fld>
             <a:endParaRPr lang="en-US" dirty="0"/>
           </a:p>
@@ -2626,7 +2626,7 @@
             <a:fld id="{96DFF08F-DC6B-4601-B491-B0F83F6DD2DA}" type="datetimeFigureOut">
               <a:rPr lang="en-US" smtClean="0"/>
               <a:pPr/>
-              <a:t>6/30/2016</a:t>
+              <a:t>7/1/2016</a:t>
             </a:fld>
             <a:endParaRPr lang="en-US" dirty="0"/>
           </a:p>
@@ -3004,7 +3004,7 @@
           <a:p>
             <a:fld id="{96DFF08F-DC6B-4601-B491-B0F83F6DD2DA}" type="datetimeFigureOut">
               <a:rPr lang="en-US" smtClean="0"/>
-              <a:t>6/30/2016</a:t>
+              <a:t>7/1/2016</a:t>
             </a:fld>
             <a:endParaRPr lang="en-US" dirty="0"/>
           </a:p>
@@ -3292,7 +3292,7 @@
             <a:fld id="{96DFF08F-DC6B-4601-B491-B0F83F6DD2DA}" type="datetimeFigureOut">
               <a:rPr lang="en-US" smtClean="0"/>
               <a:pPr/>
-              <a:t>6/30/2016</a:t>
+              <a:t>7/1/2016</a:t>
             </a:fld>
             <a:endParaRPr lang="en-US" dirty="0"/>
           </a:p>
@@ -4241,7 +4241,15 @@
             </a:r>
             <a:r>
               <a:rPr lang="de-DE" dirty="0"/>
-              <a:t>-Table“ geeignet</a:t>
+              <a:t>-Table“ geeignet (wie Java Stream nur „</a:t>
+            </a:r>
+            <a:r>
+              <a:rPr lang="de-DE" dirty="0" err="1"/>
+              <a:t>One-Shot</a:t>
+            </a:r>
+            <a:r>
+              <a:rPr lang="de-DE" dirty="0"/>
+              <a:t>“)</a:t>
             </a:r>
           </a:p>
           <a:p>
@@ -5234,18 +5242,16 @@
       </p:sp>
       <p:sp>
         <p:nvSpPr>
-          <p:cNvPr id="5" name="Rectangle 2"/>
+          <p:cNvPr id="4" name="Rectangle 1"/>
           <p:cNvSpPr>
-            <a:spLocks noGrp="1" noChangeArrowheads="1"/>
+            <a:spLocks noChangeArrowheads="1"/>
           </p:cNvSpPr>
-          <p:nvPr>
-            <p:ph idx="1"/>
-          </p:nvPr>
+          <p:nvPr/>
         </p:nvSpPr>
         <p:spPr bwMode="auto">
           <a:xfrm>
-            <a:off x="55519" y="2545891"/>
-            <a:ext cx="9078681" cy="2546851"/>
+            <a:off x="94728" y="2695557"/>
+            <a:ext cx="9049272" cy="2323713"/>
           </a:xfrm>
           <a:prstGeom prst="rect">
             <a:avLst/>
@@ -5280,7 +5286,7 @@
           </a:extLst>
         </p:spPr>
         <p:txBody>
-          <a:bodyPr vert="horz" wrap="square" lIns="91440" tIns="45720" rIns="91440" bIns="45720" numCol="1" anchor="ctr" anchorCtr="0" compatLnSpc="1">
+          <a:bodyPr vert="horz" wrap="none" lIns="91440" tIns="45720" rIns="91440" bIns="45720" numCol="1" anchor="ctr" anchorCtr="0" compatLnSpc="1">
             <a:prstTxWarp prst="textNoShape">
               <a:avLst/>
             </a:prstTxWarp>
@@ -5361,6 +5367,20 @@
               <a:t> = </a:t>
             </a:r>
             <a:r>
+              <a:rPr kumimoji="0" lang="de-DE" altLang="de-DE" sz="1450" b="0" i="0" u="none" strike="noStrike" cap="none" normalizeH="0" baseline="0" dirty="0" err="1">
+                <a:ln>
+                  <a:noFill/>
+                </a:ln>
+                <a:solidFill>
+                  <a:srgbClr val="000000"/>
+                </a:solidFill>
+                <a:effectLst/>
+                <a:latin typeface="Courier New" panose="02070309020205020404" pitchFamily="49" charset="0"/>
+                <a:cs typeface="Courier New" panose="02070309020205020404" pitchFamily="49" charset="0"/>
+              </a:rPr>
+              <a:t>node.</a:t>
+            </a:r>
+            <a:r>
               <a:rPr kumimoji="0" lang="de-DE" altLang="de-DE" sz="1450" b="1" i="0" u="none" strike="noStrike" cap="none" normalizeH="0" baseline="0" dirty="0" err="1">
                 <a:ln>
                   <a:noFill/>
@@ -5372,7 +5392,7 @@
                 <a:latin typeface="Courier New" panose="02070309020205020404" pitchFamily="49" charset="0"/>
                 <a:cs typeface="Courier New" panose="02070309020205020404" pitchFamily="49" charset="0"/>
               </a:rPr>
-              <a:t>timeSeries</a:t>
+              <a:t>probabilities</a:t>
             </a:r>
             <a:r>
               <a:rPr kumimoji="0" lang="de-DE" altLang="de-DE" sz="1450" b="0" i="0" u="none" strike="noStrike" cap="none" normalizeH="0" baseline="0" dirty="0" err="1">
@@ -5386,7 +5406,21 @@
                 <a:latin typeface="Courier New" panose="02070309020205020404" pitchFamily="49" charset="0"/>
                 <a:cs typeface="Courier New" panose="02070309020205020404" pitchFamily="49" charset="0"/>
               </a:rPr>
-              <a:t>.getProbabilitySeries</a:t>
+              <a:t>.</a:t>
+            </a:r>
+            <a:r>
+              <a:rPr kumimoji="0" lang="de-DE" altLang="de-DE" sz="1450" b="0" i="1" u="none" strike="noStrike" cap="none" normalizeH="0" baseline="0" dirty="0" err="1">
+                <a:ln>
+                  <a:noFill/>
+                </a:ln>
+                <a:solidFill>
+                  <a:srgbClr val="000000"/>
+                </a:solidFill>
+                <a:effectLst/>
+                <a:latin typeface="Courier New" panose="02070309020205020404" pitchFamily="49" charset="0"/>
+                <a:cs typeface="Courier New" panose="02070309020205020404" pitchFamily="49" charset="0"/>
+              </a:rPr>
+              <a:t>asSequence</a:t>
             </a:r>
             <a:r>
               <a:rPr kumimoji="0" lang="de-DE" altLang="de-DE" sz="1450" b="0" i="0" u="none" strike="noStrike" cap="none" normalizeH="0" baseline="0" dirty="0">
@@ -5400,6 +5434,89 @@
                 <a:latin typeface="Courier New" panose="02070309020205020404" pitchFamily="49" charset="0"/>
                 <a:cs typeface="Courier New" panose="02070309020205020404" pitchFamily="49" charset="0"/>
               </a:rPr>
+              <a:t>()</a:t>
+            </a:r>
+            <a:br>
+              <a:rPr kumimoji="0" lang="de-DE" altLang="de-DE" sz="1450" b="0" i="0" u="none" strike="noStrike" cap="none" normalizeH="0" baseline="0" dirty="0">
+                <a:ln>
+                  <a:noFill/>
+                </a:ln>
+                <a:solidFill>
+                  <a:srgbClr val="000000"/>
+                </a:solidFill>
+                <a:effectLst/>
+                <a:latin typeface="Courier New" panose="02070309020205020404" pitchFamily="49" charset="0"/>
+                <a:cs typeface="Courier New" panose="02070309020205020404" pitchFamily="49" charset="0"/>
+              </a:rPr>
+            </a:br>
+            <a:r>
+              <a:rPr kumimoji="0" lang="de-DE" altLang="de-DE" sz="1450" b="1" i="0" u="none" strike="noStrike" cap="none" normalizeH="0" baseline="0" dirty="0" err="1">
+                <a:ln>
+                  <a:noFill/>
+                </a:ln>
+                <a:solidFill>
+                  <a:srgbClr val="000080"/>
+                </a:solidFill>
+                <a:effectLst/>
+                <a:latin typeface="Courier New" panose="02070309020205020404" pitchFamily="49" charset="0"/>
+                <a:cs typeface="Courier New" panose="02070309020205020404" pitchFamily="49" charset="0"/>
+              </a:rPr>
+              <a:t>val</a:t>
+            </a:r>
+            <a:r>
+              <a:rPr kumimoji="0" lang="de-DE" altLang="de-DE" sz="1450" b="1" i="0" u="none" strike="noStrike" cap="none" normalizeH="0" baseline="0" dirty="0">
+                <a:ln>
+                  <a:noFill/>
+                </a:ln>
+                <a:solidFill>
+                  <a:srgbClr val="000080"/>
+                </a:solidFill>
+                <a:effectLst/>
+                <a:latin typeface="Courier New" panose="02070309020205020404" pitchFamily="49" charset="0"/>
+                <a:cs typeface="Courier New" panose="02070309020205020404" pitchFamily="49" charset="0"/>
+              </a:rPr>
+              <a:t> </a:t>
+            </a:r>
+            <a:r>
+              <a:rPr kumimoji="0" lang="de-DE" altLang="de-DE" sz="1450" b="0" i="0" u="none" strike="noStrike" cap="none" normalizeH="0" baseline="0" dirty="0">
+                <a:ln>
+                  <a:noFill/>
+                </a:ln>
+                <a:solidFill>
+                  <a:srgbClr val="000000"/>
+                </a:solidFill>
+                <a:effectLst/>
+                <a:latin typeface="Courier New" panose="02070309020205020404" pitchFamily="49" charset="0"/>
+                <a:cs typeface="Courier New" panose="02070309020205020404" pitchFamily="49" charset="0"/>
+              </a:rPr>
+              <a:t>g2 = </a:t>
+            </a:r>
+            <a:r>
+              <a:rPr kumimoji="0" lang="de-DE" altLang="de-DE" sz="1450" b="0" i="0" u="none" strike="noStrike" cap="none" normalizeH="0" baseline="0" dirty="0" err="1">
+                <a:ln>
+                  <a:noFill/>
+                </a:ln>
+                <a:solidFill>
+                  <a:srgbClr val="000000"/>
+                </a:solidFill>
+                <a:effectLst/>
+                <a:latin typeface="Courier New" panose="02070309020205020404" pitchFamily="49" charset="0"/>
+                <a:cs typeface="Courier New" panose="02070309020205020404" pitchFamily="49" charset="0"/>
+              </a:rPr>
+              <a:t>constructFormulaTopDownWithComputedTable</a:t>
+            </a:r>
+            <a:r>
+              <a:rPr kumimoji="0" lang="de-DE" altLang="de-DE" sz="1450" b="0" i="0" u="none" strike="noStrike" cap="none" normalizeH="0" baseline="0" dirty="0">
+                <a:ln>
+                  <a:noFill/>
+                </a:ln>
+                <a:solidFill>
+                  <a:srgbClr val="000000"/>
+                </a:solidFill>
+                <a:effectLst/>
+                <a:latin typeface="Courier New" panose="02070309020205020404" pitchFamily="49" charset="0"/>
+                <a:cs typeface="Courier New" panose="02070309020205020404" pitchFamily="49" charset="0"/>
+              </a:rPr>
               <a:t>(</a:t>
             </a:r>
             <a:r>
@@ -5428,7 +5545,7 @@
                 <a:latin typeface="Courier New" panose="02070309020205020404" pitchFamily="49" charset="0"/>
                 <a:cs typeface="Courier New" panose="02070309020205020404" pitchFamily="49" charset="0"/>
               </a:rPr>
-              <a:t>varID</a:t>
+              <a:t>lowChild</a:t>
             </a:r>
             <a:r>
               <a:rPr kumimoji="0" lang="de-DE" altLang="de-DE" sz="1450" b="0" i="0" u="none" strike="noStrike" cap="none" normalizeH="0" baseline="0" dirty="0">
@@ -5442,23 +5559,9 @@
                 <a:latin typeface="Courier New" panose="02070309020205020404" pitchFamily="49" charset="0"/>
                 <a:cs typeface="Courier New" panose="02070309020205020404" pitchFamily="49" charset="0"/>
               </a:rPr>
-              <a:t>).</a:t>
-            </a:r>
-            <a:r>
-              <a:rPr kumimoji="0" lang="de-DE" altLang="de-DE" sz="1450" b="0" i="1" u="none" strike="noStrike" cap="none" normalizeH="0" baseline="0" dirty="0" err="1">
-                <a:ln>
-                  <a:noFill/>
-                </a:ln>
-                <a:solidFill>
-                  <a:srgbClr val="000000"/>
-                </a:solidFill>
-                <a:effectLst/>
-                <a:latin typeface="Courier New" panose="02070309020205020404" pitchFamily="49" charset="0"/>
-                <a:cs typeface="Courier New" panose="02070309020205020404" pitchFamily="49" charset="0"/>
-              </a:rPr>
-              <a:t>asSequence</a:t>
-            </a:r>
-            <a:r>
+              <a:t>)</a:t>
+            </a:r>
+            <a:br>
               <a:rPr kumimoji="0" lang="de-DE" altLang="de-DE" sz="1450" b="0" i="0" u="none" strike="noStrike" cap="none" normalizeH="0" baseline="0" dirty="0">
                 <a:ln>
                   <a:noFill/>
@@ -5470,7 +5573,104 @@
                 <a:latin typeface="Courier New" panose="02070309020205020404" pitchFamily="49" charset="0"/>
                 <a:cs typeface="Courier New" panose="02070309020205020404" pitchFamily="49" charset="0"/>
               </a:rPr>
-              <a:t>()</a:t>
+            </a:br>
+            <a:r>
+              <a:rPr kumimoji="0" lang="de-DE" altLang="de-DE" sz="1450" b="1" i="0" u="none" strike="noStrike" cap="none" normalizeH="0" baseline="0" dirty="0" err="1">
+                <a:ln>
+                  <a:noFill/>
+                </a:ln>
+                <a:solidFill>
+                  <a:srgbClr val="000080"/>
+                </a:solidFill>
+                <a:effectLst/>
+                <a:latin typeface="Courier New" panose="02070309020205020404" pitchFamily="49" charset="0"/>
+                <a:cs typeface="Courier New" panose="02070309020205020404" pitchFamily="49" charset="0"/>
+              </a:rPr>
+              <a:t>val</a:t>
+            </a:r>
+            <a:r>
+              <a:rPr kumimoji="0" lang="de-DE" altLang="de-DE" sz="1450" b="1" i="0" u="none" strike="noStrike" cap="none" normalizeH="0" baseline="0" dirty="0">
+                <a:ln>
+                  <a:noFill/>
+                </a:ln>
+                <a:solidFill>
+                  <a:srgbClr val="000080"/>
+                </a:solidFill>
+                <a:effectLst/>
+                <a:latin typeface="Courier New" panose="02070309020205020404" pitchFamily="49" charset="0"/>
+                <a:cs typeface="Courier New" panose="02070309020205020404" pitchFamily="49" charset="0"/>
+              </a:rPr>
+              <a:t> </a:t>
+            </a:r>
+            <a:r>
+              <a:rPr kumimoji="0" lang="de-DE" altLang="de-DE" sz="1450" b="0" i="0" u="none" strike="noStrike" cap="none" normalizeH="0" baseline="0" dirty="0">
+                <a:ln>
+                  <a:noFill/>
+                </a:ln>
+                <a:solidFill>
+                  <a:srgbClr val="000000"/>
+                </a:solidFill>
+                <a:effectLst/>
+                <a:latin typeface="Courier New" panose="02070309020205020404" pitchFamily="49" charset="0"/>
+                <a:cs typeface="Courier New" panose="02070309020205020404" pitchFamily="49" charset="0"/>
+              </a:rPr>
+              <a:t>g1_x1 = </a:t>
+            </a:r>
+            <a:r>
+              <a:rPr kumimoji="0" lang="de-DE" altLang="de-DE" sz="1450" b="0" i="0" u="none" strike="noStrike" cap="none" normalizeH="0" baseline="0" dirty="0" err="1">
+                <a:ln>
+                  <a:noFill/>
+                </a:ln>
+                <a:solidFill>
+                  <a:srgbClr val="000000"/>
+                </a:solidFill>
+                <a:effectLst/>
+                <a:latin typeface="Courier New" panose="02070309020205020404" pitchFamily="49" charset="0"/>
+                <a:cs typeface="Courier New" panose="02070309020205020404" pitchFamily="49" charset="0"/>
+              </a:rPr>
+              <a:t>getHigh</a:t>
+            </a:r>
+            <a:r>
+              <a:rPr kumimoji="0" lang="de-DE" altLang="de-DE" sz="1450" b="0" i="0" u="none" strike="noStrike" cap="none" normalizeH="0" baseline="0" dirty="0">
+                <a:ln>
+                  <a:noFill/>
+                </a:ln>
+                <a:solidFill>
+                  <a:srgbClr val="000000"/>
+                </a:solidFill>
+                <a:effectLst/>
+                <a:latin typeface="Courier New" panose="02070309020205020404" pitchFamily="49" charset="0"/>
+                <a:cs typeface="Courier New" panose="02070309020205020404" pitchFamily="49" charset="0"/>
+              </a:rPr>
+              <a:t>(</a:t>
+            </a:r>
+            <a:r>
+              <a:rPr kumimoji="0" lang="de-DE" altLang="de-DE" sz="1450" b="0" i="0" u="none" strike="noStrike" cap="none" normalizeH="0" baseline="0" dirty="0" err="1">
+                <a:ln>
+                  <a:noFill/>
+                </a:ln>
+                <a:solidFill>
+                  <a:srgbClr val="000000"/>
+                </a:solidFill>
+                <a:effectLst/>
+                <a:latin typeface="Courier New" panose="02070309020205020404" pitchFamily="49" charset="0"/>
+                <a:cs typeface="Courier New" panose="02070309020205020404" pitchFamily="49" charset="0"/>
+              </a:rPr>
+              <a:t>node</a:t>
+            </a:r>
+            <a:r>
+              <a:rPr kumimoji="0" lang="de-DE" altLang="de-DE" sz="1450" b="0" i="0" u="none" strike="noStrike" cap="none" normalizeH="0" baseline="0" dirty="0">
+                <a:ln>
+                  <a:noFill/>
+                </a:ln>
+                <a:solidFill>
+                  <a:srgbClr val="000000"/>
+                </a:solidFill>
+                <a:effectLst/>
+                <a:latin typeface="Courier New" panose="02070309020205020404" pitchFamily="49" charset="0"/>
+                <a:cs typeface="Courier New" panose="02070309020205020404" pitchFamily="49" charset="0"/>
+              </a:rPr>
+              <a:t>)</a:t>
             </a:r>
             <a:br>
               <a:rPr kumimoji="0" lang="de-DE" altLang="de-DE" sz="1450" b="0" i="0" u="none" strike="noStrike" cap="none" normalizeH="0" baseline="0" dirty="0">
@@ -5510,7 +5710,7 @@
                 <a:latin typeface="Courier New" panose="02070309020205020404" pitchFamily="49" charset="0"/>
                 <a:cs typeface="Courier New" panose="02070309020205020404" pitchFamily="49" charset="0"/>
               </a:rPr>
-              <a:t>val</a:t>
+              <a:t>if</a:t>
             </a:r>
             <a:r>
               <a:rPr kumimoji="0" lang="de-DE" altLang="de-DE" sz="1450" b="1" i="0" u="none" strike="noStrike" cap="none" normalizeH="0" baseline="0" dirty="0">
@@ -5538,7 +5738,7 @@
                 <a:latin typeface="Courier New" panose="02070309020205020404" pitchFamily="49" charset="0"/>
                 <a:cs typeface="Courier New" panose="02070309020205020404" pitchFamily="49" charset="0"/>
               </a:rPr>
-              <a:t>g2 = </a:t>
+              <a:t>(</a:t>
             </a:r>
             <a:r>
               <a:rPr kumimoji="0" lang="de-DE" altLang="de-DE" sz="1450" b="0" i="0" u="none" strike="noStrike" cap="none" normalizeH="0" baseline="0" dirty="0" err="1">
@@ -5552,7 +5752,21 @@
                 <a:latin typeface="Courier New" panose="02070309020205020404" pitchFamily="49" charset="0"/>
                 <a:cs typeface="Courier New" panose="02070309020205020404" pitchFamily="49" charset="0"/>
               </a:rPr>
-              <a:t>constructFormulaTopDown</a:t>
+              <a:t>node.</a:t>
+            </a:r>
+            <a:r>
+              <a:rPr kumimoji="0" lang="de-DE" altLang="de-DE" sz="1450" b="1" i="0" u="none" strike="noStrike" cap="none" normalizeH="0" baseline="0" dirty="0" err="1">
+                <a:ln>
+                  <a:noFill/>
+                </a:ln>
+                <a:solidFill>
+                  <a:srgbClr val="660E7A"/>
+                </a:solidFill>
+                <a:effectLst/>
+                <a:latin typeface="Courier New" panose="02070309020205020404" pitchFamily="49" charset="0"/>
+                <a:cs typeface="Courier New" panose="02070309020205020404" pitchFamily="49" charset="0"/>
+              </a:rPr>
+              <a:t>isLowStateDependent</a:t>
             </a:r>
             <a:r>
               <a:rPr kumimoji="0" lang="de-DE" altLang="de-DE" sz="1450" b="0" i="0" u="none" strike="noStrike" cap="none" normalizeH="0" baseline="0" dirty="0">
@@ -5566,49 +5780,7 @@
                 <a:latin typeface="Courier New" panose="02070309020205020404" pitchFamily="49" charset="0"/>
                 <a:cs typeface="Courier New" panose="02070309020205020404" pitchFamily="49" charset="0"/>
               </a:rPr>
-              <a:t>(</a:t>
-            </a:r>
-            <a:r>
-              <a:rPr kumimoji="0" lang="de-DE" altLang="de-DE" sz="1450" b="0" i="0" u="none" strike="noStrike" cap="none" normalizeH="0" baseline="0" dirty="0" err="1">
-                <a:ln>
-                  <a:noFill/>
-                </a:ln>
-                <a:solidFill>
-                  <a:srgbClr val="000000"/>
-                </a:solidFill>
-                <a:effectLst/>
-                <a:latin typeface="Courier New" panose="02070309020205020404" pitchFamily="49" charset="0"/>
-                <a:cs typeface="Courier New" panose="02070309020205020404" pitchFamily="49" charset="0"/>
-              </a:rPr>
-              <a:t>node.</a:t>
-            </a:r>
-            <a:r>
-              <a:rPr kumimoji="0" lang="de-DE" altLang="de-DE" sz="1450" b="1" i="0" u="none" strike="noStrike" cap="none" normalizeH="0" baseline="0" dirty="0" err="1">
-                <a:ln>
-                  <a:noFill/>
-                </a:ln>
-                <a:solidFill>
-                  <a:srgbClr val="660E7A"/>
-                </a:solidFill>
-                <a:effectLst/>
-                <a:latin typeface="Courier New" panose="02070309020205020404" pitchFamily="49" charset="0"/>
-                <a:cs typeface="Courier New" panose="02070309020205020404" pitchFamily="49" charset="0"/>
-              </a:rPr>
-              <a:t>lowChild</a:t>
-            </a:r>
-            <a:r>
-              <a:rPr kumimoji="0" lang="de-DE" altLang="de-DE" sz="1450" b="0" i="0" u="none" strike="noStrike" cap="none" normalizeH="0" baseline="0" dirty="0">
-                <a:ln>
-                  <a:noFill/>
-                </a:ln>
-                <a:solidFill>
-                  <a:srgbClr val="000000"/>
-                </a:solidFill>
-                <a:effectLst/>
-                <a:latin typeface="Courier New" panose="02070309020205020404" pitchFamily="49" charset="0"/>
-                <a:cs typeface="Courier New" panose="02070309020205020404" pitchFamily="49" charset="0"/>
-              </a:rPr>
-              <a:t>)</a:t>
+              <a:t>) {</a:t>
             </a:r>
             <a:br>
               <a:rPr kumimoji="0" lang="de-DE" altLang="de-DE" sz="1450" b="0" i="0" u="none" strike="noStrike" cap="none" normalizeH="0" baseline="0" dirty="0">
@@ -5624,6 +5796,20 @@
               </a:rPr>
             </a:br>
             <a:r>
+              <a:rPr kumimoji="0" lang="de-DE" altLang="de-DE" sz="1450" b="0" i="0" u="none" strike="noStrike" cap="none" normalizeH="0" baseline="0" dirty="0">
+                <a:ln>
+                  <a:noFill/>
+                </a:ln>
+                <a:solidFill>
+                  <a:srgbClr val="000000"/>
+                </a:solidFill>
+                <a:effectLst/>
+                <a:latin typeface="Courier New" panose="02070309020205020404" pitchFamily="49" charset="0"/>
+                <a:cs typeface="Courier New" panose="02070309020205020404" pitchFamily="49" charset="0"/>
+              </a:rPr>
+              <a:t>    </a:t>
+            </a:r>
+            <a:r>
               <a:rPr kumimoji="0" lang="de-DE" altLang="de-DE" sz="1450" b="1" i="0" u="none" strike="noStrike" cap="none" normalizeH="0" baseline="0" dirty="0" err="1">
                 <a:ln>
                   <a:noFill/>
@@ -5663,7 +5849,7 @@
                 <a:latin typeface="Courier New" panose="02070309020205020404" pitchFamily="49" charset="0"/>
                 <a:cs typeface="Courier New" panose="02070309020205020404" pitchFamily="49" charset="0"/>
               </a:rPr>
-              <a:t>g1_x1 = </a:t>
+              <a:t>h2_x1 = </a:t>
             </a:r>
             <a:r>
               <a:rPr kumimoji="0" lang="de-DE" altLang="de-DE" sz="1450" b="0" i="0" u="none" strike="noStrike" cap="none" normalizeH="0" baseline="0" dirty="0" err="1">
@@ -5677,242 +5863,7 @@
                 <a:latin typeface="Courier New" panose="02070309020205020404" pitchFamily="49" charset="0"/>
                 <a:cs typeface="Courier New" panose="02070309020205020404" pitchFamily="49" charset="0"/>
               </a:rPr>
-              <a:t>getHigh</a:t>
-            </a:r>
-            <a:r>
-              <a:rPr kumimoji="0" lang="de-DE" altLang="de-DE" sz="1450" b="0" i="0" u="none" strike="noStrike" cap="none" normalizeH="0" baseline="0" dirty="0">
-                <a:ln>
-                  <a:noFill/>
-                </a:ln>
-                <a:solidFill>
-                  <a:srgbClr val="000000"/>
-                </a:solidFill>
-                <a:effectLst/>
-                <a:latin typeface="Courier New" panose="02070309020205020404" pitchFamily="49" charset="0"/>
-                <a:cs typeface="Courier New" panose="02070309020205020404" pitchFamily="49" charset="0"/>
-              </a:rPr>
-              <a:t>(</a:t>
-            </a:r>
-            <a:r>
-              <a:rPr kumimoji="0" lang="de-DE" altLang="de-DE" sz="1450" b="0" i="0" u="none" strike="noStrike" cap="none" normalizeH="0" baseline="0" dirty="0" err="1">
-                <a:ln>
-                  <a:noFill/>
-                </a:ln>
-                <a:solidFill>
-                  <a:srgbClr val="000000"/>
-                </a:solidFill>
-                <a:effectLst/>
-                <a:latin typeface="Courier New" panose="02070309020205020404" pitchFamily="49" charset="0"/>
-                <a:cs typeface="Courier New" panose="02070309020205020404" pitchFamily="49" charset="0"/>
-              </a:rPr>
-              <a:t>node</a:t>
-            </a:r>
-            <a:r>
-              <a:rPr kumimoji="0" lang="de-DE" altLang="de-DE" sz="1450" b="0" i="0" u="none" strike="noStrike" cap="none" normalizeH="0" baseline="0" dirty="0">
-                <a:ln>
-                  <a:noFill/>
-                </a:ln>
-                <a:solidFill>
-                  <a:srgbClr val="000000"/>
-                </a:solidFill>
-                <a:effectLst/>
-                <a:latin typeface="Courier New" panose="02070309020205020404" pitchFamily="49" charset="0"/>
-                <a:cs typeface="Courier New" panose="02070309020205020404" pitchFamily="49" charset="0"/>
-              </a:rPr>
-              <a:t>)</a:t>
-            </a:r>
-            <a:br>
-              <a:rPr kumimoji="0" lang="de-DE" altLang="de-DE" sz="1450" b="0" i="0" u="none" strike="noStrike" cap="none" normalizeH="0" baseline="0" dirty="0">
-                <a:ln>
-                  <a:noFill/>
-                </a:ln>
-                <a:solidFill>
-                  <a:srgbClr val="000000"/>
-                </a:solidFill>
-                <a:effectLst/>
-                <a:latin typeface="Courier New" panose="02070309020205020404" pitchFamily="49" charset="0"/>
-                <a:cs typeface="Courier New" panose="02070309020205020404" pitchFamily="49" charset="0"/>
-              </a:rPr>
-            </a:br>
-            <a:br>
-              <a:rPr kumimoji="0" lang="de-DE" altLang="de-DE" sz="1450" b="0" i="0" u="none" strike="noStrike" cap="none" normalizeH="0" baseline="0" dirty="0">
-                <a:ln>
-                  <a:noFill/>
-                </a:ln>
-                <a:solidFill>
-                  <a:srgbClr val="000000"/>
-                </a:solidFill>
-                <a:effectLst/>
-                <a:latin typeface="Courier New" panose="02070309020205020404" pitchFamily="49" charset="0"/>
-                <a:cs typeface="Courier New" panose="02070309020205020404" pitchFamily="49" charset="0"/>
-              </a:rPr>
-            </a:br>
-            <a:r>
-              <a:rPr kumimoji="0" lang="de-DE" altLang="de-DE" sz="1450" b="1" i="0" u="none" strike="noStrike" cap="none" normalizeH="0" baseline="0" dirty="0" err="1">
-                <a:ln>
-                  <a:noFill/>
-                </a:ln>
-                <a:solidFill>
-                  <a:srgbClr val="000080"/>
-                </a:solidFill>
-                <a:effectLst/>
-                <a:latin typeface="Courier New" panose="02070309020205020404" pitchFamily="49" charset="0"/>
-                <a:cs typeface="Courier New" panose="02070309020205020404" pitchFamily="49" charset="0"/>
-              </a:rPr>
-              <a:t>if</a:t>
-            </a:r>
-            <a:r>
-              <a:rPr kumimoji="0" lang="de-DE" altLang="de-DE" sz="1450" b="1" i="0" u="none" strike="noStrike" cap="none" normalizeH="0" baseline="0" dirty="0">
-                <a:ln>
-                  <a:noFill/>
-                </a:ln>
-                <a:solidFill>
-                  <a:srgbClr val="000080"/>
-                </a:solidFill>
-                <a:effectLst/>
-                <a:latin typeface="Courier New" panose="02070309020205020404" pitchFamily="49" charset="0"/>
-                <a:cs typeface="Courier New" panose="02070309020205020404" pitchFamily="49" charset="0"/>
-              </a:rPr>
-              <a:t> </a:t>
-            </a:r>
-            <a:r>
-              <a:rPr kumimoji="0" lang="de-DE" altLang="de-DE" sz="1450" b="0" i="0" u="none" strike="noStrike" cap="none" normalizeH="0" baseline="0" dirty="0">
-                <a:ln>
-                  <a:noFill/>
-                </a:ln>
-                <a:solidFill>
-                  <a:srgbClr val="000000"/>
-                </a:solidFill>
-                <a:effectLst/>
-                <a:latin typeface="Courier New" panose="02070309020205020404" pitchFamily="49" charset="0"/>
-                <a:cs typeface="Courier New" panose="02070309020205020404" pitchFamily="49" charset="0"/>
-              </a:rPr>
-              <a:t>(</a:t>
-            </a:r>
-            <a:r>
-              <a:rPr kumimoji="0" lang="de-DE" altLang="de-DE" sz="1450" b="0" i="0" u="none" strike="noStrike" cap="none" normalizeH="0" baseline="0" dirty="0" err="1">
-                <a:ln>
-                  <a:noFill/>
-                </a:ln>
-                <a:solidFill>
-                  <a:srgbClr val="000000"/>
-                </a:solidFill>
-                <a:effectLst/>
-                <a:latin typeface="Courier New" panose="02070309020205020404" pitchFamily="49" charset="0"/>
-                <a:cs typeface="Courier New" panose="02070309020205020404" pitchFamily="49" charset="0"/>
-              </a:rPr>
-              <a:t>node.</a:t>
-            </a:r>
-            <a:r>
-              <a:rPr kumimoji="0" lang="de-DE" altLang="de-DE" sz="1450" b="1" i="0" u="none" strike="noStrike" cap="none" normalizeH="0" baseline="0" dirty="0" err="1">
-                <a:ln>
-                  <a:noFill/>
-                </a:ln>
-                <a:solidFill>
-                  <a:srgbClr val="660E7A"/>
-                </a:solidFill>
-                <a:effectLst/>
-                <a:latin typeface="Courier New" panose="02070309020205020404" pitchFamily="49" charset="0"/>
-                <a:cs typeface="Courier New" panose="02070309020205020404" pitchFamily="49" charset="0"/>
-              </a:rPr>
-              <a:t>isLowStateDependent</a:t>
-            </a:r>
-            <a:r>
-              <a:rPr kumimoji="0" lang="de-DE" altLang="de-DE" sz="1450" b="0" i="0" u="none" strike="noStrike" cap="none" normalizeH="0" baseline="0" dirty="0">
-                <a:ln>
-                  <a:noFill/>
-                </a:ln>
-                <a:solidFill>
-                  <a:srgbClr val="000000"/>
-                </a:solidFill>
-                <a:effectLst/>
-                <a:latin typeface="Courier New" panose="02070309020205020404" pitchFamily="49" charset="0"/>
-                <a:cs typeface="Courier New" panose="02070309020205020404" pitchFamily="49" charset="0"/>
-              </a:rPr>
-              <a:t>) {</a:t>
-            </a:r>
-            <a:br>
-              <a:rPr kumimoji="0" lang="de-DE" altLang="de-DE" sz="1450" b="0" i="0" u="none" strike="noStrike" cap="none" normalizeH="0" baseline="0" dirty="0">
-                <a:ln>
-                  <a:noFill/>
-                </a:ln>
-                <a:solidFill>
-                  <a:srgbClr val="000000"/>
-                </a:solidFill>
-                <a:effectLst/>
-                <a:latin typeface="Courier New" panose="02070309020205020404" pitchFamily="49" charset="0"/>
-                <a:cs typeface="Courier New" panose="02070309020205020404" pitchFamily="49" charset="0"/>
-              </a:rPr>
-            </a:br>
-            <a:r>
-              <a:rPr kumimoji="0" lang="de-DE" altLang="de-DE" sz="1450" b="0" i="0" u="none" strike="noStrike" cap="none" normalizeH="0" baseline="0" dirty="0">
-                <a:ln>
-                  <a:noFill/>
-                </a:ln>
-                <a:solidFill>
-                  <a:srgbClr val="000000"/>
-                </a:solidFill>
-                <a:effectLst/>
-                <a:latin typeface="Courier New" panose="02070309020205020404" pitchFamily="49" charset="0"/>
-                <a:cs typeface="Courier New" panose="02070309020205020404" pitchFamily="49" charset="0"/>
-              </a:rPr>
-              <a:t>    </a:t>
-            </a:r>
-            <a:r>
-              <a:rPr kumimoji="0" lang="de-DE" altLang="de-DE" sz="1450" b="1" i="0" u="none" strike="noStrike" cap="none" normalizeH="0" baseline="0" dirty="0" err="1">
-                <a:ln>
-                  <a:noFill/>
-                </a:ln>
-                <a:solidFill>
-                  <a:srgbClr val="000080"/>
-                </a:solidFill>
-                <a:effectLst/>
-                <a:latin typeface="Courier New" panose="02070309020205020404" pitchFamily="49" charset="0"/>
-                <a:cs typeface="Courier New" panose="02070309020205020404" pitchFamily="49" charset="0"/>
-              </a:rPr>
-              <a:t>val</a:t>
-            </a:r>
-            <a:r>
-              <a:rPr kumimoji="0" lang="de-DE" altLang="de-DE" sz="1450" b="1" i="0" u="none" strike="noStrike" cap="none" normalizeH="0" baseline="0" dirty="0">
-                <a:ln>
-                  <a:noFill/>
-                </a:ln>
-                <a:solidFill>
-                  <a:srgbClr val="000080"/>
-                </a:solidFill>
-                <a:effectLst/>
-                <a:latin typeface="Courier New" panose="02070309020205020404" pitchFamily="49" charset="0"/>
-                <a:cs typeface="Courier New" panose="02070309020205020404" pitchFamily="49" charset="0"/>
-              </a:rPr>
-              <a:t> </a:t>
-            </a:r>
-            <a:r>
-              <a:rPr kumimoji="0" lang="de-DE" altLang="de-DE" sz="1450" b="0" i="0" u="none" strike="noStrike" cap="none" normalizeH="0" baseline="0" dirty="0">
-                <a:ln>
-                  <a:noFill/>
-                </a:ln>
-                <a:solidFill>
-                  <a:srgbClr val="000000"/>
-                </a:solidFill>
-                <a:effectLst/>
-                <a:latin typeface="Courier New" panose="02070309020205020404" pitchFamily="49" charset="0"/>
-                <a:cs typeface="Courier New" panose="02070309020205020404" pitchFamily="49" charset="0"/>
-              </a:rPr>
-              <a:t>h2_x1 = </a:t>
-            </a:r>
-            <a:r>
-              <a:rPr kumimoji="0" lang="de-DE" altLang="de-DE" sz="1450" b="0" i="0" u="none" strike="noStrike" cap="none" normalizeH="0" baseline="0" dirty="0" err="1">
-                <a:ln>
-                  <a:noFill/>
-                </a:ln>
-                <a:solidFill>
-                  <a:srgbClr val="000000"/>
-                </a:solidFill>
-                <a:effectLst/>
-                <a:latin typeface="Courier New" panose="02070309020205020404" pitchFamily="49" charset="0"/>
-                <a:cs typeface="Courier New" panose="02070309020205020404" pitchFamily="49" charset="0"/>
-              </a:rPr>
-              <a:t>getDependentLow</a:t>
+              <a:t>getIndependentLow</a:t>
             </a:r>
             <a:r>
               <a:rPr kumimoji="0" lang="de-DE" altLang="de-DE" sz="1450" b="0" i="0" u="none" strike="noStrike" cap="none" normalizeH="0" baseline="0" dirty="0">
@@ -6481,7 +6432,7 @@
       </p:sp>
       <p:sp>
         <p:nvSpPr>
-          <p:cNvPr id="9" name="Rectangle 6"/>
+          <p:cNvPr id="3" name="Rectangle 1"/>
           <p:cNvSpPr>
             <a:spLocks noChangeArrowheads="1"/>
           </p:cNvSpPr>
@@ -6489,8 +6440,8 @@
         </p:nvSpPr>
         <p:spPr bwMode="auto">
           <a:xfrm>
-            <a:off x="244149" y="2254837"/>
-            <a:ext cx="8701421" cy="3293209"/>
+            <a:off x="120718" y="2318728"/>
+            <a:ext cx="8948283" cy="3293209"/>
           </a:xfrm>
           <a:prstGeom prst="rect">
             <a:avLst/>
@@ -6617,7 +6568,7 @@
                 <a:latin typeface="Courier New" panose="02070309020205020404" pitchFamily="49" charset="0"/>
                 <a:cs typeface="Courier New" panose="02070309020205020404" pitchFamily="49" charset="0"/>
               </a:rPr>
-              <a:t>(</a:t>
+              <a:t> (</a:t>
             </a:r>
             <a:r>
               <a:rPr kumimoji="0" lang="de-DE" altLang="de-DE" sz="1600" b="0" i="0" u="none" strike="noStrike" cap="none" normalizeH="0" baseline="0" dirty="0" err="1">
@@ -6673,7 +6624,7 @@
                 <a:latin typeface="Courier New" panose="02070309020205020404" pitchFamily="49" charset="0"/>
                 <a:cs typeface="Courier New" panose="02070309020205020404" pitchFamily="49" charset="0"/>
               </a:rPr>
-              <a:t>): </a:t>
+              <a:t>?): </a:t>
             </a:r>
             <a:r>
               <a:rPr kumimoji="0" lang="de-DE" altLang="de-DE" sz="1600" b="0" i="0" u="none" strike="noStrike" cap="none" normalizeH="0" baseline="0" dirty="0" err="1">
@@ -6799,6 +6750,62 @@
                 <a:cs typeface="Courier New" panose="02070309020205020404" pitchFamily="49" charset="0"/>
               </a:rPr>
               <a:t>(</a:t>
+            </a:r>
+            <a:r>
+              <a:rPr kumimoji="0" lang="de-DE" altLang="de-DE" sz="1600" b="0" i="0" u="none" strike="noStrike" cap="none" normalizeH="0" baseline="0" dirty="0" err="1">
+                <a:ln>
+                  <a:noFill/>
+                </a:ln>
+                <a:solidFill>
+                  <a:srgbClr val="000000"/>
+                </a:solidFill>
+                <a:effectLst/>
+                <a:latin typeface="Courier New" panose="02070309020205020404" pitchFamily="49" charset="0"/>
+                <a:cs typeface="Courier New" panose="02070309020205020404" pitchFamily="49" charset="0"/>
+              </a:rPr>
+              <a:t>node</a:t>
+            </a:r>
+            <a:r>
+              <a:rPr kumimoji="0" lang="de-DE" altLang="de-DE" sz="1600" b="0" i="0" u="none" strike="noStrike" cap="none" normalizeH="0" baseline="0" dirty="0">
+                <a:ln>
+                  <a:noFill/>
+                </a:ln>
+                <a:solidFill>
+                  <a:srgbClr val="000000"/>
+                </a:solidFill>
+                <a:effectLst/>
+                <a:latin typeface="Courier New" panose="02070309020205020404" pitchFamily="49" charset="0"/>
+                <a:cs typeface="Courier New" panose="02070309020205020404" pitchFamily="49" charset="0"/>
+              </a:rPr>
+              <a:t> == </a:t>
+            </a:r>
+            <a:r>
+              <a:rPr kumimoji="0" lang="de-DE" altLang="de-DE" sz="1600" b="1" i="0" u="none" strike="noStrike" cap="none" normalizeH="0" baseline="0" dirty="0">
+                <a:ln>
+                  <a:noFill/>
+                </a:ln>
+                <a:solidFill>
+                  <a:srgbClr val="000080"/>
+                </a:solidFill>
+                <a:effectLst/>
+                <a:latin typeface="Courier New" panose="02070309020205020404" pitchFamily="49" charset="0"/>
+                <a:cs typeface="Courier New" panose="02070309020205020404" pitchFamily="49" charset="0"/>
+              </a:rPr>
+              <a:t>null </a:t>
+            </a:r>
+            <a:r>
+              <a:rPr kumimoji="0" lang="de-DE" altLang="de-DE" sz="1600" b="0" i="0" u="none" strike="noStrike" cap="none" normalizeH="0" baseline="0" dirty="0">
+                <a:ln>
+                  <a:noFill/>
+                </a:ln>
+                <a:solidFill>
+                  <a:srgbClr val="000000"/>
+                </a:solidFill>
+                <a:effectLst/>
+                <a:latin typeface="Courier New" panose="02070309020205020404" pitchFamily="49" charset="0"/>
+                <a:cs typeface="Courier New" panose="02070309020205020404" pitchFamily="49" charset="0"/>
+              </a:rPr>
+              <a:t>|| </a:t>
             </a:r>
             <a:r>
               <a:rPr kumimoji="0" lang="de-DE" altLang="de-DE" sz="1600" b="0" i="0" u="none" strike="noStrike" cap="none" normalizeH="0" baseline="0" dirty="0" err="1">
@@ -8457,7 +8464,13 @@
                       <a:rPr lang="de-DE" i="1" smtClean="0">
                         <a:latin typeface="Cambria Math" panose="02040503050406030204" pitchFamily="18" charset="0"/>
                       </a:rPr>
-                      <m:t>=10</m:t>
+                      <m:t>=1</m:t>
+                    </m:r>
+                    <m:r>
+                      <a:rPr lang="de-DE" i="1" smtClean="0">
+                        <a:latin typeface="Cambria Math" panose="02040503050406030204" pitchFamily="18" charset="0"/>
+                      </a:rPr>
+                      <m:t>0</m:t>
                     </m:r>
                   </m:oMath>
                 </a14:m>

</xml_diff>

<commit_message>
Update to our latest presentation
</commit_message>
<xml_diff>
--- a/doc/Programmier-Projekt-Praesi.pptx
+++ b/doc/Programmier-Projekt-Praesi.pptx
@@ -13,7 +13,7 @@
     <p:sldId id="262" r:id="rId7"/>
     <p:sldId id="268" r:id="rId8"/>
     <p:sldId id="263" r:id="rId9"/>
-    <p:sldId id="261" r:id="rId10"/>
+    <p:sldId id="269" r:id="rId10"/>
     <p:sldId id="265" r:id="rId11"/>
     <p:sldId id="264" r:id="rId12"/>
     <p:sldId id="266" r:id="rId13"/>
@@ -117,7 +117,7 @@
   </p:defaultTextStyle>
   <p:extLst>
     <p:ext uri="{EFAFB233-063F-42B5-8137-9DF3F51BA10A}">
-      <p15:sldGuideLst xmlns:p15="http://schemas.microsoft.com/office/powerpoint/2012/main"/>
+      <p15:sldGuideLst xmlns:p15="http://schemas.microsoft.com/office/powerpoint/2012/main" xmlns=""/>
     </p:ext>
   </p:extLst>
 </p:presentation>
@@ -349,7 +349,7 @@
           <a:p>
             <a:fld id="{96DFF08F-DC6B-4601-B491-B0F83F6DD2DA}" type="datetimeFigureOut">
               <a:rPr lang="en-US" smtClean="0"/>
-              <a:t>7/1/2016</a:t>
+              <a:t>04/07/16</a:t>
             </a:fld>
             <a:endParaRPr lang="en-US" dirty="0"/>
           </a:p>
@@ -557,7 +557,7 @@
           <a:p>
             <a:fld id="{96DFF08F-DC6B-4601-B491-B0F83F6DD2DA}" type="datetimeFigureOut">
               <a:rPr lang="en-US" smtClean="0"/>
-              <a:t>7/1/2016</a:t>
+              <a:t>04/07/16</a:t>
             </a:fld>
             <a:endParaRPr lang="en-US" dirty="0"/>
           </a:p>
@@ -813,7 +813,7 @@
           <a:p>
             <a:fld id="{96DFF08F-DC6B-4601-B491-B0F83F6DD2DA}" type="datetimeFigureOut">
               <a:rPr lang="en-US" smtClean="0"/>
-              <a:t>7/1/2016</a:t>
+              <a:t>04/07/16</a:t>
             </a:fld>
             <a:endParaRPr lang="en-US" dirty="0"/>
           </a:p>
@@ -983,7 +983,7 @@
           <a:p>
             <a:fld id="{D62CEF3B-A037-46D0-B02C-1428F07E9383}" type="datetimeFigureOut">
               <a:rPr lang="en-US" smtClean="0"/>
-              <a:t>7/1/2016</a:t>
+              <a:t>04/07/16</a:t>
             </a:fld>
             <a:endParaRPr lang="en-US" dirty="0"/>
           </a:p>
@@ -1326,7 +1326,7 @@
           <a:p>
             <a:fld id="{96DFF08F-DC6B-4601-B491-B0F83F6DD2DA}" type="datetimeFigureOut">
               <a:rPr lang="en-US" smtClean="0"/>
-              <a:t>7/1/2016</a:t>
+              <a:t>04/07/16</a:t>
             </a:fld>
             <a:endParaRPr lang="en-US" dirty="0"/>
           </a:p>
@@ -1601,7 +1601,7 @@
           <a:p>
             <a:fld id="{96DFF08F-DC6B-4601-B491-B0F83F6DD2DA}" type="datetimeFigureOut">
               <a:rPr lang="en-US" smtClean="0"/>
-              <a:t>7/1/2016</a:t>
+              <a:t>04/07/16</a:t>
             </a:fld>
             <a:endParaRPr lang="en-US" dirty="0"/>
           </a:p>
@@ -1980,7 +1980,7 @@
           <a:p>
             <a:fld id="{96DFF08F-DC6B-4601-B491-B0F83F6DD2DA}" type="datetimeFigureOut">
               <a:rPr lang="en-US" smtClean="0"/>
-              <a:t>7/1/2016</a:t>
+              <a:t>04/07/16</a:t>
             </a:fld>
             <a:endParaRPr lang="en-US" dirty="0"/>
           </a:p>
@@ -2098,7 +2098,7 @@
           <a:p>
             <a:fld id="{96DFF08F-DC6B-4601-B491-B0F83F6DD2DA}" type="datetimeFigureOut">
               <a:rPr lang="en-US" smtClean="0"/>
-              <a:t>7/1/2016</a:t>
+              <a:t>04/07/16</a:t>
             </a:fld>
             <a:endParaRPr lang="en-US" dirty="0"/>
           </a:p>
@@ -2270,7 +2270,7 @@
             <a:fld id="{96DFF08F-DC6B-4601-B491-B0F83F6DD2DA}" type="datetimeFigureOut">
               <a:rPr lang="en-US" smtClean="0"/>
               <a:pPr/>
-              <a:t>7/1/2016</a:t>
+              <a:t>04/07/16</a:t>
             </a:fld>
             <a:endParaRPr lang="en-US" dirty="0"/>
           </a:p>
@@ -2626,7 +2626,7 @@
             <a:fld id="{96DFF08F-DC6B-4601-B491-B0F83F6DD2DA}" type="datetimeFigureOut">
               <a:rPr lang="en-US" smtClean="0"/>
               <a:pPr/>
-              <a:t>7/1/2016</a:t>
+              <a:t>04/07/16</a:t>
             </a:fld>
             <a:endParaRPr lang="en-US" dirty="0"/>
           </a:p>
@@ -3004,7 +3004,7 @@
           <a:p>
             <a:fld id="{96DFF08F-DC6B-4601-B491-B0F83F6DD2DA}" type="datetimeFigureOut">
               <a:rPr lang="en-US" smtClean="0"/>
-              <a:t>7/1/2016</a:t>
+              <a:t>04/07/16</a:t>
             </a:fld>
             <a:endParaRPr lang="en-US" dirty="0"/>
           </a:p>
@@ -3292,7 +3292,7 @@
             <a:fld id="{96DFF08F-DC6B-4601-B491-B0F83F6DD2DA}" type="datetimeFigureOut">
               <a:rPr lang="en-US" smtClean="0"/>
               <a:pPr/>
-              <a:t>7/1/2016</a:t>
+              <a:t>04/07/16</a:t>
             </a:fld>
             <a:endParaRPr lang="en-US" dirty="0"/>
           </a:p>
@@ -3886,6 +3886,13 @@
   <p:clrMapOvr>
     <a:masterClrMapping/>
   </p:clrMapOvr>
+  <p:timing>
+    <p:tnLst>
+      <p:par>
+        <p:cTn xmlns:p14="http://schemas.microsoft.com/office/powerpoint/2010/main" id="1" dur="indefinite" restart="never" nodeType="tmRoot"/>
+      </p:par>
+    </p:tnLst>
+  </p:timing>
 </p:sld>
 </file>
 
@@ -4004,6 +4011,13 @@
   <p:clrMapOvr>
     <a:masterClrMapping/>
   </p:clrMapOvr>
+  <p:timing>
+    <p:tnLst>
+      <p:par>
+        <p:cTn xmlns:p14="http://schemas.microsoft.com/office/powerpoint/2010/main" id="1" dur="indefinite" restart="never" nodeType="tmRoot"/>
+      </p:par>
+    </p:tnLst>
+  </p:timing>
 </p:sld>
 </file>
 
@@ -4079,6 +4093,13 @@
   <p:clrMapOvr>
     <a:masterClrMapping/>
   </p:clrMapOvr>
+  <p:timing>
+    <p:tnLst>
+      <p:par>
+        <p:cTn xmlns:p14="http://schemas.microsoft.com/office/powerpoint/2010/main" id="1" dur="indefinite" restart="never" nodeType="tmRoot"/>
+      </p:par>
+    </p:tnLst>
+  </p:timing>
 </p:sld>
 </file>
 
@@ -4183,9 +4204,22 @@
           <a:p>
             <a:pPr lvl="2"/>
             <a:r>
+              <a:rPr lang="de-DE" dirty="0" smtClean="0"/>
+              <a:t>171</a:t>
+            </a:r>
+            <a:r>
               <a:rPr lang="de-DE" dirty="0"/>
-              <a:t>11! ergibt ein POSITIVE_INFINITY</a:t>
-            </a:r>
+              <a:t>! </a:t>
+            </a:r>
+            <a:r>
+              <a:rPr lang="de-DE" dirty="0" smtClean="0"/>
+              <a:t>passt nicht mehr in einen Double Precision </a:t>
+            </a:r>
+            <a:r>
+              <a:rPr lang="de-DE" dirty="0" err="1" smtClean="0"/>
+              <a:t>Float</a:t>
+            </a:r>
+            <a:endParaRPr lang="de-DE" dirty="0"/>
           </a:p>
           <a:p>
             <a:pPr lvl="2">
@@ -4291,6 +4325,13 @@
   <p:clrMapOvr>
     <a:masterClrMapping/>
   </p:clrMapOvr>
+  <p:timing>
+    <p:tnLst>
+      <p:par>
+        <p:cTn xmlns:p14="http://schemas.microsoft.com/office/powerpoint/2010/main" id="1" dur="indefinite" restart="never" nodeType="tmRoot"/>
+      </p:par>
+    </p:tnLst>
+  </p:timing>
 </p:sld>
 </file>
 
@@ -4408,6 +4449,13 @@
   <p:clrMapOvr>
     <a:masterClrMapping/>
   </p:clrMapOvr>
+  <p:timing>
+    <p:tnLst>
+      <p:par>
+        <p:cTn xmlns:p14="http://schemas.microsoft.com/office/powerpoint/2010/main" id="1" dur="indefinite" restart="never" nodeType="tmRoot"/>
+      </p:par>
+    </p:tnLst>
+  </p:timing>
 </p:sld>
 </file>
 
@@ -4556,6 +4604,13 @@
   <p:clrMapOvr>
     <a:masterClrMapping/>
   </p:clrMapOvr>
+  <p:timing>
+    <p:tnLst>
+      <p:par>
+        <p:cTn xmlns:p14="http://schemas.microsoft.com/office/powerpoint/2010/main" id="1" dur="indefinite" restart="never" nodeType="tmRoot"/>
+      </p:par>
+    </p:tnLst>
+  </p:timing>
 </p:sld>
 </file>
 
@@ -4731,6 +4786,13 @@
   <p:clrMapOvr>
     <a:masterClrMapping/>
   </p:clrMapOvr>
+  <p:timing>
+    <p:tnLst>
+      <p:par>
+        <p:cTn xmlns:p14="http://schemas.microsoft.com/office/powerpoint/2010/main" id="1" dur="indefinite" restart="never" nodeType="tmRoot"/>
+      </p:par>
+    </p:tnLst>
+  </p:timing>
 </p:sld>
 </file>
 
@@ -4760,7 +4822,7 @@
           <p:nvPr>
             <p:extLst>
               <p:ext uri="{386F3935-93C4-4BCD-93E2-E3B085C9AB24}">
-                <p16:designElem xmlns:p16="http://schemas.microsoft.com/office/powerpoint/2015/main" val="1"/>
+                <p16:designElem xmlns:p16="http://schemas.microsoft.com/office/powerpoint/2015/main" xmlns="" val="1"/>
               </p:ext>
             </p:extLst>
           </p:nvPr>
@@ -4811,7 +4873,7 @@
           <p:nvPr>
             <p:extLst>
               <p:ext uri="{386F3935-93C4-4BCD-93E2-E3B085C9AB24}">
-                <p16:designElem xmlns:p16="http://schemas.microsoft.com/office/powerpoint/2015/main" val="1"/>
+                <p16:designElem xmlns:p16="http://schemas.microsoft.com/office/powerpoint/2015/main" xmlns="" val="1"/>
               </p:ext>
             </p:extLst>
           </p:nvPr>
@@ -4857,7 +4919,7 @@
           <p:nvPr>
             <p:extLst>
               <p:ext uri="{386F3935-93C4-4BCD-93E2-E3B085C9AB24}">
-                <p16:designElem xmlns:p16="http://schemas.microsoft.com/office/powerpoint/2015/main" val="1"/>
+                <p16:designElem xmlns:p16="http://schemas.microsoft.com/office/powerpoint/2015/main" xmlns="" val="1"/>
               </p:ext>
             </p:extLst>
           </p:nvPr>
@@ -4903,7 +4965,7 @@
           <p:nvPr>
             <p:extLst>
               <p:ext uri="{386F3935-93C4-4BCD-93E2-E3B085C9AB24}">
-                <p16:designElem xmlns:p16="http://schemas.microsoft.com/office/powerpoint/2015/main" val="1"/>
+                <p16:designElem xmlns:p16="http://schemas.microsoft.com/office/powerpoint/2015/main" xmlns="" val="1"/>
               </p:ext>
             </p:extLst>
           </p:nvPr>
@@ -4987,9 +5049,10 @@
           <a:lstStyle/>
           <a:p>
             <a:r>
-              <a:rPr lang="de-DE" dirty="0"/>
-              <a:t>HTF-Format</a:t>
-            </a:r>
+              <a:rPr lang="de-DE" dirty="0" smtClean="0"/>
+              <a:t>HFT-Format</a:t>
+            </a:r>
+            <a:endParaRPr lang="de-DE" dirty="0"/>
           </a:p>
         </p:txBody>
       </p:sp>
@@ -5021,9 +5084,10 @@
           <a:p>
             <a:pPr lvl="1"/>
             <a:r>
-              <a:rPr lang="en-US" dirty="0"/>
-              <a:t>JSON-Format</a:t>
-            </a:r>
+              <a:rPr lang="en-US" dirty="0" smtClean="0"/>
+              <a:t>JSON</a:t>
+            </a:r>
+            <a:endParaRPr lang="en-US" dirty="0"/>
           </a:p>
           <a:p>
             <a:pPr lvl="2"/>
@@ -5060,6 +5124,13 @@
   <p:clrMapOvr>
     <a:masterClrMapping/>
   </p:clrMapOvr>
+  <p:timing>
+    <p:tnLst>
+      <p:par>
+        <p:cTn xmlns:p14="http://schemas.microsoft.com/office/powerpoint/2010/main" id="1" dur="indefinite" restart="never" nodeType="tmRoot"/>
+      </p:par>
+    </p:tnLst>
+  </p:timing>
 </p:sld>
 </file>
 
@@ -5131,8 +5202,12 @@
           <a:p>
             <a:pPr lvl="1"/>
             <a:r>
+              <a:rPr lang="de-DE" dirty="0" smtClean="0"/>
+              <a:t>HFT </a:t>
+            </a:r>
+            <a:r>
               <a:rPr lang="de-DE" dirty="0"/>
-              <a:t>HTF ergibt sich direkt aus JSON-File</a:t>
+              <a:t>ergibt sich direkt aus JSON-File</a:t>
             </a:r>
           </a:p>
           <a:p>
@@ -5142,9 +5217,10 @@
           <a:p>
             <a:pPr lvl="1"/>
             <a:r>
-              <a:rPr lang="de-DE" dirty="0"/>
-              <a:t>HTF </a:t>
-            </a:r>
+              <a:rPr lang="de-DE" dirty="0" smtClean="0"/>
+              <a:t>HFT </a:t>
+            </a:r>
+            <a:endParaRPr lang="de-DE" dirty="0"/>
           </a:p>
           <a:p>
             <a:pPr lvl="1">
@@ -5212,6 +5288,13 @@
   <p:clrMapOvr>
     <a:masterClrMapping/>
   </p:clrMapOvr>
+  <p:timing>
+    <p:tnLst>
+      <p:par>
+        <p:cTn xmlns:p14="http://schemas.microsoft.com/office/powerpoint/2010/main" id="1" dur="indefinite" restart="never" nodeType="tmRoot"/>
+      </p:par>
+    </p:tnLst>
+  </p:timing>
 </p:sld>
 </file>
 
@@ -5278,7 +5361,7 @@
           </a:ln>
           <a:effectLst/>
           <a:extLst>
-            <a:ext uri="{91240B29-F687-4F45-9708-019B960494DF}">
+            <a:ext uri="{91240B29-F687-4f45-9708-019B960494DF}">
               <a14:hiddenLine xmlns:a14="http://schemas.microsoft.com/office/drawing/2010/main" w="9525">
                 <a:solidFill>
                   <a:schemeClr val="tx1"/>
@@ -5288,7 +5371,7 @@
                 <a:tailEnd/>
               </a14:hiddenLine>
             </a:ext>
-            <a:ext uri="{AF507438-7753-43E0-B8FC-AC1667EBCBE1}">
+            <a:ext uri="{AF507438-7753-43e0-B8FC-AC1667EBCBE1}">
               <a14:hiddenEffects xmlns:a14="http://schemas.microsoft.com/office/drawing/2010/main">
                 <a:effectLst>
                   <a:outerShdw dist="35921" dir="2700000" algn="ctr" rotWithShape="0">
@@ -5699,6 +5782,20 @@
                 <a:cs typeface="Courier New" panose="02070309020205020404" pitchFamily="49" charset="0"/>
               </a:rPr>
             </a:br>
+            <a:r>
+              <a:rPr kumimoji="0" lang="de-DE" altLang="de-DE" sz="1450" b="0" i="0" u="none" strike="noStrike" cap="none" normalizeH="0" baseline="0" dirty="0">
+                <a:ln>
+                  <a:noFill/>
+                </a:ln>
+                <a:solidFill>
+                  <a:srgbClr val="000000"/>
+                </a:solidFill>
+                <a:effectLst/>
+                <a:latin typeface="Courier New" panose="02070309020205020404" pitchFamily="49" charset="0"/>
+                <a:cs typeface="Courier New" panose="02070309020205020404" pitchFamily="49" charset="0"/>
+              </a:rPr>
+              <a:t/>
+            </a:r>
             <a:br>
               <a:rPr kumimoji="0" lang="de-DE" altLang="de-DE" sz="1450" b="0" i="0" u="none" strike="noStrike" cap="none" normalizeH="0" baseline="0" dirty="0">
                 <a:ln>
@@ -6402,6 +6499,13 @@
   <p:clrMapOvr>
     <a:masterClrMapping/>
   </p:clrMapOvr>
+  <p:timing>
+    <p:tnLst>
+      <p:par>
+        <p:cTn xmlns:p14="http://schemas.microsoft.com/office/powerpoint/2010/main" id="1" dur="indefinite" restart="never" nodeType="tmRoot"/>
+      </p:par>
+    </p:tnLst>
+  </p:timing>
 </p:sld>
 </file>
 
@@ -6468,7 +6572,7 @@
           </a:ln>
           <a:effectLst/>
           <a:extLst>
-            <a:ext uri="{91240B29-F687-4F45-9708-019B960494DF}">
+            <a:ext uri="{91240B29-F687-4f45-9708-019B960494DF}">
               <a14:hiddenLine xmlns:a14="http://schemas.microsoft.com/office/drawing/2010/main" w="9525">
                 <a:solidFill>
                   <a:schemeClr val="tx1"/>
@@ -6478,7 +6582,7 @@
                 <a:tailEnd/>
               </a14:hiddenLine>
             </a:ext>
-            <a:ext uri="{AF507438-7753-43E0-B8FC-AC1667EBCBE1}">
+            <a:ext uri="{AF507438-7753-43e0-B8FC-AC1667EBCBE1}">
               <a14:hiddenEffects xmlns:a14="http://schemas.microsoft.com/office/drawing/2010/main">
                 <a:effectLst>
                   <a:outerShdw dist="35921" dir="2700000" algn="ctr" rotWithShape="0">
@@ -8093,6 +8197,13 @@
   <p:clrMapOvr>
     <a:masterClrMapping/>
   </p:clrMapOvr>
+  <p:timing>
+    <p:tnLst>
+      <p:par>
+        <p:cTn xmlns:p14="http://schemas.microsoft.com/office/powerpoint/2010/main" id="1" dur="indefinite" restart="never" nodeType="tmRoot"/>
+      </p:par>
+    </p:tnLst>
+  </p:timing>
 </p:sld>
 </file>
 
@@ -8129,408 +8240,294 @@
           <a:lstStyle/>
           <a:p>
             <a:r>
-              <a:rPr lang="de-DE" dirty="0" err="1"/>
-              <a:t>Markov</a:t>
-            </a:r>
-            <a:r>
-              <a:rPr lang="de-DE" dirty="0"/>
-              <a:t> Kette</a:t>
-            </a:r>
+              <a:rPr lang="de-DE" dirty="0" err="1" smtClean="0"/>
+              <a:t>Markovkette</a:t>
+            </a:r>
+            <a:endParaRPr lang="de-DE" dirty="0"/>
           </a:p>
         </p:txBody>
       </p:sp>
-      <mc:AlternateContent xmlns:mc="http://schemas.openxmlformats.org/markup-compatibility/2006" xmlns:a14="http://schemas.microsoft.com/office/drawing/2010/main">
-        <mc:Choice Requires="a14">
-          <p:sp>
-            <p:nvSpPr>
-              <p:cNvPr id="3" name="Inhaltsplatzhalter 2"/>
-              <p:cNvSpPr>
-                <a:spLocks noGrp="1"/>
-              </p:cNvSpPr>
-              <p:nvPr>
-                <p:ph idx="1"/>
-              </p:nvPr>
-            </p:nvSpPr>
-            <p:spPr/>
-            <p:txBody>
-              <a:bodyPr/>
-              <a:lstStyle/>
-              <a:p>
-                <a:pPr lvl="1"/>
-                <a:endParaRPr lang="de-DE" dirty="0"/>
-              </a:p>
-              <a:p>
-                <a:pPr lvl="1"/>
-                <a:r>
-                  <a:rPr lang="de-DE" dirty="0"/>
-                  <a:t>Pro Zusammenhangskomponente eine </a:t>
-                </a:r>
-                <a:r>
-                  <a:rPr lang="de-DE" dirty="0" err="1"/>
-                  <a:t>Markov</a:t>
-                </a:r>
-                <a:r>
-                  <a:rPr lang="de-DE" dirty="0"/>
-                  <a:t> Kette</a:t>
-                </a:r>
-              </a:p>
-              <a:p>
-                <a:pPr lvl="1"/>
-                <a:endParaRPr lang="de-DE" dirty="0"/>
-              </a:p>
-              <a:p>
-                <a:pPr lvl="1"/>
-                <a14:m>
-                  <m:oMath xmlns:m="http://schemas.openxmlformats.org/officeDocument/2006/math">
-                    <m:r>
-                      <a:rPr lang="de-DE" i="1">
-                        <a:latin typeface="Cambria Math" panose="02040503050406030204" pitchFamily="18" charset="0"/>
-                      </a:rPr>
-                      <m:t>𝜋</m:t>
-                    </m:r>
-                    <m:d>
-                      <m:dPr>
-                        <m:ctrlPr>
-                          <a:rPr lang="de-DE" b="0" i="1" smtClean="0">
-                            <a:latin typeface="Cambria Math" panose="02040503050406030204" pitchFamily="18" charset="0"/>
-                          </a:rPr>
-                        </m:ctrlPr>
-                      </m:dPr>
-                      <m:e>
-                        <m:r>
-                          <m:rPr>
-                            <m:sty m:val="p"/>
-                          </m:rPr>
-                          <a:rPr lang="de-DE" b="0" i="0" smtClean="0">
-                            <a:latin typeface="Cambria Math" panose="02040503050406030204" pitchFamily="18" charset="0"/>
-                          </a:rPr>
-                          <m:t>t</m:t>
-                        </m:r>
-                      </m:e>
-                    </m:d>
-                    <m:r>
-                      <a:rPr lang="de-DE" b="0" i="0" smtClean="0">
-                        <a:latin typeface="Cambria Math" panose="02040503050406030204" pitchFamily="18" charset="0"/>
-                      </a:rPr>
-                      <m:t>=</m:t>
-                    </m:r>
-                    <m:nary>
-                      <m:naryPr>
-                        <m:chr m:val="∑"/>
-                        <m:limLoc m:val="undOvr"/>
-                        <m:grow m:val="on"/>
-                        <m:ctrlPr>
-                          <a:rPr lang="de-DE" i="1" smtClean="0">
-                            <a:latin typeface="Cambria Math" panose="02040503050406030204" pitchFamily="18" charset="0"/>
-                          </a:rPr>
-                        </m:ctrlPr>
-                      </m:naryPr>
-                      <m:sub>
-                        <m:r>
-                          <m:rPr>
-                            <m:brk/>
-                            <m:aln/>
-                          </m:rPr>
-                          <a:rPr lang="de-DE" b="0" i="1" smtClean="0">
-                            <a:latin typeface="Cambria Math" panose="02040503050406030204" pitchFamily="18" charset="0"/>
-                          </a:rPr>
-                          <m:t>𝑛</m:t>
-                        </m:r>
-                        <m:r>
-                          <a:rPr lang="de-DE" i="1" smtClean="0">
-                            <a:latin typeface="Cambria Math" panose="02040503050406030204" pitchFamily="18" charset="0"/>
-                          </a:rPr>
-                          <m:t>=0</m:t>
-                        </m:r>
-                      </m:sub>
-                      <m:sup>
-                        <m:r>
-                          <a:rPr lang="de-DE" i="1" smtClean="0">
-                            <a:latin typeface="Cambria Math" panose="02040503050406030204" pitchFamily="18" charset="0"/>
-                          </a:rPr>
-                          <m:t>∞</m:t>
-                        </m:r>
-                      </m:sup>
-                      <m:e>
-                        <m:r>
-                          <a:rPr lang="de-DE" i="1" smtClean="0">
-                            <a:latin typeface="Cambria Math" panose="02040503050406030204" pitchFamily="18" charset="0"/>
-                          </a:rPr>
-                          <m:t>𝜋</m:t>
-                        </m:r>
-                        <m:d>
-                          <m:dPr>
-                            <m:ctrlPr>
-                              <a:rPr lang="de-DE" i="1" smtClean="0">
-                                <a:latin typeface="Cambria Math" panose="02040503050406030204" pitchFamily="18" charset="0"/>
-                              </a:rPr>
-                            </m:ctrlPr>
-                          </m:dPr>
-                          <m:e>
-                            <m:r>
-                              <a:rPr lang="de-DE" i="1" smtClean="0">
-                                <a:latin typeface="Cambria Math" panose="02040503050406030204" pitchFamily="18" charset="0"/>
-                              </a:rPr>
-                              <m:t>0</m:t>
-                            </m:r>
-                          </m:e>
-                        </m:d>
-                        <m:sSup>
-                          <m:sSupPr>
-                            <m:ctrlPr>
-                              <a:rPr lang="de-DE" b="0" i="1" smtClean="0">
-                                <a:latin typeface="Cambria Math" panose="02040503050406030204" pitchFamily="18" charset="0"/>
-                              </a:rPr>
-                            </m:ctrlPr>
-                          </m:sSupPr>
-                          <m:e>
-                            <m:r>
-                              <a:rPr lang="de-DE" b="0" i="1" smtClean="0">
-                                <a:latin typeface="Cambria Math" panose="02040503050406030204" pitchFamily="18" charset="0"/>
-                              </a:rPr>
-                              <m:t>𝑃</m:t>
-                            </m:r>
-                          </m:e>
-                          <m:sup>
-                            <m:r>
-                              <a:rPr lang="de-DE" b="0" i="1" smtClean="0">
-                                <a:latin typeface="Cambria Math" panose="02040503050406030204" pitchFamily="18" charset="0"/>
-                              </a:rPr>
-                              <m:t>𝑛</m:t>
-                            </m:r>
-                          </m:sup>
-                        </m:sSup>
-                        <m:f>
-                          <m:fPr>
-                            <m:ctrlPr>
-                              <a:rPr lang="de-DE" i="1" smtClean="0">
-                                <a:latin typeface="Cambria Math" panose="02040503050406030204" pitchFamily="18" charset="0"/>
-                              </a:rPr>
-                            </m:ctrlPr>
-                          </m:fPr>
-                          <m:num>
-                            <m:sSup>
-                              <m:sSupPr>
-                                <m:ctrlPr>
-                                  <a:rPr lang="de-DE" i="1" smtClean="0">
-                                    <a:latin typeface="Cambria Math" panose="02040503050406030204" pitchFamily="18" charset="0"/>
-                                  </a:rPr>
-                                </m:ctrlPr>
-                              </m:sSupPr>
-                              <m:e>
-                                <m:d>
-                                  <m:dPr>
-                                    <m:ctrlPr>
-                                      <a:rPr lang="de-DE" i="1" smtClean="0">
-                                        <a:latin typeface="Cambria Math" panose="02040503050406030204" pitchFamily="18" charset="0"/>
-                                      </a:rPr>
-                                    </m:ctrlPr>
-                                  </m:dPr>
-                                  <m:e>
-                                    <m:r>
-                                      <a:rPr lang="de-DE" i="1">
-                                        <a:latin typeface="Cambria Math" panose="02040503050406030204" pitchFamily="18" charset="0"/>
-                                        <a:ea typeface="Cambria Math" panose="02040503050406030204" pitchFamily="18" charset="0"/>
-                                      </a:rPr>
-                                      <m:t>𝛾</m:t>
-                                    </m:r>
-                                    <m:r>
-                                      <a:rPr lang="de-DE" b="0" i="1" smtClean="0">
-                                        <a:latin typeface="Cambria Math" panose="02040503050406030204" pitchFamily="18" charset="0"/>
-                                      </a:rPr>
-                                      <m:t>𝑡</m:t>
-                                    </m:r>
-                                  </m:e>
-                                </m:d>
-                              </m:e>
-                              <m:sup>
-                                <m:r>
-                                  <a:rPr lang="de-DE" i="1" smtClean="0">
-                                    <a:latin typeface="Cambria Math" panose="02040503050406030204" pitchFamily="18" charset="0"/>
-                                  </a:rPr>
-                                  <m:t>𝑛</m:t>
-                                </m:r>
-                              </m:sup>
-                            </m:sSup>
-                          </m:num>
-                          <m:den>
-                            <m:r>
-                              <a:rPr lang="de-DE" i="1" smtClean="0">
-                                <a:latin typeface="Cambria Math" panose="02040503050406030204" pitchFamily="18" charset="0"/>
-                              </a:rPr>
-                              <m:t>𝑛</m:t>
-                            </m:r>
-                            <m:r>
-                              <a:rPr lang="de-DE" i="1" smtClean="0">
-                                <a:latin typeface="Cambria Math" panose="02040503050406030204" pitchFamily="18" charset="0"/>
-                              </a:rPr>
-                              <m:t>!</m:t>
-                            </m:r>
-                          </m:den>
-                        </m:f>
-                        <m:sSup>
-                          <m:sSupPr>
-                            <m:ctrlPr>
-                              <a:rPr lang="de-DE" i="1" smtClean="0">
-                                <a:latin typeface="Cambria Math" panose="02040503050406030204" pitchFamily="18" charset="0"/>
-                              </a:rPr>
-                            </m:ctrlPr>
-                          </m:sSupPr>
-                          <m:e>
-                            <m:r>
-                              <a:rPr lang="de-DE" i="1" smtClean="0">
-                                <a:latin typeface="Cambria Math" panose="02040503050406030204" pitchFamily="18" charset="0"/>
-                              </a:rPr>
-                              <m:t>ⅇ</m:t>
-                            </m:r>
-                          </m:e>
-                          <m:sup>
-                            <m:r>
-                              <a:rPr lang="de-DE" i="1" smtClean="0">
-                                <a:latin typeface="Cambria Math" panose="02040503050406030204" pitchFamily="18" charset="0"/>
-                              </a:rPr>
-                              <m:t>−</m:t>
-                            </m:r>
-                            <m:r>
-                              <a:rPr lang="de-DE" i="1">
-                                <a:latin typeface="Cambria Math" panose="02040503050406030204" pitchFamily="18" charset="0"/>
-                                <a:ea typeface="Cambria Math" panose="02040503050406030204" pitchFamily="18" charset="0"/>
-                              </a:rPr>
-                              <m:t>𝛾</m:t>
-                            </m:r>
-                            <m:r>
-                              <a:rPr lang="de-DE" i="1" smtClean="0">
-                                <a:latin typeface="Cambria Math" panose="02040503050406030204" pitchFamily="18" charset="0"/>
-                              </a:rPr>
-                              <m:t>𝑡</m:t>
-                            </m:r>
-                          </m:sup>
-                        </m:sSup>
-                      </m:e>
-                    </m:nary>
-                  </m:oMath>
-                </a14:m>
-                <a:endParaRPr lang="de-DE" dirty="0"/>
-              </a:p>
-              <a:p>
-                <a:pPr lvl="1"/>
-                <a:endParaRPr lang="de-DE" dirty="0"/>
-              </a:p>
-              <a:p>
-                <a:pPr lvl="1"/>
-                <a:r>
-                  <a:rPr lang="de-DE" dirty="0" err="1"/>
-                  <a:t>Stop</a:t>
-                </a:r>
-                <a:r>
-                  <a:rPr lang="de-DE" dirty="0"/>
-                  <a:t>-Kriterium:</a:t>
-                </a:r>
-              </a:p>
-              <a:p>
-                <a:pPr lvl="2"/>
-                <a:r>
-                  <a:rPr lang="de-DE" dirty="0"/>
-                  <a:t>Grenzwert abhängig von Maschinen-</a:t>
-                </a:r>
-                <a14:m>
-                  <m:oMath xmlns:m="http://schemas.openxmlformats.org/officeDocument/2006/math">
-                    <m:r>
-                      <a:rPr lang="de-DE" i="1" smtClean="0">
-                        <a:latin typeface="Cambria Math" panose="02040503050406030204" pitchFamily="18" charset="0"/>
-                        <a:ea typeface="Cambria Math" panose="02040503050406030204" pitchFamily="18" charset="0"/>
-                      </a:rPr>
-                      <m:t>𝜀</m:t>
-                    </m:r>
-                  </m:oMath>
-                </a14:m>
-                <a:r>
-                  <a:rPr lang="de-DE" dirty="0"/>
-                  <a:t> (</a:t>
-                </a:r>
-                <a:r>
-                  <a:rPr lang="de-DE" dirty="0" err="1"/>
-                  <a:t>Math.ulp</a:t>
-                </a:r>
-                <a:r>
-                  <a:rPr lang="de-DE" dirty="0"/>
-                  <a:t>)</a:t>
-                </a:r>
-              </a:p>
-              <a:p>
-                <a:pPr lvl="2"/>
-                <a:r>
-                  <a:rPr lang="de-DE" dirty="0"/>
-                  <a:t>Maximal jedoch </a:t>
-                </a:r>
-                <a14:m>
-                  <m:oMath xmlns:m="http://schemas.openxmlformats.org/officeDocument/2006/math">
-                    <m:r>
-                      <m:rPr>
-                        <m:sty m:val="p"/>
-                      </m:rPr>
-                      <a:rPr lang="de-DE" i="1">
-                        <a:latin typeface="Cambria Math" panose="02040503050406030204" pitchFamily="18" charset="0"/>
-                      </a:rPr>
-                      <m:t>n</m:t>
-                    </m:r>
-                    <m:r>
-                      <a:rPr lang="de-DE" i="1" smtClean="0">
-                        <a:latin typeface="Cambria Math" panose="02040503050406030204" pitchFamily="18" charset="0"/>
-                      </a:rPr>
-                      <m:t>=10</m:t>
-                    </m:r>
-                  </m:oMath>
-                </a14:m>
-                <a:endParaRPr lang="de-DE" dirty="0"/>
-              </a:p>
-            </p:txBody>
-          </p:sp>
-        </mc:Choice>
-        <mc:Fallback xmlns="">
-          <p:sp>
-            <p:nvSpPr>
-              <p:cNvPr id="3" name="Inhaltsplatzhalter 2"/>
-              <p:cNvSpPr>
-                <a:spLocks noGrp="1" noRot="1" noChangeAspect="1" noMove="1" noResize="1" noEditPoints="1" noAdjustHandles="1" noChangeArrowheads="1" noChangeShapeType="1" noTextEdit="1"/>
-              </p:cNvSpPr>
-              <p:nvPr>
-                <p:ph idx="1"/>
-              </p:nvPr>
-            </p:nvSpPr>
-            <p:spPr>
-              <a:blipFill>
-                <a:blip r:embed="rId2"/>
-                <a:stretch>
-                  <a:fillRect/>
-                </a:stretch>
-              </a:blipFill>
-            </p:spPr>
-            <p:txBody>
-              <a:bodyPr/>
-              <a:lstStyle/>
-              <a:p>
-                <a:r>
-                  <a:rPr lang="de-DE">
-                    <a:noFill/>
-                  </a:rPr>
-                  <a:t> </a:t>
-                </a:r>
-              </a:p>
-            </p:txBody>
-          </p:sp>
-        </mc:Fallback>
-      </mc:AlternateContent>
+      <p:sp>
+        <p:nvSpPr>
+          <p:cNvPr id="3" name="Inhaltsplatzhalter 2"/>
+          <p:cNvSpPr>
+            <a:spLocks noGrp="1"/>
+          </p:cNvSpPr>
+          <p:nvPr>
+            <p:ph idx="1"/>
+          </p:nvPr>
+        </p:nvSpPr>
+        <p:spPr/>
+        <p:txBody>
+          <a:bodyPr>
+            <a:normAutofit/>
+          </a:bodyPr>
+          <a:lstStyle/>
+          <a:p>
+            <a:pPr lvl="1"/>
+            <a:r>
+              <a:rPr lang="de-DE" sz="2800" dirty="0" smtClean="0"/>
+              <a:t>Pro Zusammenhangskomponente eine </a:t>
+            </a:r>
+            <a:r>
+              <a:rPr lang="de-DE" sz="2800" dirty="0" err="1" smtClean="0"/>
+              <a:t>Markovkette</a:t>
+            </a:r>
+            <a:endParaRPr lang="de-DE" sz="2800" dirty="0"/>
+          </a:p>
+          <a:p>
+            <a:pPr lvl="2"/>
+            <a:r>
+              <a:rPr lang="de-DE" sz="2200" dirty="0" smtClean="0"/>
+              <a:t>Bessere Laufzeit bei Ketten mit Inseln</a:t>
+            </a:r>
+          </a:p>
+          <a:p>
+            <a:pPr marL="201168" lvl="1" indent="0">
+              <a:buNone/>
+            </a:pPr>
+            <a:endParaRPr lang="de-DE" dirty="0" smtClean="0"/>
+          </a:p>
+          <a:p>
+            <a:pPr lvl="1"/>
+            <a:r>
+              <a:rPr lang="de-DE" dirty="0" smtClean="0"/>
+              <a:t>CTMC mit </a:t>
+            </a:r>
+            <a:r>
+              <a:rPr lang="de-DE" dirty="0" err="1" smtClean="0"/>
+              <a:t>Uniformisierung</a:t>
+            </a:r>
+            <a:r>
+              <a:rPr lang="de-DE" dirty="0" smtClean="0"/>
+              <a:t>:</a:t>
+            </a:r>
+          </a:p>
+          <a:p>
+            <a:pPr lvl="1"/>
+            <a:endParaRPr lang="de-DE" dirty="0" smtClean="0"/>
+          </a:p>
+          <a:p>
+            <a:pPr lvl="1"/>
+            <a:endParaRPr lang="de-DE" dirty="0" smtClean="0"/>
+          </a:p>
+          <a:p>
+            <a:pPr lvl="1"/>
+            <a:r>
+              <a:rPr lang="de-DE" dirty="0" smtClean="0"/>
+              <a:t> Abbruchkriterium:                oder              </a:t>
+            </a:r>
+            <a:endParaRPr lang="de-DE" dirty="0"/>
+          </a:p>
+          <a:p>
+            <a:pPr lvl="1"/>
+            <a:endParaRPr lang="de-DE" sz="2800" dirty="0" smtClean="0"/>
+          </a:p>
+        </p:txBody>
+      </p:sp>
+      <p:graphicFrame>
+        <p:nvGraphicFramePr>
+          <p:cNvPr id="6" name="Objekt 5"/>
+          <p:cNvGraphicFramePr>
+            <a:graphicFrameLocks noChangeAspect="1"/>
+          </p:cNvGraphicFramePr>
+          <p:nvPr>
+            <p:extLst>
+              <p:ext uri="{D42A27DB-BD31-4B8C-83A1-F6EECF244321}">
+                <p14:modId xmlns:p14="http://schemas.microsoft.com/office/powerpoint/2010/main" val="397156025"/>
+              </p:ext>
+            </p:extLst>
+          </p:nvPr>
+        </p:nvGraphicFramePr>
+        <p:xfrm>
+          <a:off x="4641145" y="3270058"/>
+          <a:ext cx="3109830" cy="902854"/>
+        </p:xfrm>
+        <a:graphic>
+          <a:graphicData uri="http://schemas.openxmlformats.org/presentationml/2006/ole">
+            <mc:AlternateContent xmlns:mc="http://schemas.openxmlformats.org/markup-compatibility/2006">
+              <mc:Choice xmlns:v="urn:schemas-microsoft-com:vml" Requires="v">
+                <p:oleObj spid="_x0000_s2055" name="Formel" r:id="rId3" imgW="1574800" imgH="457200" progId="Equation.3">
+                  <p:embed/>
+                </p:oleObj>
+              </mc:Choice>
+              <mc:Fallback>
+                <p:oleObj name="Formel" r:id="rId3" imgW="1574800" imgH="457200" progId="Equation.3">
+                  <p:embed/>
+                  <p:pic>
+                    <p:nvPicPr>
+                      <p:cNvPr id="0" name=""/>
+                      <p:cNvPicPr/>
+                      <p:nvPr/>
+                    </p:nvPicPr>
+                    <p:blipFill>
+                      <a:blip r:embed="rId4"/>
+                      <a:stretch>
+                        <a:fillRect/>
+                      </a:stretch>
+                    </p:blipFill>
+                    <p:spPr>
+                      <a:xfrm>
+                        <a:off x="4641145" y="3270058"/>
+                        <a:ext cx="3109830" cy="902854"/>
+                      </a:xfrm>
+                      <a:prstGeom prst="rect">
+                        <a:avLst/>
+                      </a:prstGeom>
+                    </p:spPr>
+                  </p:pic>
+                </p:oleObj>
+              </mc:Fallback>
+            </mc:AlternateContent>
+          </a:graphicData>
+        </a:graphic>
+      </p:graphicFrame>
+      <p:grpSp>
+        <p:nvGrpSpPr>
+          <p:cNvPr id="9" name="Gruppierung 8"/>
+          <p:cNvGrpSpPr/>
+          <p:nvPr/>
+        </p:nvGrpSpPr>
+        <p:grpSpPr>
+          <a:xfrm>
+            <a:off x="3581400" y="4565181"/>
+            <a:ext cx="2642811" cy="689648"/>
+            <a:chOff x="3581400" y="3249000"/>
+            <a:chExt cx="2642811" cy="689648"/>
+          </a:xfrm>
+        </p:grpSpPr>
+        <p:graphicFrame>
+          <p:nvGraphicFramePr>
+            <p:cNvPr id="7" name="Objekt 6"/>
+            <p:cNvGraphicFramePr>
+              <a:graphicFrameLocks noChangeAspect="1"/>
+            </p:cNvGraphicFramePr>
+            <p:nvPr>
+              <p:extLst>
+                <p:ext uri="{D42A27DB-BD31-4B8C-83A1-F6EECF244321}">
+                  <p14:modId xmlns:p14="http://schemas.microsoft.com/office/powerpoint/2010/main" val="4131534018"/>
+                </p:ext>
+              </p:extLst>
+            </p:nvPr>
+          </p:nvGraphicFramePr>
+          <p:xfrm>
+            <a:off x="3581400" y="3249000"/>
+            <a:ext cx="1034472" cy="689648"/>
+          </p:xfrm>
+          <a:graphic>
+            <a:graphicData uri="http://schemas.openxmlformats.org/presentationml/2006/ole">
+              <mc:AlternateContent xmlns:mc="http://schemas.openxmlformats.org/markup-compatibility/2006">
+                <mc:Choice xmlns:v="urn:schemas-microsoft-com:vml" Requires="v">
+                  <p:oleObj spid="_x0000_s2056" name="Formel" r:id="rId5" imgW="609600" imgH="406400" progId="Equation.3">
+                    <p:embed/>
+                  </p:oleObj>
+                </mc:Choice>
+                <mc:Fallback>
+                  <p:oleObj name="Formel" r:id="rId5" imgW="609600" imgH="406400" progId="Equation.3">
+                    <p:embed/>
+                    <p:pic>
+                      <p:nvPicPr>
+                        <p:cNvPr id="0" name=""/>
+                        <p:cNvPicPr/>
+                        <p:nvPr/>
+                      </p:nvPicPr>
+                      <p:blipFill>
+                        <a:blip r:embed="rId6"/>
+                        <a:stretch>
+                          <a:fillRect/>
+                        </a:stretch>
+                      </p:blipFill>
+                      <p:spPr>
+                        <a:xfrm>
+                          <a:off x="3581400" y="3249000"/>
+                          <a:ext cx="1034472" cy="689648"/>
+                        </a:xfrm>
+                        <a:prstGeom prst="rect">
+                          <a:avLst/>
+                        </a:prstGeom>
+                      </p:spPr>
+                    </p:pic>
+                  </p:oleObj>
+                </mc:Fallback>
+              </mc:AlternateContent>
+            </a:graphicData>
+          </a:graphic>
+        </p:graphicFrame>
+        <p:graphicFrame>
+          <p:nvGraphicFramePr>
+            <p:cNvPr id="8" name="Objekt 7"/>
+            <p:cNvGraphicFramePr>
+              <a:graphicFrameLocks noChangeAspect="1"/>
+            </p:cNvGraphicFramePr>
+            <p:nvPr>
+              <p:extLst>
+                <p:ext uri="{D42A27DB-BD31-4B8C-83A1-F6EECF244321}">
+                  <p14:modId xmlns:p14="http://schemas.microsoft.com/office/powerpoint/2010/main" val="367483667"/>
+                </p:ext>
+              </p:extLst>
+            </p:nvPr>
+          </p:nvGraphicFramePr>
+          <p:xfrm>
+            <a:off x="5299200" y="3429000"/>
+            <a:ext cx="925011" cy="325004"/>
+          </p:xfrm>
+          <a:graphic>
+            <a:graphicData uri="http://schemas.openxmlformats.org/presentationml/2006/ole">
+              <mc:AlternateContent xmlns:mc="http://schemas.openxmlformats.org/markup-compatibility/2006">
+                <mc:Choice xmlns:v="urn:schemas-microsoft-com:vml" Requires="v">
+                  <p:oleObj spid="_x0000_s2057" name="Formel" r:id="rId7" imgW="469900" imgH="165100" progId="Equation.3">
+                    <p:embed/>
+                  </p:oleObj>
+                </mc:Choice>
+                <mc:Fallback>
+                  <p:oleObj name="Formel" r:id="rId7" imgW="469900" imgH="165100" progId="Equation.3">
+                    <p:embed/>
+                    <p:pic>
+                      <p:nvPicPr>
+                        <p:cNvPr id="0" name=""/>
+                        <p:cNvPicPr/>
+                        <p:nvPr/>
+                      </p:nvPicPr>
+                      <p:blipFill>
+                        <a:blip r:embed="rId8"/>
+                        <a:stretch>
+                          <a:fillRect/>
+                        </a:stretch>
+                      </p:blipFill>
+                      <p:spPr>
+                        <a:xfrm>
+                          <a:off x="5299200" y="3429000"/>
+                          <a:ext cx="925011" cy="325004"/>
+                        </a:xfrm>
+                        <a:prstGeom prst="rect">
+                          <a:avLst/>
+                        </a:prstGeom>
+                      </p:spPr>
+                    </p:pic>
+                  </p:oleObj>
+                </mc:Fallback>
+              </mc:AlternateContent>
+            </a:graphicData>
+          </a:graphic>
+        </p:graphicFrame>
+      </p:grpSp>
     </p:spTree>
     <p:extLst>
       <p:ext uri="{BB962C8B-B14F-4D97-AF65-F5344CB8AC3E}">
-        <p14:creationId xmlns:p14="http://schemas.microsoft.com/office/powerpoint/2010/main" val="2442440190"/>
+        <p14:creationId xmlns:p14="http://schemas.microsoft.com/office/powerpoint/2010/main" val="1171228283"/>
       </p:ext>
     </p:extLst>
   </p:cSld>
   <p:clrMapOvr>
     <a:masterClrMapping/>
   </p:clrMapOvr>
+  <p:timing>
+    <p:tnLst>
+      <p:par>
+        <p:cTn xmlns:p14="http://schemas.microsoft.com/office/powerpoint/2010/main" id="1" dur="indefinite" restart="never" nodeType="tmRoot"/>
+      </p:par>
+    </p:tnLst>
+  </p:timing>
 </p:sld>
 </file>
 
@@ -8577,7 +8574,7 @@
     </a:clrScheme>
     <a:fontScheme name="Rückblick">
       <a:majorFont>
-        <a:latin typeface="Calibri Light" panose="020F0302020204030204"/>
+        <a:latin typeface="Calibri Light"/>
         <a:ea typeface=""/>
         <a:cs typeface=""/>
         <a:font script="Jpan" typeface="ＭＳ Ｐゴシック"/>
@@ -8612,7 +8609,7 @@
         <a:font script="Geor" typeface="Sylfaen"/>
       </a:majorFont>
       <a:minorFont>
-        <a:latin typeface="Calibri" panose="020F0502020204030204"/>
+        <a:latin typeface="Calibri"/>
         <a:ea typeface=""/>
         <a:cs typeface=""/>
         <a:font script="Jpan" typeface="ＭＳ Ｐゴシック"/>
@@ -8811,7 +8808,7 @@
   <a:extraClrSchemeLst/>
   <a:extLst>
     <a:ext uri="{05A4C25C-085E-4340-85A3-A5531E510DB2}">
-      <thm15:themeFamily xmlns:thm15="http://schemas.microsoft.com/office/thememl/2012/main" name="Retrospect" id="{5F128B03-DCCA-4EEB-AB3B-CF2899314A46}" vid="{9CC26709-368C-4D72-9060-94E5B3FF3CD6}"/>
+      <thm15:themeFamily xmlns:thm15="http://schemas.microsoft.com/office/thememl/2012/main" xmlns="" name="Retrospect" id="{5F128B03-DCCA-4EEB-AB3B-CF2899314A46}" vid="{9CC26709-368C-4D72-9060-94E5B3FF3CD6}"/>
     </a:ext>
   </a:extLst>
 </a:theme>

</xml_diff>